<commit_message>
Updated SOCC talk outline and slides
</commit_message>
<xml_diff>
--- a/Eager/paper/socc15/cerebro_socc_presentation-v2.pptx
+++ b/Eager/paper/socc15/cerebro_socc_presentation-v2.pptx
@@ -1,6 +1,6 @@
 
 <file path=ppt/presentation.xml><?xml version="1.0" encoding="utf-8"?>
-<p:presentation xmlns:a="http://schemas.openxmlformats.org/drawingml/2006/main" xmlns:r="http://schemas.openxmlformats.org/officeDocument/2006/relationships" xmlns:mc="http://schemas.openxmlformats.org/markup-compatibility/2006" xmlns:mv="urn:schemas-microsoft-com:mac:vml" xmlns:p="http://schemas.openxmlformats.org/presentationml/2006/main" mc:Ignorable="mv" mc:PreserveAttributes="mv:*" saveSubsetFonts="1" autoCompressPictures="0">
+<p:presentation xmlns:a="http://schemas.openxmlformats.org/drawingml/2006/main" xmlns:r="http://schemas.openxmlformats.org/officeDocument/2006/relationships" xmlns:p="http://schemas.openxmlformats.org/presentationml/2006/main" saveSubsetFonts="1" autoCompressPictures="0">
   <p:sldMasterIdLst>
     <p:sldMasterId id="2147483648" r:id="rId1"/>
   </p:sldMasterIdLst>
@@ -122,7 +122,7 @@
 </file>
 
 <file path=ppt/slideLayouts/slideLayout1.xml><?xml version="1.0" encoding="utf-8"?>
-<p:sldLayout xmlns:a="http://schemas.openxmlformats.org/drawingml/2006/main" xmlns:r="http://schemas.openxmlformats.org/officeDocument/2006/relationships" xmlns:mc="http://schemas.openxmlformats.org/markup-compatibility/2006" xmlns:mv="urn:schemas-microsoft-com:mac:vml" xmlns:p="http://schemas.openxmlformats.org/presentationml/2006/main" mc:Ignorable="mv" mc:PreserveAttributes="mv:*" type="title" preserve="1">
+<p:sldLayout xmlns:a="http://schemas.openxmlformats.org/drawingml/2006/main" xmlns:r="http://schemas.openxmlformats.org/officeDocument/2006/relationships" xmlns:p="http://schemas.openxmlformats.org/presentationml/2006/main" type="title" preserve="1">
   <p:cSld name="Title Slide">
     <p:spTree>
       <p:nvGrpSpPr>
@@ -303,7 +303,7 @@
             <a:fld id="{27CC59BE-5CA4-EB42-882C-C91C96C3157C}" type="datetimeFigureOut">
               <a:rPr lang="en-US" smtClean="0"/>
               <a:pPr/>
-              <a:t>8/13/15</a:t>
+              <a:t>8/16/15</a:t>
             </a:fld>
             <a:endParaRPr lang="en-US"/>
           </a:p>
@@ -355,7 +355,7 @@
     </p:spTree>
     <p:extLst>
       <p:ext uri="{BB962C8B-B14F-4D97-AF65-F5344CB8AC3E}">
-        <p14:creationId xmlns:p14="http://schemas.microsoft.com/office/powerpoint/2010/main" xmlns:p="http://schemas.openxmlformats.org/presentationml/2006/main" xmlns:r="http://schemas.openxmlformats.org/officeDocument/2006/relationships" xmlns:a="http://schemas.openxmlformats.org/drawingml/2006/main" xmlns="" val="3084532159"/>
+        <p14:creationId xmlns:p14="http://schemas.microsoft.com/office/powerpoint/2010/main" val="3084532159"/>
       </p:ext>
     </p:extLst>
   </p:cSld>
@@ -366,7 +366,7 @@
 </file>
 
 <file path=ppt/slideLayouts/slideLayout10.xml><?xml version="1.0" encoding="utf-8"?>
-<p:sldLayout xmlns:a="http://schemas.openxmlformats.org/drawingml/2006/main" xmlns:r="http://schemas.openxmlformats.org/officeDocument/2006/relationships" xmlns:mc="http://schemas.openxmlformats.org/markup-compatibility/2006" xmlns:mv="urn:schemas-microsoft-com:mac:vml" xmlns:p="http://schemas.openxmlformats.org/presentationml/2006/main" mc:Ignorable="mv" mc:PreserveAttributes="mv:*" type="vertTx" preserve="1">
+<p:sldLayout xmlns:a="http://schemas.openxmlformats.org/drawingml/2006/main" xmlns:r="http://schemas.openxmlformats.org/officeDocument/2006/relationships" xmlns:p="http://schemas.openxmlformats.org/presentationml/2006/main" type="vertTx" preserve="1">
   <p:cSld name="Title and Vertical Text">
     <p:spTree>
       <p:nvGrpSpPr>
@@ -475,7 +475,7 @@
             <a:fld id="{27CC59BE-5CA4-EB42-882C-C91C96C3157C}" type="datetimeFigureOut">
               <a:rPr lang="en-US" smtClean="0"/>
               <a:pPr/>
-              <a:t>8/13/15</a:t>
+              <a:t>8/16/15</a:t>
             </a:fld>
             <a:endParaRPr lang="en-US"/>
           </a:p>
@@ -527,7 +527,7 @@
     </p:spTree>
     <p:extLst>
       <p:ext uri="{BB962C8B-B14F-4D97-AF65-F5344CB8AC3E}">
-        <p14:creationId xmlns:p14="http://schemas.microsoft.com/office/powerpoint/2010/main" xmlns:p="http://schemas.openxmlformats.org/presentationml/2006/main" xmlns:r="http://schemas.openxmlformats.org/officeDocument/2006/relationships" xmlns:a="http://schemas.openxmlformats.org/drawingml/2006/main" xmlns="" val="3531317346"/>
+        <p14:creationId xmlns:p14="http://schemas.microsoft.com/office/powerpoint/2010/main" val="3531317346"/>
       </p:ext>
     </p:extLst>
   </p:cSld>
@@ -538,7 +538,7 @@
 </file>
 
 <file path=ppt/slideLayouts/slideLayout11.xml><?xml version="1.0" encoding="utf-8"?>
-<p:sldLayout xmlns:a="http://schemas.openxmlformats.org/drawingml/2006/main" xmlns:r="http://schemas.openxmlformats.org/officeDocument/2006/relationships" xmlns:mc="http://schemas.openxmlformats.org/markup-compatibility/2006" xmlns:mv="urn:schemas-microsoft-com:mac:vml" xmlns:p="http://schemas.openxmlformats.org/presentationml/2006/main" mc:Ignorable="mv" mc:PreserveAttributes="mv:*" type="vertTitleAndTx" preserve="1">
+<p:sldLayout xmlns:a="http://schemas.openxmlformats.org/drawingml/2006/main" xmlns:r="http://schemas.openxmlformats.org/officeDocument/2006/relationships" xmlns:p="http://schemas.openxmlformats.org/presentationml/2006/main" type="vertTitleAndTx" preserve="1">
   <p:cSld name="Vertical Title and Text">
     <p:spTree>
       <p:nvGrpSpPr>
@@ -657,7 +657,7 @@
             <a:fld id="{27CC59BE-5CA4-EB42-882C-C91C96C3157C}" type="datetimeFigureOut">
               <a:rPr lang="en-US" smtClean="0"/>
               <a:pPr/>
-              <a:t>8/13/15</a:t>
+              <a:t>8/16/15</a:t>
             </a:fld>
             <a:endParaRPr lang="en-US"/>
           </a:p>
@@ -709,7 +709,7 @@
     </p:spTree>
     <p:extLst>
       <p:ext uri="{BB962C8B-B14F-4D97-AF65-F5344CB8AC3E}">
-        <p14:creationId xmlns:p14="http://schemas.microsoft.com/office/powerpoint/2010/main" xmlns:p="http://schemas.openxmlformats.org/presentationml/2006/main" xmlns:r="http://schemas.openxmlformats.org/officeDocument/2006/relationships" xmlns:a="http://schemas.openxmlformats.org/drawingml/2006/main" xmlns="" val="4046418827"/>
+        <p14:creationId xmlns:p14="http://schemas.microsoft.com/office/powerpoint/2010/main" val="4046418827"/>
       </p:ext>
     </p:extLst>
   </p:cSld>
@@ -720,7 +720,7 @@
 </file>
 
 <file path=ppt/slideLayouts/slideLayout2.xml><?xml version="1.0" encoding="utf-8"?>
-<p:sldLayout xmlns:a="http://schemas.openxmlformats.org/drawingml/2006/main" xmlns:r="http://schemas.openxmlformats.org/officeDocument/2006/relationships" xmlns:mc="http://schemas.openxmlformats.org/markup-compatibility/2006" xmlns:mv="urn:schemas-microsoft-com:mac:vml" xmlns:p="http://schemas.openxmlformats.org/presentationml/2006/main" mc:Ignorable="mv" mc:PreserveAttributes="mv:*" type="obj" preserve="1">
+<p:sldLayout xmlns:a="http://schemas.openxmlformats.org/drawingml/2006/main" xmlns:r="http://schemas.openxmlformats.org/officeDocument/2006/relationships" xmlns:p="http://schemas.openxmlformats.org/presentationml/2006/main" type="obj" preserve="1">
   <p:cSld name="Title and Content">
     <p:spTree>
       <p:nvGrpSpPr>
@@ -829,7 +829,7 @@
             <a:fld id="{27CC59BE-5CA4-EB42-882C-C91C96C3157C}" type="datetimeFigureOut">
               <a:rPr lang="en-US" smtClean="0"/>
               <a:pPr/>
-              <a:t>8/13/15</a:t>
+              <a:t>8/16/15</a:t>
             </a:fld>
             <a:endParaRPr lang="en-US"/>
           </a:p>
@@ -881,7 +881,7 @@
     </p:spTree>
     <p:extLst>
       <p:ext uri="{BB962C8B-B14F-4D97-AF65-F5344CB8AC3E}">
-        <p14:creationId xmlns:p14="http://schemas.microsoft.com/office/powerpoint/2010/main" xmlns:p="http://schemas.openxmlformats.org/presentationml/2006/main" xmlns:r="http://schemas.openxmlformats.org/officeDocument/2006/relationships" xmlns:a="http://schemas.openxmlformats.org/drawingml/2006/main" xmlns="" val="460291916"/>
+        <p14:creationId xmlns:p14="http://schemas.microsoft.com/office/powerpoint/2010/main" val="460291916"/>
       </p:ext>
     </p:extLst>
   </p:cSld>
@@ -892,7 +892,7 @@
 </file>
 
 <file path=ppt/slideLayouts/slideLayout3.xml><?xml version="1.0" encoding="utf-8"?>
-<p:sldLayout xmlns:a="http://schemas.openxmlformats.org/drawingml/2006/main" xmlns:r="http://schemas.openxmlformats.org/officeDocument/2006/relationships" xmlns:mc="http://schemas.openxmlformats.org/markup-compatibility/2006" xmlns:mv="urn:schemas-microsoft-com:mac:vml" xmlns:p="http://schemas.openxmlformats.org/presentationml/2006/main" mc:Ignorable="mv" mc:PreserveAttributes="mv:*" type="secHead" preserve="1">
+<p:sldLayout xmlns:a="http://schemas.openxmlformats.org/drawingml/2006/main" xmlns:r="http://schemas.openxmlformats.org/officeDocument/2006/relationships" xmlns:p="http://schemas.openxmlformats.org/presentationml/2006/main" type="secHead" preserve="1">
   <p:cSld name="Section Header">
     <p:spTree>
       <p:nvGrpSpPr>
@@ -1077,7 +1077,7 @@
             <a:fld id="{27CC59BE-5CA4-EB42-882C-C91C96C3157C}" type="datetimeFigureOut">
               <a:rPr lang="en-US" smtClean="0"/>
               <a:pPr/>
-              <a:t>8/13/15</a:t>
+              <a:t>8/16/15</a:t>
             </a:fld>
             <a:endParaRPr lang="en-US"/>
           </a:p>
@@ -1129,7 +1129,7 @@
     </p:spTree>
     <p:extLst>
       <p:ext uri="{BB962C8B-B14F-4D97-AF65-F5344CB8AC3E}">
-        <p14:creationId xmlns:p14="http://schemas.microsoft.com/office/powerpoint/2010/main" xmlns:p="http://schemas.openxmlformats.org/presentationml/2006/main" xmlns:r="http://schemas.openxmlformats.org/officeDocument/2006/relationships" xmlns:a="http://schemas.openxmlformats.org/drawingml/2006/main" xmlns="" val="1484421398"/>
+        <p14:creationId xmlns:p14="http://schemas.microsoft.com/office/powerpoint/2010/main" val="1484421398"/>
       </p:ext>
     </p:extLst>
   </p:cSld>
@@ -1140,7 +1140,7 @@
 </file>
 
 <file path=ppt/slideLayouts/slideLayout4.xml><?xml version="1.0" encoding="utf-8"?>
-<p:sldLayout xmlns:a="http://schemas.openxmlformats.org/drawingml/2006/main" xmlns:r="http://schemas.openxmlformats.org/officeDocument/2006/relationships" xmlns:mc="http://schemas.openxmlformats.org/markup-compatibility/2006" xmlns:mv="urn:schemas-microsoft-com:mac:vml" xmlns:p="http://schemas.openxmlformats.org/presentationml/2006/main" mc:Ignorable="mv" mc:PreserveAttributes="mv:*" type="twoObj" preserve="1">
+<p:sldLayout xmlns:a="http://schemas.openxmlformats.org/drawingml/2006/main" xmlns:r="http://schemas.openxmlformats.org/officeDocument/2006/relationships" xmlns:p="http://schemas.openxmlformats.org/presentationml/2006/main" type="twoObj" preserve="1">
   <p:cSld name="Two Content">
     <p:spTree>
       <p:nvGrpSpPr>
@@ -1367,7 +1367,7 @@
             <a:fld id="{27CC59BE-5CA4-EB42-882C-C91C96C3157C}" type="datetimeFigureOut">
               <a:rPr lang="en-US" smtClean="0"/>
               <a:pPr/>
-              <a:t>8/13/15</a:t>
+              <a:t>8/16/15</a:t>
             </a:fld>
             <a:endParaRPr lang="en-US"/>
           </a:p>
@@ -1419,7 +1419,7 @@
     </p:spTree>
     <p:extLst>
       <p:ext uri="{BB962C8B-B14F-4D97-AF65-F5344CB8AC3E}">
-        <p14:creationId xmlns:p14="http://schemas.microsoft.com/office/powerpoint/2010/main" xmlns:p="http://schemas.openxmlformats.org/presentationml/2006/main" xmlns:r="http://schemas.openxmlformats.org/officeDocument/2006/relationships" xmlns:a="http://schemas.openxmlformats.org/drawingml/2006/main" xmlns="" val="1864719650"/>
+        <p14:creationId xmlns:p14="http://schemas.microsoft.com/office/powerpoint/2010/main" val="1864719650"/>
       </p:ext>
     </p:extLst>
   </p:cSld>
@@ -1430,7 +1430,7 @@
 </file>
 
 <file path=ppt/slideLayouts/slideLayout5.xml><?xml version="1.0" encoding="utf-8"?>
-<p:sldLayout xmlns:a="http://schemas.openxmlformats.org/drawingml/2006/main" xmlns:r="http://schemas.openxmlformats.org/officeDocument/2006/relationships" xmlns:mc="http://schemas.openxmlformats.org/markup-compatibility/2006" xmlns:mv="urn:schemas-microsoft-com:mac:vml" xmlns:p="http://schemas.openxmlformats.org/presentationml/2006/main" mc:Ignorable="mv" mc:PreserveAttributes="mv:*" type="twoTxTwoObj" preserve="1">
+<p:sldLayout xmlns:a="http://schemas.openxmlformats.org/drawingml/2006/main" xmlns:r="http://schemas.openxmlformats.org/officeDocument/2006/relationships" xmlns:p="http://schemas.openxmlformats.org/presentationml/2006/main" type="twoTxTwoObj" preserve="1">
   <p:cSld name="Comparison">
     <p:spTree>
       <p:nvGrpSpPr>
@@ -1791,7 +1791,7 @@
             <a:fld id="{27CC59BE-5CA4-EB42-882C-C91C96C3157C}" type="datetimeFigureOut">
               <a:rPr lang="en-US" smtClean="0"/>
               <a:pPr/>
-              <a:t>8/13/15</a:t>
+              <a:t>8/16/15</a:t>
             </a:fld>
             <a:endParaRPr lang="en-US"/>
           </a:p>
@@ -1843,7 +1843,7 @@
     </p:spTree>
     <p:extLst>
       <p:ext uri="{BB962C8B-B14F-4D97-AF65-F5344CB8AC3E}">
-        <p14:creationId xmlns:p14="http://schemas.microsoft.com/office/powerpoint/2010/main" xmlns:p="http://schemas.openxmlformats.org/presentationml/2006/main" xmlns:r="http://schemas.openxmlformats.org/officeDocument/2006/relationships" xmlns:a="http://schemas.openxmlformats.org/drawingml/2006/main" xmlns="" val="4277993087"/>
+        <p14:creationId xmlns:p14="http://schemas.microsoft.com/office/powerpoint/2010/main" val="4277993087"/>
       </p:ext>
     </p:extLst>
   </p:cSld>
@@ -1854,7 +1854,7 @@
 </file>
 
 <file path=ppt/slideLayouts/slideLayout6.xml><?xml version="1.0" encoding="utf-8"?>
-<p:sldLayout xmlns:a="http://schemas.openxmlformats.org/drawingml/2006/main" xmlns:r="http://schemas.openxmlformats.org/officeDocument/2006/relationships" xmlns:mc="http://schemas.openxmlformats.org/markup-compatibility/2006" xmlns:mv="urn:schemas-microsoft-com:mac:vml" xmlns:p="http://schemas.openxmlformats.org/presentationml/2006/main" mc:Ignorable="mv" mc:PreserveAttributes="mv:*" type="titleOnly" preserve="1">
+<p:sldLayout xmlns:a="http://schemas.openxmlformats.org/drawingml/2006/main" xmlns:r="http://schemas.openxmlformats.org/officeDocument/2006/relationships" xmlns:p="http://schemas.openxmlformats.org/presentationml/2006/main" type="titleOnly" preserve="1">
   <p:cSld name="Title Only">
     <p:spTree>
       <p:nvGrpSpPr>
@@ -1911,7 +1911,7 @@
             <a:fld id="{27CC59BE-5CA4-EB42-882C-C91C96C3157C}" type="datetimeFigureOut">
               <a:rPr lang="en-US" smtClean="0"/>
               <a:pPr/>
-              <a:t>8/13/15</a:t>
+              <a:t>8/16/15</a:t>
             </a:fld>
             <a:endParaRPr lang="en-US"/>
           </a:p>
@@ -1963,7 +1963,7 @@
     </p:spTree>
     <p:extLst>
       <p:ext uri="{BB962C8B-B14F-4D97-AF65-F5344CB8AC3E}">
-        <p14:creationId xmlns:p14="http://schemas.microsoft.com/office/powerpoint/2010/main" xmlns:p="http://schemas.openxmlformats.org/presentationml/2006/main" xmlns:r="http://schemas.openxmlformats.org/officeDocument/2006/relationships" xmlns:a="http://schemas.openxmlformats.org/drawingml/2006/main" xmlns="" val="4042041371"/>
+        <p14:creationId xmlns:p14="http://schemas.microsoft.com/office/powerpoint/2010/main" val="4042041371"/>
       </p:ext>
     </p:extLst>
   </p:cSld>
@@ -1974,7 +1974,7 @@
 </file>
 
 <file path=ppt/slideLayouts/slideLayout7.xml><?xml version="1.0" encoding="utf-8"?>
-<p:sldLayout xmlns:a="http://schemas.openxmlformats.org/drawingml/2006/main" xmlns:r="http://schemas.openxmlformats.org/officeDocument/2006/relationships" xmlns:mc="http://schemas.openxmlformats.org/markup-compatibility/2006" xmlns:mv="urn:schemas-microsoft-com:mac:vml" xmlns:p="http://schemas.openxmlformats.org/presentationml/2006/main" mc:Ignorable="mv" mc:PreserveAttributes="mv:*" type="blank" preserve="1">
+<p:sldLayout xmlns:a="http://schemas.openxmlformats.org/drawingml/2006/main" xmlns:r="http://schemas.openxmlformats.org/officeDocument/2006/relationships" xmlns:p="http://schemas.openxmlformats.org/presentationml/2006/main" type="blank" preserve="1">
   <p:cSld name="Blank">
     <p:spTree>
       <p:nvGrpSpPr>
@@ -2008,7 +2008,7 @@
             <a:fld id="{27CC59BE-5CA4-EB42-882C-C91C96C3157C}" type="datetimeFigureOut">
               <a:rPr lang="en-US" smtClean="0"/>
               <a:pPr/>
-              <a:t>8/13/15</a:t>
+              <a:t>8/16/15</a:t>
             </a:fld>
             <a:endParaRPr lang="en-US"/>
           </a:p>
@@ -2060,7 +2060,7 @@
     </p:spTree>
     <p:extLst>
       <p:ext uri="{BB962C8B-B14F-4D97-AF65-F5344CB8AC3E}">
-        <p14:creationId xmlns:p14="http://schemas.microsoft.com/office/powerpoint/2010/main" xmlns:p="http://schemas.openxmlformats.org/presentationml/2006/main" xmlns:r="http://schemas.openxmlformats.org/officeDocument/2006/relationships" xmlns:a="http://schemas.openxmlformats.org/drawingml/2006/main" xmlns="" val="125280488"/>
+        <p14:creationId xmlns:p14="http://schemas.microsoft.com/office/powerpoint/2010/main" val="125280488"/>
       </p:ext>
     </p:extLst>
   </p:cSld>
@@ -2071,7 +2071,7 @@
 </file>
 
 <file path=ppt/slideLayouts/slideLayout8.xml><?xml version="1.0" encoding="utf-8"?>
-<p:sldLayout xmlns:a="http://schemas.openxmlformats.org/drawingml/2006/main" xmlns:r="http://schemas.openxmlformats.org/officeDocument/2006/relationships" xmlns:mc="http://schemas.openxmlformats.org/markup-compatibility/2006" xmlns:mv="urn:schemas-microsoft-com:mac:vml" xmlns:p="http://schemas.openxmlformats.org/presentationml/2006/main" mc:Ignorable="mv" mc:PreserveAttributes="mv:*" type="objTx" preserve="1">
+<p:sldLayout xmlns:a="http://schemas.openxmlformats.org/drawingml/2006/main" xmlns:r="http://schemas.openxmlformats.org/officeDocument/2006/relationships" xmlns:p="http://schemas.openxmlformats.org/presentationml/2006/main" type="objTx" preserve="1">
   <p:cSld name="Content with Caption">
     <p:spTree>
       <p:nvGrpSpPr>
@@ -2287,7 +2287,7 @@
             <a:fld id="{27CC59BE-5CA4-EB42-882C-C91C96C3157C}" type="datetimeFigureOut">
               <a:rPr lang="en-US" smtClean="0"/>
               <a:pPr/>
-              <a:t>8/13/15</a:t>
+              <a:t>8/16/15</a:t>
             </a:fld>
             <a:endParaRPr lang="en-US"/>
           </a:p>
@@ -2339,7 +2339,7 @@
     </p:spTree>
     <p:extLst>
       <p:ext uri="{BB962C8B-B14F-4D97-AF65-F5344CB8AC3E}">
-        <p14:creationId xmlns:p14="http://schemas.microsoft.com/office/powerpoint/2010/main" xmlns:p="http://schemas.openxmlformats.org/presentationml/2006/main" xmlns:r="http://schemas.openxmlformats.org/officeDocument/2006/relationships" xmlns:a="http://schemas.openxmlformats.org/drawingml/2006/main" xmlns="" val="1935715591"/>
+        <p14:creationId xmlns:p14="http://schemas.microsoft.com/office/powerpoint/2010/main" val="1935715591"/>
       </p:ext>
     </p:extLst>
   </p:cSld>
@@ -2350,7 +2350,7 @@
 </file>
 
 <file path=ppt/slideLayouts/slideLayout9.xml><?xml version="1.0" encoding="utf-8"?>
-<p:sldLayout xmlns:a="http://schemas.openxmlformats.org/drawingml/2006/main" xmlns:r="http://schemas.openxmlformats.org/officeDocument/2006/relationships" xmlns:mc="http://schemas.openxmlformats.org/markup-compatibility/2006" xmlns:mv="urn:schemas-microsoft-com:mac:vml" xmlns:p="http://schemas.openxmlformats.org/presentationml/2006/main" mc:Ignorable="mv" mc:PreserveAttributes="mv:*" type="picTx" preserve="1">
+<p:sldLayout xmlns:a="http://schemas.openxmlformats.org/drawingml/2006/main" xmlns:r="http://schemas.openxmlformats.org/officeDocument/2006/relationships" xmlns:p="http://schemas.openxmlformats.org/presentationml/2006/main" type="picTx" preserve="1">
   <p:cSld name="Picture with Caption">
     <p:spTree>
       <p:nvGrpSpPr>
@@ -2542,7 +2542,7 @@
             <a:fld id="{27CC59BE-5CA4-EB42-882C-C91C96C3157C}" type="datetimeFigureOut">
               <a:rPr lang="en-US" smtClean="0"/>
               <a:pPr/>
-              <a:t>8/13/15</a:t>
+              <a:t>8/16/15</a:t>
             </a:fld>
             <a:endParaRPr lang="en-US"/>
           </a:p>
@@ -2594,7 +2594,7 @@
     </p:spTree>
     <p:extLst>
       <p:ext uri="{BB962C8B-B14F-4D97-AF65-F5344CB8AC3E}">
-        <p14:creationId xmlns:p14="http://schemas.microsoft.com/office/powerpoint/2010/main" xmlns:p="http://schemas.openxmlformats.org/presentationml/2006/main" xmlns:r="http://schemas.openxmlformats.org/officeDocument/2006/relationships" xmlns:a="http://schemas.openxmlformats.org/drawingml/2006/main" xmlns="" val="2683771203"/>
+        <p14:creationId xmlns:p14="http://schemas.microsoft.com/office/powerpoint/2010/main" val="2683771203"/>
       </p:ext>
     </p:extLst>
   </p:cSld>
@@ -2605,7 +2605,7 @@
 </file>
 
 <file path=ppt/slideMasters/slideMaster1.xml><?xml version="1.0" encoding="utf-8"?>
-<p:sldMaster xmlns:a="http://schemas.openxmlformats.org/drawingml/2006/main" xmlns:r="http://schemas.openxmlformats.org/officeDocument/2006/relationships" xmlns:mc="http://schemas.openxmlformats.org/markup-compatibility/2006" xmlns:mv="urn:schemas-microsoft-com:mac:vml" xmlns:p="http://schemas.openxmlformats.org/presentationml/2006/main" mc:Ignorable="mv" mc:PreserveAttributes="mv:*">
+<p:sldMaster xmlns:a="http://schemas.openxmlformats.org/drawingml/2006/main" xmlns:r="http://schemas.openxmlformats.org/officeDocument/2006/relationships" xmlns:p="http://schemas.openxmlformats.org/presentationml/2006/main">
   <p:cSld>
     <p:bg>
       <p:bgRef idx="1001">
@@ -2757,7 +2757,7 @@
             <a:fld id="{27CC59BE-5CA4-EB42-882C-C91C96C3157C}" type="datetimeFigureOut">
               <a:rPr lang="en-US" smtClean="0"/>
               <a:pPr/>
-              <a:t>8/13/15</a:t>
+              <a:t>8/16/15</a:t>
             </a:fld>
             <a:endParaRPr lang="en-US"/>
           </a:p>
@@ -2845,7 +2845,7 @@
     </p:spTree>
     <p:extLst>
       <p:ext uri="{BB962C8B-B14F-4D97-AF65-F5344CB8AC3E}">
-        <p14:creationId xmlns:p14="http://schemas.microsoft.com/office/powerpoint/2010/main" xmlns:p="http://schemas.openxmlformats.org/presentationml/2006/main" xmlns:r="http://schemas.openxmlformats.org/officeDocument/2006/relationships" xmlns:a="http://schemas.openxmlformats.org/drawingml/2006/main" xmlns="" val="1951734514"/>
+        <p14:creationId xmlns:p14="http://schemas.microsoft.com/office/powerpoint/2010/main" val="1951734514"/>
       </p:ext>
     </p:extLst>
   </p:cSld>
@@ -3117,7 +3117,7 @@
 </file>
 
 <file path=ppt/slides/slide1.xml><?xml version="1.0" encoding="utf-8"?>
-<p:sld xmlns:a="http://schemas.openxmlformats.org/drawingml/2006/main" xmlns:r="http://schemas.openxmlformats.org/officeDocument/2006/relationships" xmlns:mc="http://schemas.openxmlformats.org/markup-compatibility/2006" xmlns:mv="urn:schemas-microsoft-com:mac:vml" xmlns:p="http://schemas.openxmlformats.org/presentationml/2006/main" mc:Ignorable="mv" mc:PreserveAttributes="mv:*">
+<p:sld xmlns:a="http://schemas.openxmlformats.org/drawingml/2006/main" xmlns:r="http://schemas.openxmlformats.org/officeDocument/2006/relationships" xmlns:p="http://schemas.openxmlformats.org/presentationml/2006/main">
   <p:cSld>
     <p:spTree>
       <p:nvGrpSpPr>
@@ -3234,7 +3234,7 @@
         </p:blipFill>
         <p:spPr>
           <a:xfrm>
-            <a:off x="-37123" y="6320775"/>
+            <a:off x="1364" y="6333603"/>
             <a:ext cx="1007300" cy="537228"/>
           </a:xfrm>
           <a:prstGeom prst="rect">
@@ -3269,7 +3269,7 @@
     </p:spTree>
     <p:extLst>
       <p:ext uri="{BB962C8B-B14F-4D97-AF65-F5344CB8AC3E}">
-        <p14:creationId xmlns:p14="http://schemas.microsoft.com/office/powerpoint/2010/main" xmlns:p="http://schemas.openxmlformats.org/presentationml/2006/main" xmlns:r="http://schemas.openxmlformats.org/officeDocument/2006/relationships" xmlns:a="http://schemas.openxmlformats.org/drawingml/2006/main" xmlns="" val="1056881747"/>
+        <p14:creationId xmlns:p14="http://schemas.microsoft.com/office/powerpoint/2010/main" val="1056881747"/>
       </p:ext>
     </p:extLst>
   </p:cSld>
@@ -3279,7 +3279,7 @@
   <p:timing>
     <p:tnLst>
       <p:par>
-        <p:cTn id="1" dur="indefinite" restart="never" nodeType="tmRoot"/>
+        <p:cTn xmlns:p14="http://schemas.microsoft.com/office/powerpoint/2010/main" id="1" dur="indefinite" restart="never" nodeType="tmRoot"/>
       </p:par>
     </p:tnLst>
   </p:timing>
@@ -3287,7 +3287,7 @@
 </file>
 
 <file path=ppt/slides/slide10.xml><?xml version="1.0" encoding="utf-8"?>
-<p:sld xmlns:a="http://schemas.openxmlformats.org/drawingml/2006/main" xmlns:r="http://schemas.openxmlformats.org/officeDocument/2006/relationships" xmlns:mc="http://schemas.openxmlformats.org/markup-compatibility/2006" xmlns:mv="urn:schemas-microsoft-com:mac:vml" xmlns:p="http://schemas.openxmlformats.org/presentationml/2006/main" mc:Ignorable="mv" mc:PreserveAttributes="mv:*">
+<p:sld xmlns:a="http://schemas.openxmlformats.org/drawingml/2006/main" xmlns:r="http://schemas.openxmlformats.org/officeDocument/2006/relationships" xmlns:p="http://schemas.openxmlformats.org/presentationml/2006/main">
   <p:cSld>
     <p:spTree>
       <p:nvGrpSpPr>
@@ -3325,12 +3325,12 @@
               <a:t>QBETS: </a:t>
             </a:r>
             <a:r>
-              <a:rPr lang="en-US" dirty="0" err="1" smtClean="0"/>
-              <a:t>Quantile</a:t>
-            </a:r>
-            <a:r>
-              <a:rPr lang="en-US" dirty="0" smtClean="0"/>
-              <a:t> Bounds Estimation from Time Series</a:t>
+              <a:rPr lang="en-US" dirty="0" smtClean="0"/>
+              <a:t>Queue </a:t>
+            </a:r>
+            <a:r>
+              <a:rPr lang="en-US" dirty="0" smtClean="0"/>
+              <a:t>Bounds Estimation from Time Series</a:t>
             </a:r>
             <a:endParaRPr lang="en-US" dirty="0"/>
           </a:p>
@@ -3349,45 +3349,38 @@
         <p:spPr/>
         <p:txBody>
           <a:bodyPr>
-            <a:normAutofit fontScale="70000" lnSpcReduction="20000"/>
+            <a:normAutofit fontScale="92500" lnSpcReduction="10000"/>
           </a:bodyPr>
           <a:lstStyle/>
           <a:p>
             <a:r>
               <a:rPr lang="en-US" dirty="0" smtClean="0"/>
-              <a:t>Predicts instantaneous bounds on the </a:t>
-            </a:r>
-            <a:r>
-              <a:rPr lang="en-US" dirty="0" err="1" smtClean="0"/>
-              <a:t>quantiles</a:t>
-            </a:r>
-            <a:r>
-              <a:rPr lang="en-US" dirty="0" smtClean="0"/>
-              <a:t> of “current” distribution in a time series</a:t>
-            </a:r>
-          </a:p>
-          <a:p>
-            <a:pPr lvl="1"/>
-            <a:r>
-              <a:rPr lang="en-US" dirty="0" smtClean="0"/>
-              <a:t>Non-parametric – based on Binomial analysis</a:t>
-            </a:r>
-            <a:endParaRPr lang="en-US" dirty="0" smtClean="0"/>
-          </a:p>
-          <a:p>
-            <a:pPr lvl="1"/>
-            <a:r>
-              <a:rPr lang="en-US" dirty="0" smtClean="0"/>
-              <a:t>Accounts for autocorrelation and change-points</a:t>
-            </a:r>
-          </a:p>
-          <a:p>
-            <a:pPr lvl="1"/>
-            <a:r>
-              <a:rPr lang="en-US" dirty="0" smtClean="0"/>
-              <a:t>Efficient on-line implementation</a:t>
-            </a:r>
-            <a:endParaRPr lang="en-US" dirty="0" smtClean="0"/>
+              <a:t>Predicts </a:t>
+            </a:r>
+            <a:r>
+              <a:rPr lang="en-US" dirty="0" smtClean="0"/>
+              <a:t>instantaneous bounds </a:t>
+            </a:r>
+            <a:r>
+              <a:rPr lang="en-US" dirty="0" smtClean="0"/>
+              <a:t>on the </a:t>
+            </a:r>
+            <a:r>
+              <a:rPr lang="en-US" dirty="0" smtClean="0"/>
+              <a:t>percentiles </a:t>
+            </a:r>
+            <a:r>
+              <a:rPr lang="en-US" dirty="0" smtClean="0"/>
+              <a:t>of </a:t>
+            </a:r>
+            <a:r>
+              <a:rPr lang="en-US" dirty="0" smtClean="0"/>
+              <a:t>a </a:t>
+            </a:r>
+            <a:r>
+              <a:rPr lang="en-US" dirty="0" smtClean="0"/>
+              <a:t>time series</a:t>
+            </a:r>
           </a:p>
           <a:p>
             <a:r>
@@ -3495,29 +3488,25 @@
             </a:r>
             <a:r>
               <a:rPr lang="en-US" i="1" dirty="0" smtClean="0"/>
-              <a:t> ≤ Q)</a:t>
+              <a:t> ≤ Q) </a:t>
             </a:r>
             <a:r>
               <a:rPr lang="en-US" i="1" dirty="0" smtClean="0"/>
-              <a:t> &lt;= </a:t>
-            </a:r>
-            <a:r>
-              <a:rPr lang="en-US" i="1" dirty="0" err="1" smtClean="0"/>
+              <a:t>≥ </a:t>
+            </a:r>
+            <a:r>
+              <a:rPr lang="en-US" i="1" dirty="0" smtClean="0"/>
               <a:t>p</a:t>
             </a:r>
-            <a:endParaRPr lang="en-US" i="1" dirty="0" smtClean="0"/>
-          </a:p>
-          <a:p>
-            <a:r>
-              <a:rPr lang="en-US" dirty="0" smtClean="0"/>
-              <a:t>Originally developed for HPC systems to predict bounds on batch queue waiting times</a:t>
-            </a:r>
-            <a:endParaRPr lang="en-US" i="1" dirty="0" smtClean="0"/>
-          </a:p>
-          <a:p>
-            <a:r>
-              <a:rPr lang="en-US" dirty="0" smtClean="0"/>
-              <a:t>Cerebro uses QBETS to predict response time SLAs of the form:</a:t>
+          </a:p>
+          <a:p>
+            <a:r>
+              <a:rPr lang="en-US" dirty="0" smtClean="0"/>
+              <a:t>Cerebro </a:t>
+            </a:r>
+            <a:r>
+              <a:rPr lang="en-US" dirty="0" smtClean="0"/>
+              <a:t>uses QBETS to predict response time SLAs of the form:</a:t>
             </a:r>
           </a:p>
           <a:p>
@@ -3548,14 +3537,14 @@
             </a:r>
             <a:r>
               <a:rPr lang="en-US" dirty="0" smtClean="0"/>
-              <a:t> milliseconds</a:t>
-            </a:r>
-            <a:r>
-              <a:rPr lang="en-US" dirty="0" smtClean="0"/>
-              <a:t> (100*</a:t>
-            </a:r>
-            <a:r>
-              <a:rPr lang="en-US" i="1" dirty="0" err="1" smtClean="0"/>
+              <a:t> milliseconds (</a:t>
+            </a:r>
+            <a:r>
+              <a:rPr lang="en-US" dirty="0" smtClean="0"/>
+              <a:t>100</a:t>
+            </a:r>
+            <a:r>
+              <a:rPr lang="en-US" i="1" dirty="0" smtClean="0"/>
               <a:t>p</a:t>
             </a:r>
             <a:r>
@@ -3564,11 +3553,7 @@
             </a:r>
             <a:r>
               <a:rPr lang="en-US" dirty="0" smtClean="0"/>
-              <a:t> </a:t>
-            </a:r>
-            <a:r>
-              <a:rPr lang="en-US" dirty="0" smtClean="0"/>
-              <a:t>of the time</a:t>
+              <a:t> of the time</a:t>
             </a:r>
             <a:endParaRPr lang="en-US" dirty="0"/>
           </a:p>
@@ -3577,7 +3562,7 @@
     </p:spTree>
     <p:extLst>
       <p:ext uri="{BB962C8B-B14F-4D97-AF65-F5344CB8AC3E}">
-        <p14:creationId xmlns:p14="http://schemas.microsoft.com/office/powerpoint/2010/main" xmlns:p="http://schemas.openxmlformats.org/presentationml/2006/main" xmlns:r="http://schemas.openxmlformats.org/officeDocument/2006/relationships" xmlns:a="http://schemas.openxmlformats.org/drawingml/2006/main" xmlns="" val="4294412330"/>
+        <p14:creationId xmlns:p14="http://schemas.microsoft.com/office/powerpoint/2010/main" val="4294412330"/>
       </p:ext>
     </p:extLst>
   </p:cSld>
@@ -3587,7 +3572,7 @@
   <p:timing>
     <p:tnLst>
       <p:par>
-        <p:cTn id="1" dur="indefinite" restart="never" nodeType="tmRoot"/>
+        <p:cTn xmlns:p14="http://schemas.microsoft.com/office/powerpoint/2010/main" id="1" dur="indefinite" restart="never" nodeType="tmRoot"/>
       </p:par>
     </p:tnLst>
   </p:timing>
@@ -3595,7 +3580,7 @@
 </file>
 
 <file path=ppt/slides/slide11.xml><?xml version="1.0" encoding="utf-8"?>
-<p:sld xmlns:a="http://schemas.openxmlformats.org/drawingml/2006/main" xmlns:r="http://schemas.openxmlformats.org/officeDocument/2006/relationships" xmlns:mc="http://schemas.openxmlformats.org/markup-compatibility/2006" xmlns:mv="urn:schemas-microsoft-com:mac:vml" xmlns:p="http://schemas.openxmlformats.org/presentationml/2006/main" mc:Ignorable="mv" mc:PreserveAttributes="mv:*">
+<p:sld xmlns:a="http://schemas.openxmlformats.org/drawingml/2006/main" xmlns:r="http://schemas.openxmlformats.org/officeDocument/2006/relationships" xmlns:p="http://schemas.openxmlformats.org/presentationml/2006/main">
   <p:cSld>
     <p:spTree>
       <p:nvGrpSpPr>
@@ -3647,7 +3632,7 @@
         <p:spPr/>
         <p:txBody>
           <a:bodyPr>
-            <a:normAutofit fontScale="92500" lnSpcReduction="10000"/>
+            <a:normAutofit lnSpcReduction="10000"/>
           </a:bodyPr>
           <a:lstStyle/>
           <a:p>
@@ -3679,24 +3664,17 @@
             </a:r>
             <a:r>
               <a:rPr lang="en-US" dirty="0" smtClean="0"/>
-              <a:t> private cloud (running on a 4-node Eucalyptus cluster</a:t>
-            </a:r>
-            <a:r>
-              <a:rPr lang="en-US" dirty="0" smtClean="0"/>
-              <a:t>)</a:t>
-            </a:r>
-          </a:p>
-          <a:p>
-            <a:pPr lvl="1"/>
-            <a:r>
-              <a:rPr lang="en-US" dirty="0" smtClean="0"/>
-              <a:t>Dates: from XXX to XXX</a:t>
-            </a:r>
-          </a:p>
-          <a:p>
-            <a:r>
-              <a:rPr lang="en-US" dirty="0" smtClean="0"/>
-              <a:t>Network delay between client and Google is included but not modeled or predicted explicitly</a:t>
+              <a:t> private cloud (running on a 4-node Eucalyptus cluster)</a:t>
+            </a:r>
+          </a:p>
+          <a:p>
+            <a:r>
+              <a:rPr lang="en-US" dirty="0" smtClean="0"/>
+              <a:t>Network </a:t>
+            </a:r>
+            <a:r>
+              <a:rPr lang="en-US" dirty="0" smtClean="0"/>
+              <a:t>delay between client and Google is included but not modeled or predicted explicitly</a:t>
             </a:r>
           </a:p>
         </p:txBody>
@@ -3704,7 +3682,7 @@
     </p:spTree>
     <p:extLst>
       <p:ext uri="{BB962C8B-B14F-4D97-AF65-F5344CB8AC3E}">
-        <p14:creationId xmlns:p14="http://schemas.microsoft.com/office/powerpoint/2010/main" xmlns:p="http://schemas.openxmlformats.org/presentationml/2006/main" xmlns:r="http://schemas.openxmlformats.org/officeDocument/2006/relationships" xmlns:a="http://schemas.openxmlformats.org/drawingml/2006/main" xmlns="" val="2319692831"/>
+        <p14:creationId xmlns:p14="http://schemas.microsoft.com/office/powerpoint/2010/main" val="2319692831"/>
       </p:ext>
     </p:extLst>
   </p:cSld>
@@ -3714,7 +3692,7 @@
   <p:timing>
     <p:tnLst>
       <p:par>
-        <p:cTn id="1" dur="indefinite" restart="never" nodeType="tmRoot"/>
+        <p:cTn xmlns:p14="http://schemas.microsoft.com/office/powerpoint/2010/main" id="1" dur="indefinite" restart="never" nodeType="tmRoot"/>
       </p:par>
     </p:tnLst>
   </p:timing>
@@ -3722,7 +3700,7 @@
 </file>
 
 <file path=ppt/slides/slide12.xml><?xml version="1.0" encoding="utf-8"?>
-<p:sld xmlns:a="http://schemas.openxmlformats.org/drawingml/2006/main" xmlns:r="http://schemas.openxmlformats.org/officeDocument/2006/relationships" xmlns:mc="http://schemas.openxmlformats.org/markup-compatibility/2006" xmlns:mv="urn:schemas-microsoft-com:mac:vml" xmlns:p="http://schemas.openxmlformats.org/presentationml/2006/main" mc:Ignorable="mv" mc:PreserveAttributes="mv:*">
+<p:sld xmlns:a="http://schemas.openxmlformats.org/drawingml/2006/main" xmlns:r="http://schemas.openxmlformats.org/officeDocument/2006/relationships" xmlns:p="http://schemas.openxmlformats.org/presentationml/2006/main">
   <p:cSld>
     <p:spTree>
       <p:nvGrpSpPr>
@@ -3775,7 +3753,7 @@
           <a:blip r:embed="rId2">
             <a:extLst>
               <a:ext uri="{28A0092B-C50C-407E-A947-70E740481C1C}">
-                <a14:useLocalDpi xmlns:a14="http://schemas.microsoft.com/office/drawing/2010/main" xmlns:p="http://schemas.openxmlformats.org/presentationml/2006/main" xmlns:r="http://schemas.openxmlformats.org/officeDocument/2006/relationships" xmlns:a="http://schemas.openxmlformats.org/drawingml/2006/main" xmlns="" val="0"/>
+                <a14:useLocalDpi xmlns:a14="http://schemas.microsoft.com/office/drawing/2010/main" val="0"/>
               </a:ext>
             </a:extLst>
           </a:blip>
@@ -3794,7 +3772,7 @@
     </p:spTree>
     <p:extLst>
       <p:ext uri="{BB962C8B-B14F-4D97-AF65-F5344CB8AC3E}">
-        <p14:creationId xmlns:p14="http://schemas.microsoft.com/office/powerpoint/2010/main" xmlns:p="http://schemas.openxmlformats.org/presentationml/2006/main" xmlns:r="http://schemas.openxmlformats.org/officeDocument/2006/relationships" xmlns:a="http://schemas.openxmlformats.org/drawingml/2006/main" xmlns="" val="819227144"/>
+        <p14:creationId xmlns:p14="http://schemas.microsoft.com/office/powerpoint/2010/main" val="819227144"/>
       </p:ext>
     </p:extLst>
   </p:cSld>
@@ -3804,7 +3782,7 @@
   <p:timing>
     <p:tnLst>
       <p:par>
-        <p:cTn id="1" dur="indefinite" restart="never" nodeType="tmRoot"/>
+        <p:cTn xmlns:p14="http://schemas.microsoft.com/office/powerpoint/2010/main" id="1" dur="indefinite" restart="never" nodeType="tmRoot"/>
       </p:par>
     </p:tnLst>
   </p:timing>
@@ -3812,7 +3790,7 @@
 </file>
 
 <file path=ppt/slides/slide13.xml><?xml version="1.0" encoding="utf-8"?>
-<p:sld xmlns:a="http://schemas.openxmlformats.org/drawingml/2006/main" xmlns:r="http://schemas.openxmlformats.org/officeDocument/2006/relationships" xmlns:mc="http://schemas.openxmlformats.org/markup-compatibility/2006" xmlns:mv="urn:schemas-microsoft-com:mac:vml" xmlns:p="http://schemas.openxmlformats.org/presentationml/2006/main" mc:Ignorable="mv" mc:PreserveAttributes="mv:*">
+<p:sld xmlns:a="http://schemas.openxmlformats.org/drawingml/2006/main" xmlns:r="http://schemas.openxmlformats.org/officeDocument/2006/relationships" xmlns:p="http://schemas.openxmlformats.org/presentationml/2006/main">
   <p:cSld>
     <p:spTree>
       <p:nvGrpSpPr>
@@ -3865,7 +3843,7 @@
           <a:blip r:embed="rId2">
             <a:extLst>
               <a:ext uri="{28A0092B-C50C-407E-A947-70E740481C1C}">
-                <a14:useLocalDpi xmlns:a14="http://schemas.microsoft.com/office/drawing/2010/main" xmlns:p="http://schemas.openxmlformats.org/presentationml/2006/main" xmlns:r="http://schemas.openxmlformats.org/officeDocument/2006/relationships" xmlns:a="http://schemas.openxmlformats.org/drawingml/2006/main" xmlns="" val="0"/>
+                <a14:useLocalDpi xmlns:a14="http://schemas.microsoft.com/office/drawing/2010/main" val="0"/>
               </a:ext>
             </a:extLst>
           </a:blip>
@@ -3884,7 +3862,7 @@
     </p:spTree>
     <p:extLst>
       <p:ext uri="{BB962C8B-B14F-4D97-AF65-F5344CB8AC3E}">
-        <p14:creationId xmlns:p14="http://schemas.microsoft.com/office/powerpoint/2010/main" xmlns:p="http://schemas.openxmlformats.org/presentationml/2006/main" xmlns:r="http://schemas.openxmlformats.org/officeDocument/2006/relationships" xmlns:a="http://schemas.openxmlformats.org/drawingml/2006/main" xmlns="" val="1944381813"/>
+        <p14:creationId xmlns:p14="http://schemas.microsoft.com/office/powerpoint/2010/main" val="1944381813"/>
       </p:ext>
     </p:extLst>
   </p:cSld>
@@ -3894,7 +3872,7 @@
   <p:timing>
     <p:tnLst>
       <p:par>
-        <p:cTn id="1" dur="indefinite" restart="never" nodeType="tmRoot"/>
+        <p:cTn xmlns:p14="http://schemas.microsoft.com/office/powerpoint/2010/main" id="1" dur="indefinite" restart="never" nodeType="tmRoot"/>
       </p:par>
     </p:tnLst>
   </p:timing>
@@ -3902,7 +3880,7 @@
 </file>
 
 <file path=ppt/slides/slide14.xml><?xml version="1.0" encoding="utf-8"?>
-<p:sld xmlns:a="http://schemas.openxmlformats.org/drawingml/2006/main" xmlns:r="http://schemas.openxmlformats.org/officeDocument/2006/relationships" xmlns:mc="http://schemas.openxmlformats.org/markup-compatibility/2006" xmlns:mv="urn:schemas-microsoft-com:mac:vml" xmlns:p="http://schemas.openxmlformats.org/presentationml/2006/main" mc:Ignorable="mv" mc:PreserveAttributes="mv:*">
+<p:sld xmlns:a="http://schemas.openxmlformats.org/drawingml/2006/main" xmlns:r="http://schemas.openxmlformats.org/officeDocument/2006/relationships" xmlns:p="http://schemas.openxmlformats.org/presentationml/2006/main">
   <p:cSld>
     <p:spTree>
       <p:nvGrpSpPr>
@@ -3931,13 +3909,13 @@
         <p:spPr/>
         <p:txBody>
           <a:bodyPr>
-            <a:normAutofit fontScale="90000"/>
+            <a:normAutofit/>
           </a:bodyPr>
           <a:lstStyle/>
           <a:p>
             <a:r>
               <a:rPr lang="en-US" dirty="0" smtClean="0"/>
-              <a:t>Conclusions, Ongoing, </a:t>
+              <a:t>Conclusions </a:t>
             </a:r>
             <a:r>
               <a:rPr lang="en-US" dirty="0" smtClean="0"/>
@@ -3960,7 +3938,7 @@
         <p:spPr/>
         <p:txBody>
           <a:bodyPr>
-            <a:normAutofit fontScale="85000" lnSpcReduction="10000"/>
+            <a:normAutofit fontScale="92500" lnSpcReduction="10000"/>
           </a:bodyPr>
           <a:lstStyle/>
           <a:p>
@@ -3979,13 +3957,13 @@
               <a:rPr lang="en-US" dirty="0" smtClean="0"/>
               <a:t>Necessary conditions for use in an SLA</a:t>
             </a:r>
+          </a:p>
+          <a:p>
+            <a:r>
+              <a:rPr lang="en-US" dirty="0" smtClean="0"/>
+              <a:t>SLA durability period analysis</a:t>
+            </a:r>
             <a:endParaRPr lang="en-US" dirty="0" smtClean="0"/>
-          </a:p>
-          <a:p>
-            <a:r>
-              <a:rPr lang="en-US" dirty="0" smtClean="0"/>
-              <a:t>Average durability:</a:t>
-            </a:r>
           </a:p>
           <a:p>
             <a:pPr lvl="1"/>
@@ -4008,29 +3986,11 @@
           <a:p>
             <a:r>
               <a:rPr lang="en-US" dirty="0" smtClean="0"/>
-              <a:t>More long term analysis of SLA</a:t>
-            </a:r>
-            <a:r>
-              <a:rPr lang="en-US" dirty="0" smtClean="0"/>
-              <a:t> durability periods</a:t>
-            </a:r>
-            <a:r>
-              <a:rPr lang="en-US" dirty="0" smtClean="0"/>
-              <a:t>, and automatic SLA renegotiation</a:t>
-            </a:r>
-          </a:p>
-          <a:p>
-            <a:r>
-              <a:rPr lang="en-US" dirty="0" smtClean="0"/>
-              <a:t>SLA-related policy </a:t>
-            </a:r>
-            <a:r>
-              <a:rPr lang="en-US" dirty="0" smtClean="0"/>
-              <a:t>enforcement at deployment time </a:t>
-            </a:r>
-            <a:r>
-              <a:rPr lang="en-US" dirty="0" smtClean="0"/>
-              <a:t>with EAGER</a:t>
+              <a:t>SLA</a:t>
+            </a:r>
+            <a:r>
+              <a:rPr lang="en-US" dirty="0" smtClean="0"/>
+              <a:t>-related policy enforcement at deployment time with EAGER</a:t>
             </a:r>
           </a:p>
           <a:p>
@@ -4045,7 +4005,7 @@
     </p:spTree>
     <p:extLst>
       <p:ext uri="{BB962C8B-B14F-4D97-AF65-F5344CB8AC3E}">
-        <p14:creationId xmlns:p14="http://schemas.microsoft.com/office/powerpoint/2010/main" xmlns:p="http://schemas.openxmlformats.org/presentationml/2006/main" xmlns:r="http://schemas.openxmlformats.org/officeDocument/2006/relationships" xmlns:a="http://schemas.openxmlformats.org/drawingml/2006/main" xmlns="" val="2936306023"/>
+        <p14:creationId xmlns:p14="http://schemas.microsoft.com/office/powerpoint/2010/main" val="2936306023"/>
       </p:ext>
     </p:extLst>
   </p:cSld>
@@ -4055,7 +4015,7 @@
   <p:timing>
     <p:tnLst>
       <p:par>
-        <p:cTn id="1" dur="indefinite" restart="never" nodeType="tmRoot"/>
+        <p:cTn xmlns:p14="http://schemas.microsoft.com/office/powerpoint/2010/main" id="1" dur="indefinite" restart="never" nodeType="tmRoot"/>
       </p:par>
     </p:tnLst>
   </p:timing>
@@ -4063,7 +4023,7 @@
 </file>
 
 <file path=ppt/slides/slide15.xml><?xml version="1.0" encoding="utf-8"?>
-<p:sld xmlns:a="http://schemas.openxmlformats.org/drawingml/2006/main" xmlns:r="http://schemas.openxmlformats.org/officeDocument/2006/relationships" xmlns:mc="http://schemas.openxmlformats.org/markup-compatibility/2006" xmlns:mv="urn:schemas-microsoft-com:mac:vml" xmlns:p="http://schemas.openxmlformats.org/presentationml/2006/main" mc:Ignorable="mv" mc:PreserveAttributes="mv:*">
+<p:sld xmlns:a="http://schemas.openxmlformats.org/drawingml/2006/main" xmlns:r="http://schemas.openxmlformats.org/officeDocument/2006/relationships" xmlns:p="http://schemas.openxmlformats.org/presentationml/2006/main">
   <p:cSld>
     <p:spTree>
       <p:nvGrpSpPr>
@@ -4125,37 +4085,18 @@
           <a:lstStyle/>
           <a:p>
             <a:r>
+              <a:rPr lang="en-US" dirty="0" smtClean="0"/>
+              <a:t>Hiranya Jayathilaka (</a:t>
+            </a:r>
+            <a:r>
               <a:rPr lang="en-US" dirty="0" err="1" smtClean="0"/>
-              <a:t>Hiranya</a:t>
-            </a:r>
-            <a:r>
-              <a:rPr lang="en-US" dirty="0" smtClean="0"/>
-              <a:t> </a:t>
-            </a:r>
-            <a:r>
-              <a:rPr lang="en-US" dirty="0" err="1" smtClean="0"/>
-              <a:t>Jayathilaka</a:t>
-            </a:r>
-            <a:r>
-              <a:rPr lang="en-US" dirty="0" smtClean="0"/>
-              <a:t> (</a:t>
-            </a:r>
-            <a:r>
-              <a:rPr lang="en-US" dirty="0" smtClean="0">
-                <a:hlinkClick r:id="rId2"/>
-              </a:rPr>
-              <a:t>hiranya911@</a:t>
-            </a:r>
-            <a:r>
-              <a:rPr lang="en-US" dirty="0" smtClean="0">
-                <a:hlinkClick r:id="rId2"/>
-              </a:rPr>
-              <a:t>gmail.com</a:t>
+              <a:t>hiranya@cs.ucsb.edu</a:t>
             </a:r>
             <a:r>
               <a:rPr lang="en-US" dirty="0" smtClean="0"/>
               <a:t>)</a:t>
             </a:r>
+            <a:endParaRPr lang="en-US" dirty="0" smtClean="0"/>
           </a:p>
           <a:p>
             <a:r>
@@ -4185,10 +4126,34 @@
           </a:p>
         </p:txBody>
       </p:sp>
+      <p:pic>
+        <p:nvPicPr>
+          <p:cNvPr id="4" name="Picture 3" descr="RaceLogo.png"/>
+          <p:cNvPicPr>
+            <a:picLocks noChangeAspect="1"/>
+          </p:cNvPicPr>
+          <p:nvPr/>
+        </p:nvPicPr>
+        <p:blipFill>
+          <a:blip r:embed="rId2"/>
+          <a:stretch>
+            <a:fillRect/>
+          </a:stretch>
+        </p:blipFill>
+        <p:spPr>
+          <a:xfrm>
+            <a:off x="2427373" y="4413766"/>
+            <a:ext cx="4289254" cy="1974419"/>
+          </a:xfrm>
+          <a:prstGeom prst="rect">
+            <a:avLst/>
+          </a:prstGeom>
+        </p:spPr>
+      </p:pic>
     </p:spTree>
     <p:extLst>
       <p:ext uri="{BB962C8B-B14F-4D97-AF65-F5344CB8AC3E}">
-        <p14:creationId xmlns:p14="http://schemas.microsoft.com/office/powerpoint/2010/main" xmlns:p="http://schemas.openxmlformats.org/presentationml/2006/main" xmlns:r="http://schemas.openxmlformats.org/officeDocument/2006/relationships" xmlns:a="http://schemas.openxmlformats.org/drawingml/2006/main" xmlns="" val="2757626693"/>
+        <p14:creationId xmlns:p14="http://schemas.microsoft.com/office/powerpoint/2010/main" val="2757626693"/>
       </p:ext>
     </p:extLst>
   </p:cSld>
@@ -4198,7 +4163,7 @@
   <p:timing>
     <p:tnLst>
       <p:par>
-        <p:cTn id="1" dur="indefinite" restart="never" nodeType="tmRoot"/>
+        <p:cTn xmlns:p14="http://schemas.microsoft.com/office/powerpoint/2010/main" id="1" dur="indefinite" restart="never" nodeType="tmRoot"/>
       </p:par>
     </p:tnLst>
   </p:timing>
@@ -4206,7 +4171,7 @@
 </file>
 
 <file path=ppt/slides/slide2.xml><?xml version="1.0" encoding="utf-8"?>
-<p:sld xmlns:a="http://schemas.openxmlformats.org/drawingml/2006/main" xmlns:r="http://schemas.openxmlformats.org/officeDocument/2006/relationships" xmlns:mc="http://schemas.openxmlformats.org/markup-compatibility/2006" xmlns:mv="urn:schemas-microsoft-com:mac:vml" xmlns:p="http://schemas.openxmlformats.org/presentationml/2006/main" mc:Ignorable="mv" mc:PreserveAttributes="mv:*">
+<p:sld xmlns:a="http://schemas.openxmlformats.org/drawingml/2006/main" xmlns:r="http://schemas.openxmlformats.org/officeDocument/2006/relationships" xmlns:p="http://schemas.openxmlformats.org/presentationml/2006/main">
   <p:cSld>
     <p:spTree>
       <p:nvGrpSpPr>
@@ -4234,7 +4199,7 @@
           <a:blip r:embed="rId2">
             <a:extLst>
               <a:ext uri="{28A0092B-C50C-407E-A947-70E740481C1C}">
-                <a14:useLocalDpi xmlns:a14="http://schemas.microsoft.com/office/drawing/2010/main" xmlns:p="http://schemas.openxmlformats.org/presentationml/2006/main" xmlns:r="http://schemas.openxmlformats.org/officeDocument/2006/relationships" xmlns:a="http://schemas.openxmlformats.org/drawingml/2006/main" xmlns="" val="0"/>
+                <a14:useLocalDpi xmlns:a14="http://schemas.microsoft.com/office/drawing/2010/main" val="0"/>
               </a:ext>
             </a:extLst>
           </a:blip>
@@ -4309,7 +4274,7 @@
     </p:spTree>
     <p:extLst>
       <p:ext uri="{BB962C8B-B14F-4D97-AF65-F5344CB8AC3E}">
-        <p14:creationId xmlns:p14="http://schemas.microsoft.com/office/powerpoint/2010/main" xmlns:p="http://schemas.openxmlformats.org/presentationml/2006/main" xmlns:r="http://schemas.openxmlformats.org/officeDocument/2006/relationships" xmlns:a="http://schemas.openxmlformats.org/drawingml/2006/main" xmlns="" val="2031100148"/>
+        <p14:creationId xmlns:p14="http://schemas.microsoft.com/office/powerpoint/2010/main" val="2031100148"/>
       </p:ext>
     </p:extLst>
   </p:cSld>
@@ -4319,7 +4284,7 @@
   <p:timing>
     <p:tnLst>
       <p:par>
-        <p:cTn id="1" dur="indefinite" restart="never" nodeType="tmRoot"/>
+        <p:cTn xmlns:p14="http://schemas.microsoft.com/office/powerpoint/2010/main" id="1" dur="indefinite" restart="never" nodeType="tmRoot"/>
       </p:par>
     </p:tnLst>
   </p:timing>
@@ -4327,7 +4292,7 @@
 </file>
 
 <file path=ppt/slides/slide3.xml><?xml version="1.0" encoding="utf-8"?>
-<p:sld xmlns:a="http://schemas.openxmlformats.org/drawingml/2006/main" xmlns:r="http://schemas.openxmlformats.org/officeDocument/2006/relationships" xmlns:mc="http://schemas.openxmlformats.org/markup-compatibility/2006" xmlns:mv="urn:schemas-microsoft-com:mac:vml" xmlns:p="http://schemas.openxmlformats.org/presentationml/2006/main" mc:Ignorable="mv" mc:PreserveAttributes="mv:*">
+<p:sld xmlns:a="http://schemas.openxmlformats.org/drawingml/2006/main" xmlns:r="http://schemas.openxmlformats.org/officeDocument/2006/relationships" xmlns:p="http://schemas.openxmlformats.org/presentationml/2006/main">
   <p:cSld>
     <p:spTree>
       <p:nvGrpSpPr>
@@ -4355,7 +4320,7 @@
           <a:blip r:embed="rId2">
             <a:extLst>
               <a:ext uri="{28A0092B-C50C-407E-A947-70E740481C1C}">
-                <a14:useLocalDpi xmlns:a14="http://schemas.microsoft.com/office/drawing/2010/main" xmlns:p="http://schemas.openxmlformats.org/presentationml/2006/main" xmlns:r="http://schemas.openxmlformats.org/officeDocument/2006/relationships" xmlns:a="http://schemas.openxmlformats.org/drawingml/2006/main" xmlns="" val="0"/>
+                <a14:useLocalDpi xmlns:a14="http://schemas.microsoft.com/office/drawing/2010/main" val="0"/>
               </a:ext>
             </a:extLst>
           </a:blip>
@@ -4470,7 +4435,7 @@
     </p:spTree>
     <p:extLst>
       <p:ext uri="{BB962C8B-B14F-4D97-AF65-F5344CB8AC3E}">
-        <p14:creationId xmlns:p14="http://schemas.microsoft.com/office/powerpoint/2010/main" xmlns:p="http://schemas.openxmlformats.org/presentationml/2006/main" xmlns:r="http://schemas.openxmlformats.org/officeDocument/2006/relationships" xmlns:a="http://schemas.openxmlformats.org/drawingml/2006/main" xmlns="" val="2861415571"/>
+        <p14:creationId xmlns:p14="http://schemas.microsoft.com/office/powerpoint/2010/main" val="2861415571"/>
       </p:ext>
     </p:extLst>
   </p:cSld>
@@ -4480,7 +4445,7 @@
   <p:timing>
     <p:tnLst>
       <p:par>
-        <p:cTn id="1" dur="indefinite" restart="never" nodeType="tmRoot"/>
+        <p:cTn xmlns:p14="http://schemas.microsoft.com/office/powerpoint/2010/main" id="1" dur="indefinite" restart="never" nodeType="tmRoot"/>
       </p:par>
     </p:tnLst>
   </p:timing>
@@ -4488,7 +4453,7 @@
 </file>
 
 <file path=ppt/slides/slide4.xml><?xml version="1.0" encoding="utf-8"?>
-<p:sld xmlns:a="http://schemas.openxmlformats.org/drawingml/2006/main" xmlns:r="http://schemas.openxmlformats.org/officeDocument/2006/relationships" xmlns:mc="http://schemas.openxmlformats.org/markup-compatibility/2006" xmlns:mv="urn:schemas-microsoft-com:mac:vml" xmlns:p="http://schemas.openxmlformats.org/presentationml/2006/main" mc:Ignorable="mv" mc:PreserveAttributes="mv:*">
+<p:sld xmlns:a="http://schemas.openxmlformats.org/drawingml/2006/main" xmlns:r="http://schemas.openxmlformats.org/officeDocument/2006/relationships" xmlns:p="http://schemas.openxmlformats.org/presentationml/2006/main">
   <p:cSld>
     <p:spTree>
       <p:nvGrpSpPr>
@@ -4521,7 +4486,15 @@
           <a:p>
             <a:r>
               <a:rPr lang="en-US" dirty="0" smtClean="0"/>
-              <a:t>Web APIs are now IT Resources</a:t>
+              <a:t>Web APIs are </a:t>
+            </a:r>
+            <a:r>
+              <a:rPr lang="en-US" dirty="0" smtClean="0"/>
+              <a:t>Now </a:t>
+            </a:r>
+            <a:r>
+              <a:rPr lang="en-US" dirty="0" smtClean="0"/>
+              <a:t>IT Resources</a:t>
             </a:r>
             <a:endParaRPr lang="en-US" dirty="0"/>
           </a:p>
@@ -5045,7 +5018,11 @@
             </a:r>
             <a:r>
               <a:rPr lang="en-US" sz="1400" dirty="0" smtClean="0"/>
-              <a:t>called by application impact user experience</a:t>
+              <a:t>impact </a:t>
+            </a:r>
+            <a:r>
+              <a:rPr lang="en-US" sz="1400" dirty="0" smtClean="0"/>
+              <a:t>user experience</a:t>
             </a:r>
             <a:endParaRPr lang="en-US" sz="1400" dirty="0"/>
           </a:p>
@@ -5102,15 +5079,11 @@
             <a:pPr algn="ctr"/>
             <a:r>
               <a:rPr lang="en-US" sz="1400" dirty="0" smtClean="0"/>
-              <a:t>APIs </a:t>
+              <a:t>APIs do not </a:t>
             </a:r>
             <a:r>
               <a:rPr lang="en-US" sz="1400" dirty="0" smtClean="0"/>
-              <a:t>do not</a:t>
-            </a:r>
-            <a:r>
-              <a:rPr lang="en-US" sz="1400" dirty="0" smtClean="0"/>
-              <a:t> typically provide performance guarantees</a:t>
+              <a:t>provide strong guarantees</a:t>
             </a:r>
             <a:endParaRPr lang="en-US" sz="1400" dirty="0"/>
           </a:p>
@@ -5233,25 +5206,274 @@
     </p:spTree>
     <p:extLst>
       <p:ext uri="{BB962C8B-B14F-4D97-AF65-F5344CB8AC3E}">
-        <p14:creationId xmlns:p14="http://schemas.microsoft.com/office/powerpoint/2010/main" xmlns:p="http://schemas.openxmlformats.org/presentationml/2006/main" xmlns:r="http://schemas.openxmlformats.org/officeDocument/2006/relationships" xmlns:a="http://schemas.openxmlformats.org/drawingml/2006/main" xmlns="" val="3623371080"/>
+        <p14:creationId xmlns:p14="http://schemas.microsoft.com/office/powerpoint/2010/main" val="3623371080"/>
       </p:ext>
     </p:extLst>
   </p:cSld>
   <p:clrMapOvr>
     <a:masterClrMapping/>
   </p:clrMapOvr>
+  <mc:AlternateContent xmlns:mc="http://schemas.openxmlformats.org/markup-compatibility/2006">
+    <mc:Choice xmlns:p14="http://schemas.microsoft.com/office/powerpoint/2010/main" Requires="p14">
+      <p:transition spd="slow" p14:dur="2000"/>
+    </mc:Choice>
+    <mc:Fallback>
+      <p:transition xmlns:p14="http://schemas.microsoft.com/office/powerpoint/2010/main" spd="slow"/>
+    </mc:Fallback>
+  </mc:AlternateContent>
   <p:timing>
     <p:tnLst>
       <p:par>
-        <p:cTn id="1" dur="indefinite" restart="never" nodeType="tmRoot"/>
+        <p:cTn xmlns:p14="http://schemas.microsoft.com/office/powerpoint/2010/main" id="1" dur="indefinite" restart="never" nodeType="tmRoot">
+          <p:childTnLst>
+            <p:seq concurrent="1" nextAc="seek">
+              <p:cTn id="2" dur="indefinite" nodeType="mainSeq">
+                <p:childTnLst>
+                  <p:par>
+                    <p:cTn id="3" fill="hold">
+                      <p:stCondLst>
+                        <p:cond delay="indefinite"/>
+                      </p:stCondLst>
+                      <p:childTnLst>
+                        <p:par>
+                          <p:cTn id="4" fill="hold">
+                            <p:stCondLst>
+                              <p:cond delay="0"/>
+                            </p:stCondLst>
+                            <p:childTnLst>
+                              <p:par>
+                                <p:cTn id="5" presetID="3" presetClass="entr" presetSubtype="10" fill="hold" grpId="0" nodeType="clickEffect">
+                                  <p:stCondLst>
+                                    <p:cond delay="0"/>
+                                  </p:stCondLst>
+                                  <p:childTnLst>
+                                    <p:set>
+                                      <p:cBhvr>
+                                        <p:cTn id="6" dur="1" fill="hold">
+                                          <p:stCondLst>
+                                            <p:cond delay="0"/>
+                                          </p:stCondLst>
+                                        </p:cTn>
+                                        <p:tgtEl>
+                                          <p:spTgt spid="25"/>
+                                        </p:tgtEl>
+                                        <p:attrNameLst>
+                                          <p:attrName>style.visibility</p:attrName>
+                                        </p:attrNameLst>
+                                      </p:cBhvr>
+                                      <p:to>
+                                        <p:strVal val="visible"/>
+                                      </p:to>
+                                    </p:set>
+                                    <p:animEffect transition="in" filter="blinds(horizontal)">
+                                      <p:cBhvr>
+                                        <p:cTn id="7" dur="500"/>
+                                        <p:tgtEl>
+                                          <p:spTgt spid="25"/>
+                                        </p:tgtEl>
+                                      </p:cBhvr>
+                                    </p:animEffect>
+                                  </p:childTnLst>
+                                </p:cTn>
+                              </p:par>
+                            </p:childTnLst>
+                          </p:cTn>
+                        </p:par>
+                      </p:childTnLst>
+                    </p:cTn>
+                  </p:par>
+                  <p:par>
+                    <p:cTn id="8" fill="hold">
+                      <p:stCondLst>
+                        <p:cond delay="indefinite"/>
+                      </p:stCondLst>
+                      <p:childTnLst>
+                        <p:par>
+                          <p:cTn id="9" fill="hold">
+                            <p:stCondLst>
+                              <p:cond delay="0"/>
+                            </p:stCondLst>
+                            <p:childTnLst>
+                              <p:par>
+                                <p:cTn id="10" presetID="3" presetClass="entr" presetSubtype="10" fill="hold" grpId="0" nodeType="clickEffect">
+                                  <p:stCondLst>
+                                    <p:cond delay="0"/>
+                                  </p:stCondLst>
+                                  <p:childTnLst>
+                                    <p:set>
+                                      <p:cBhvr>
+                                        <p:cTn id="11" dur="1" fill="hold">
+                                          <p:stCondLst>
+                                            <p:cond delay="0"/>
+                                          </p:stCondLst>
+                                        </p:cTn>
+                                        <p:tgtEl>
+                                          <p:spTgt spid="28"/>
+                                        </p:tgtEl>
+                                        <p:attrNameLst>
+                                          <p:attrName>style.visibility</p:attrName>
+                                        </p:attrNameLst>
+                                      </p:cBhvr>
+                                      <p:to>
+                                        <p:strVal val="visible"/>
+                                      </p:to>
+                                    </p:set>
+                                    <p:animEffect transition="in" filter="blinds(horizontal)">
+                                      <p:cBhvr>
+                                        <p:cTn id="12" dur="500"/>
+                                        <p:tgtEl>
+                                          <p:spTgt spid="28"/>
+                                        </p:tgtEl>
+                                      </p:cBhvr>
+                                    </p:animEffect>
+                                  </p:childTnLst>
+                                </p:cTn>
+                              </p:par>
+                            </p:childTnLst>
+                          </p:cTn>
+                        </p:par>
+                      </p:childTnLst>
+                    </p:cTn>
+                  </p:par>
+                  <p:par>
+                    <p:cTn id="13" fill="hold">
+                      <p:stCondLst>
+                        <p:cond delay="indefinite"/>
+                      </p:stCondLst>
+                      <p:childTnLst>
+                        <p:par>
+                          <p:cTn id="14" fill="hold">
+                            <p:stCondLst>
+                              <p:cond delay="0"/>
+                            </p:stCondLst>
+                            <p:childTnLst>
+                              <p:par>
+                                <p:cTn id="15" presetID="3" presetClass="entr" presetSubtype="10" fill="hold" grpId="0" nodeType="clickEffect">
+                                  <p:stCondLst>
+                                    <p:cond delay="0"/>
+                                  </p:stCondLst>
+                                  <p:childTnLst>
+                                    <p:set>
+                                      <p:cBhvr>
+                                        <p:cTn id="16" dur="1" fill="hold">
+                                          <p:stCondLst>
+                                            <p:cond delay="0"/>
+                                          </p:stCondLst>
+                                        </p:cTn>
+                                        <p:tgtEl>
+                                          <p:spTgt spid="27"/>
+                                        </p:tgtEl>
+                                        <p:attrNameLst>
+                                          <p:attrName>style.visibility</p:attrName>
+                                        </p:attrNameLst>
+                                      </p:cBhvr>
+                                      <p:to>
+                                        <p:strVal val="visible"/>
+                                      </p:to>
+                                    </p:set>
+                                    <p:animEffect transition="in" filter="blinds(horizontal)">
+                                      <p:cBhvr>
+                                        <p:cTn id="17" dur="500"/>
+                                        <p:tgtEl>
+                                          <p:spTgt spid="27"/>
+                                        </p:tgtEl>
+                                      </p:cBhvr>
+                                    </p:animEffect>
+                                  </p:childTnLst>
+                                </p:cTn>
+                              </p:par>
+                            </p:childTnLst>
+                          </p:cTn>
+                        </p:par>
+                      </p:childTnLst>
+                    </p:cTn>
+                  </p:par>
+                  <p:par>
+                    <p:cTn id="18" fill="hold">
+                      <p:stCondLst>
+                        <p:cond delay="indefinite"/>
+                      </p:stCondLst>
+                      <p:childTnLst>
+                        <p:par>
+                          <p:cTn id="19" fill="hold">
+                            <p:stCondLst>
+                              <p:cond delay="0"/>
+                            </p:stCondLst>
+                            <p:childTnLst>
+                              <p:par>
+                                <p:cTn id="20" presetID="3" presetClass="entr" presetSubtype="10" fill="hold" grpId="0" nodeType="clickEffect">
+                                  <p:stCondLst>
+                                    <p:cond delay="0"/>
+                                  </p:stCondLst>
+                                  <p:childTnLst>
+                                    <p:set>
+                                      <p:cBhvr>
+                                        <p:cTn id="21" dur="1" fill="hold">
+                                          <p:stCondLst>
+                                            <p:cond delay="0"/>
+                                          </p:stCondLst>
+                                        </p:cTn>
+                                        <p:tgtEl>
+                                          <p:spTgt spid="29"/>
+                                        </p:tgtEl>
+                                        <p:attrNameLst>
+                                          <p:attrName>style.visibility</p:attrName>
+                                        </p:attrNameLst>
+                                      </p:cBhvr>
+                                      <p:to>
+                                        <p:strVal val="visible"/>
+                                      </p:to>
+                                    </p:set>
+                                    <p:animEffect transition="in" filter="blinds(horizontal)">
+                                      <p:cBhvr>
+                                        <p:cTn id="22" dur="500"/>
+                                        <p:tgtEl>
+                                          <p:spTgt spid="29"/>
+                                        </p:tgtEl>
+                                      </p:cBhvr>
+                                    </p:animEffect>
+                                  </p:childTnLst>
+                                </p:cTn>
+                              </p:par>
+                            </p:childTnLst>
+                          </p:cTn>
+                        </p:par>
+                      </p:childTnLst>
+                    </p:cTn>
+                  </p:par>
+                </p:childTnLst>
+              </p:cTn>
+              <p:prevCondLst>
+                <p:cond evt="onPrev" delay="0">
+                  <p:tgtEl>
+                    <p:sldTgt/>
+                  </p:tgtEl>
+                </p:cond>
+              </p:prevCondLst>
+              <p:nextCondLst>
+                <p:cond evt="onNext" delay="0">
+                  <p:tgtEl>
+                    <p:sldTgt/>
+                  </p:tgtEl>
+                </p:cond>
+              </p:nextCondLst>
+            </p:seq>
+          </p:childTnLst>
+        </p:cTn>
       </p:par>
     </p:tnLst>
+    <p:bldLst>
+      <p:bldP spid="25" grpId="0" animBg="1"/>
+      <p:bldP spid="27" grpId="0" animBg="1"/>
+      <p:bldP spid="28" grpId="0" animBg="1"/>
+      <p:bldP spid="29" grpId="0" animBg="1"/>
+    </p:bldLst>
   </p:timing>
 </p:sld>
 </file>
 
 <file path=ppt/slides/slide5.xml><?xml version="1.0" encoding="utf-8"?>
-<p:sld xmlns:a="http://schemas.openxmlformats.org/drawingml/2006/main" xmlns:r="http://schemas.openxmlformats.org/officeDocument/2006/relationships" xmlns:mc="http://schemas.openxmlformats.org/markup-compatibility/2006" xmlns:mv="urn:schemas-microsoft-com:mac:vml" xmlns:p="http://schemas.openxmlformats.org/presentationml/2006/main" mc:Ignorable="mv" mc:PreserveAttributes="mv:*">
+<p:sld xmlns:a="http://schemas.openxmlformats.org/drawingml/2006/main" xmlns:r="http://schemas.openxmlformats.org/officeDocument/2006/relationships" xmlns:p="http://schemas.openxmlformats.org/presentationml/2006/main">
   <p:cSld>
     <p:spTree>
       <p:nvGrpSpPr>
@@ -5280,13 +5502,17 @@
         <p:spPr/>
         <p:txBody>
           <a:bodyPr>
-            <a:normAutofit fontScale="90000"/>
+            <a:normAutofit/>
           </a:bodyPr>
           <a:lstStyle/>
           <a:p>
             <a:r>
               <a:rPr lang="en-US" dirty="0" smtClean="0"/>
-              <a:t>Client Service Level Agreements and “The Cloud”</a:t>
+              <a:t>Application SLAs and </a:t>
+            </a:r>
+            <a:r>
+              <a:rPr lang="en-US" dirty="0" smtClean="0"/>
+              <a:t>“The Cloud”</a:t>
             </a:r>
             <a:endParaRPr lang="en-US" dirty="0"/>
           </a:p>
@@ -5305,53 +5531,66 @@
         <p:spPr/>
         <p:txBody>
           <a:bodyPr>
-            <a:normAutofit lnSpcReduction="10000"/>
+            <a:normAutofit/>
           </a:bodyPr>
           <a:lstStyle/>
           <a:p>
             <a:r>
               <a:rPr lang="en-US" dirty="0" smtClean="0"/>
-              <a:t>Problem: Because much client application functionality depends on the APIs it calls, client-side </a:t>
-            </a:r>
-            <a:r>
-              <a:rPr lang="en-US" dirty="0" err="1" smtClean="0"/>
+              <a:t>Application </a:t>
+            </a:r>
+            <a:r>
+              <a:rPr lang="en-US" dirty="0" smtClean="0"/>
+              <a:t>SLAs depend on</a:t>
+            </a:r>
+          </a:p>
+          <a:p>
+            <a:pPr lvl="1"/>
+            <a:r>
+              <a:rPr lang="en-US" dirty="0" smtClean="0"/>
+              <a:t>SLAs </a:t>
+            </a:r>
+            <a:r>
+              <a:rPr lang="en-US" dirty="0" smtClean="0"/>
+              <a:t>of </a:t>
+            </a:r>
+            <a:r>
+              <a:rPr lang="en-US" dirty="0" smtClean="0"/>
+              <a:t>individual APIs</a:t>
+            </a:r>
+          </a:p>
+          <a:p>
+            <a:pPr lvl="1"/>
+            <a:r>
+              <a:rPr lang="en-US" dirty="0" smtClean="0"/>
+              <a:t>The ability to </a:t>
+            </a:r>
+            <a:r>
+              <a:rPr lang="en-US" dirty="0" smtClean="0"/>
+              <a:t>compose/combine </a:t>
+            </a:r>
+            <a:r>
+              <a:rPr lang="en-US" dirty="0" smtClean="0"/>
+              <a:t>API </a:t>
+            </a:r>
+            <a:r>
+              <a:rPr lang="en-US" dirty="0" smtClean="0"/>
               <a:t>SLAs</a:t>
             </a:r>
-            <a:r>
-              <a:rPr lang="en-US" dirty="0" smtClean="0"/>
-              <a:t> depend on</a:t>
-            </a:r>
-          </a:p>
-          <a:p>
-            <a:pPr lvl="1"/>
-            <a:r>
-              <a:rPr lang="en-US" dirty="0" err="1" smtClean="0"/>
-              <a:t>SLAs</a:t>
-            </a:r>
-            <a:r>
-              <a:rPr lang="en-US" dirty="0" smtClean="0"/>
-              <a:t> for individual APIs</a:t>
-            </a:r>
-          </a:p>
-          <a:p>
-            <a:pPr lvl="1"/>
-            <a:r>
-              <a:rPr lang="en-US" dirty="0" smtClean="0"/>
-              <a:t>The ability to compose API </a:t>
-            </a:r>
-            <a:r>
-              <a:rPr lang="en-US" dirty="0" err="1" smtClean="0"/>
-              <a:t>SLAs</a:t>
-            </a:r>
-            <a:r>
-              <a:rPr lang="en-US" dirty="0" smtClean="0"/>
-              <a:t> into an SLA for the client</a:t>
-            </a:r>
-          </a:p>
-          <a:p>
-            <a:r>
-              <a:rPr lang="en-US" dirty="0" smtClean="0"/>
-              <a:t>Current cloud platforms (Google, AWS) provide </a:t>
+            <a:endParaRPr lang="en-US" dirty="0" smtClean="0"/>
+          </a:p>
+          <a:p>
+            <a:r>
+              <a:rPr lang="en-US" dirty="0" smtClean="0"/>
+              <a:t>Modern </a:t>
+            </a:r>
+            <a:r>
+              <a:rPr lang="en-US" dirty="0" smtClean="0"/>
+              <a:t>cloud platforms </a:t>
+            </a:r>
+            <a:r>
+              <a:rPr lang="en-US" dirty="0" smtClean="0"/>
+              <a:t>only provide </a:t>
             </a:r>
             <a:r>
               <a:rPr lang="en-US" i="1" dirty="0" smtClean="0"/>
@@ -5359,30 +5598,67 @@
             </a:r>
             <a:r>
               <a:rPr lang="en-US" dirty="0" smtClean="0"/>
-              <a:t>reliability </a:t>
-            </a:r>
-            <a:r>
-              <a:rPr lang="en-US" dirty="0" err="1" smtClean="0"/>
-              <a:t>SLAs</a:t>
-            </a:r>
-            <a:r>
-              <a:rPr lang="en-US" dirty="0" smtClean="0"/>
-              <a:t> for individual APIs only</a:t>
+              <a:t>uptime </a:t>
+            </a:r>
+            <a:r>
+              <a:rPr lang="en-US" dirty="0" smtClean="0"/>
+              <a:t>SLAs for individual </a:t>
+            </a:r>
+            <a:r>
+              <a:rPr lang="en-US" dirty="0" smtClean="0"/>
+              <a:t>APIs</a:t>
             </a:r>
             <a:endParaRPr lang="en-US" dirty="0"/>
           </a:p>
         </p:txBody>
       </p:sp>
+      <p:pic>
+        <p:nvPicPr>
+          <p:cNvPr id="4" name="Picture 3" descr="Screen Shot 2015-08-16 at 2.57.43 PM.png"/>
+          <p:cNvPicPr>
+            <a:picLocks noChangeAspect="1"/>
+          </p:cNvPicPr>
+          <p:nvPr/>
+        </p:nvPicPr>
+        <p:blipFill>
+          <a:blip r:embed="rId2">
+            <a:extLst>
+              <a:ext uri="{28A0092B-C50C-407E-A947-70E740481C1C}">
+                <a14:useLocalDpi xmlns:a14="http://schemas.microsoft.com/office/drawing/2010/main" val="0"/>
+              </a:ext>
+            </a:extLst>
+          </a:blip>
+          <a:stretch>
+            <a:fillRect/>
+          </a:stretch>
+        </p:blipFill>
+        <p:spPr>
+          <a:xfrm>
+            <a:off x="436192" y="4459992"/>
+            <a:ext cx="8271616" cy="1886164"/>
+          </a:xfrm>
+          <a:prstGeom prst="rect">
+            <a:avLst/>
+          </a:prstGeom>
+        </p:spPr>
+      </p:pic>
     </p:spTree>
   </p:cSld>
   <p:clrMapOvr>
     <a:masterClrMapping/>
   </p:clrMapOvr>
+  <p:timing>
+    <p:tnLst>
+      <p:par>
+        <p:cTn xmlns:p14="http://schemas.microsoft.com/office/powerpoint/2010/main" id="1" dur="indefinite" restart="never" nodeType="tmRoot"/>
+      </p:par>
+    </p:tnLst>
+  </p:timing>
 </p:sld>
 </file>
 
 <file path=ppt/slides/slide6.xml><?xml version="1.0" encoding="utf-8"?>
-<p:sld xmlns:a="http://schemas.openxmlformats.org/drawingml/2006/main" xmlns:r="http://schemas.openxmlformats.org/officeDocument/2006/relationships" xmlns:mc="http://schemas.openxmlformats.org/markup-compatibility/2006" xmlns:mv="urn:schemas-microsoft-com:mac:vml" xmlns:p="http://schemas.openxmlformats.org/presentationml/2006/main" mc:Ignorable="mv" mc:PreserveAttributes="mv:*">
+<p:sld xmlns:a="http://schemas.openxmlformats.org/drawingml/2006/main" xmlns:r="http://schemas.openxmlformats.org/officeDocument/2006/relationships" xmlns:p="http://schemas.openxmlformats.org/presentationml/2006/main">
   <p:cSld>
     <p:spTree>
       <p:nvGrpSpPr>
@@ -5415,11 +5691,7 @@
           <a:p>
             <a:r>
               <a:rPr lang="en-US" dirty="0" smtClean="0"/>
-              <a:t>Client-Side Performance </a:t>
-            </a:r>
-            <a:r>
-              <a:rPr lang="en-US" dirty="0" err="1" smtClean="0"/>
-              <a:t>SLAs</a:t>
+              <a:t>Performance SLAs in the Cloud</a:t>
             </a:r>
             <a:endParaRPr lang="en-US" dirty="0"/>
           </a:p>
@@ -5438,123 +5710,97 @@
         <p:spPr>
           <a:xfrm>
             <a:off x="457199" y="1600200"/>
-            <a:ext cx="8686801" cy="4525963"/>
+            <a:ext cx="8229601" cy="4525963"/>
           </a:xfrm>
         </p:spPr>
         <p:txBody>
           <a:bodyPr>
-            <a:normAutofit fontScale="85000" lnSpcReduction="20000"/>
+            <a:normAutofit/>
           </a:bodyPr>
           <a:lstStyle/>
           <a:p>
             <a:r>
-              <a:rPr lang="en-US" dirty="0" smtClean="0"/>
-              <a:t>Question: </a:t>
+              <a:rPr lang="en-US" b="1" i="1" dirty="0" smtClean="0"/>
+              <a:t>Question:</a:t>
             </a:r>
             <a:r>
               <a:rPr lang="en-US" i="1" dirty="0" smtClean="0"/>
-              <a:t>Is it possible to determine, automatically, a client-side performance SLA for cloud-based applications?</a:t>
-            </a:r>
-          </a:p>
-          <a:p>
-            <a:r>
-              <a:rPr lang="en-US" dirty="0" err="1" smtClean="0"/>
-              <a:t>Cerebro</a:t>
+              <a:t> </a:t>
+            </a:r>
+            <a:r>
+              <a:rPr lang="en-US" dirty="0" smtClean="0"/>
+              <a:t>Is </a:t>
+            </a:r>
+            <a:r>
+              <a:rPr lang="en-US" dirty="0" smtClean="0"/>
+              <a:t>it possible to determine, automatically</a:t>
+            </a:r>
+            <a:r>
+              <a:rPr lang="en-US" dirty="0" smtClean="0"/>
+              <a:t>, performance SLAs </a:t>
+            </a:r>
+            <a:r>
+              <a:rPr lang="en-US" dirty="0" smtClean="0"/>
+              <a:t>for cloud</a:t>
+            </a:r>
+            <a:r>
+              <a:rPr lang="en-US" dirty="0" smtClean="0"/>
+              <a:t>-hosted applications and APIs?</a:t>
             </a:r>
             <a:endParaRPr lang="en-US" dirty="0" smtClean="0"/>
           </a:p>
           <a:p>
+            <a:r>
+              <a:rPr lang="en-US" b="1" i="1" dirty="0" smtClean="0"/>
+              <a:t>Our solution:</a:t>
+            </a:r>
+            <a:r>
+              <a:rPr lang="en-US" dirty="0" smtClean="0"/>
+              <a:t> Cerebro</a:t>
+            </a:r>
+            <a:endParaRPr lang="en-US" dirty="0" smtClean="0"/>
+          </a:p>
+          <a:p>
             <a:pPr lvl="1"/>
             <a:r>
               <a:rPr lang="en-US" dirty="0" smtClean="0"/>
-              <a:t>Predicts </a:t>
-            </a:r>
-            <a:r>
-              <a:rPr lang="en-US" dirty="0" smtClean="0"/>
-              <a:t>the response time</a:t>
-            </a:r>
-            <a:r>
-              <a:rPr lang="en-US" dirty="0" smtClean="0"/>
-              <a:t> of future web-API invocations from historical measurements</a:t>
+              <a:t>Predicts the response time of future web-API invocations from historical </a:t>
+            </a:r>
+            <a:r>
+              <a:rPr lang="en-US" dirty="0" smtClean="0"/>
+              <a:t>measurements</a:t>
             </a:r>
           </a:p>
           <a:p>
             <a:pPr lvl="1"/>
             <a:r>
               <a:rPr lang="en-US" dirty="0" smtClean="0"/>
-              <a:t>Composes API predictions into a client-side SLA</a:t>
-            </a:r>
-            <a:endParaRPr lang="en-US" dirty="0" smtClean="0"/>
-          </a:p>
-          <a:p>
-            <a:pPr lvl="1"/>
-            <a:r>
-              <a:rPr lang="en-US" dirty="0" smtClean="0"/>
-              <a:t>Fully </a:t>
-            </a:r>
-            <a:r>
-              <a:rPr lang="en-US" dirty="0" smtClean="0"/>
-              <a:t>automatic</a:t>
-            </a:r>
-          </a:p>
-          <a:p>
-            <a:pPr lvl="2"/>
-            <a:r>
-              <a:rPr lang="en-US" dirty="0" smtClean="0"/>
-              <a:t>No load testing or instrumentation of applications</a:t>
-            </a:r>
-          </a:p>
-          <a:p>
-            <a:pPr lvl="2"/>
-            <a:r>
-              <a:rPr lang="en-US" dirty="0" smtClean="0"/>
-              <a:t>Static </a:t>
-            </a:r>
-            <a:r>
-              <a:rPr lang="en-US" dirty="0" smtClean="0"/>
-              <a:t>analysis, cloud-side monitoring, </a:t>
-            </a:r>
-            <a:r>
-              <a:rPr lang="en-US" dirty="0" smtClean="0"/>
-              <a:t>and</a:t>
-            </a:r>
-            <a:r>
-              <a:rPr lang="en-US" dirty="0" smtClean="0"/>
-              <a:t> on-line statistical forecasting</a:t>
-            </a:r>
-          </a:p>
-          <a:p>
-            <a:pPr lvl="1"/>
+              <a:t>For </a:t>
+            </a:r>
             <a:r>
               <a:rPr lang="en-US" dirty="0" err="1" smtClean="0"/>
               <a:t>PaaS</a:t>
             </a:r>
             <a:r>
               <a:rPr lang="en-US" dirty="0" smtClean="0"/>
-              <a:t> based</a:t>
-            </a:r>
-          </a:p>
-          <a:p>
-            <a:pPr lvl="2"/>
-            <a:r>
-              <a:rPr lang="en-US" dirty="0" smtClean="0"/>
-              <a:t>Automated analysis</a:t>
-            </a:r>
-          </a:p>
-          <a:p>
-            <a:pPr lvl="2"/>
-            <a:r>
-              <a:rPr lang="en-US" dirty="0" smtClean="0"/>
-              <a:t>Deployment-time enforcement</a:t>
-            </a:r>
-            <a:endParaRPr lang="en-US" dirty="0"/>
+              <a:t> clouds</a:t>
+            </a:r>
+            <a:endParaRPr lang="en-US" dirty="0" smtClean="0"/>
+          </a:p>
+          <a:p>
+            <a:pPr lvl="1"/>
+            <a:r>
+              <a:rPr lang="en-US" dirty="0" smtClean="0"/>
+              <a:t>Fully automatic</a:t>
+            </a:r>
+            <a:endParaRPr lang="en-US" dirty="0" smtClean="0"/>
           </a:p>
         </p:txBody>
       </p:sp>
     </p:spTree>
     <p:extLst>
       <p:ext uri="{BB962C8B-B14F-4D97-AF65-F5344CB8AC3E}">
-        <p14:creationId xmlns:p14="http://schemas.microsoft.com/office/powerpoint/2010/main" xmlns:p="http://schemas.openxmlformats.org/presentationml/2006/main" xmlns:r="http://schemas.openxmlformats.org/officeDocument/2006/relationships" xmlns:a="http://schemas.openxmlformats.org/drawingml/2006/main" xmlns="" val="2602633538"/>
+        <p14:creationId xmlns:p14="http://schemas.microsoft.com/office/powerpoint/2010/main" val="2602633538"/>
       </p:ext>
     </p:extLst>
   </p:cSld>
@@ -5564,7 +5810,7 @@
   <p:timing>
     <p:tnLst>
       <p:par>
-        <p:cTn id="1" dur="indefinite" restart="never" nodeType="tmRoot"/>
+        <p:cTn xmlns:p14="http://schemas.microsoft.com/office/powerpoint/2010/main" id="1" dur="indefinite" restart="never" nodeType="tmRoot"/>
       </p:par>
     </p:tnLst>
   </p:timing>
@@ -5572,7 +5818,7 @@
 </file>
 
 <file path=ppt/slides/slide7.xml><?xml version="1.0" encoding="utf-8"?>
-<p:sld xmlns:a="http://schemas.openxmlformats.org/drawingml/2006/main" xmlns:r="http://schemas.openxmlformats.org/officeDocument/2006/relationships" xmlns:mc="http://schemas.openxmlformats.org/markup-compatibility/2006" xmlns:mv="urn:schemas-microsoft-com:mac:vml" xmlns:p="http://schemas.openxmlformats.org/presentationml/2006/main" mc:Ignorable="mv" mc:PreserveAttributes="mv:*">
+<p:sld xmlns:a="http://schemas.openxmlformats.org/drawingml/2006/main" xmlns:r="http://schemas.openxmlformats.org/officeDocument/2006/relationships" xmlns:p="http://schemas.openxmlformats.org/presentationml/2006/main">
   <p:cSld>
     <p:spTree>
       <p:nvGrpSpPr>
@@ -5627,7 +5873,7 @@
           <a:blip r:embed="rId2">
             <a:extLst>
               <a:ext uri="{28A0092B-C50C-407E-A947-70E740481C1C}">
-                <a14:useLocalDpi xmlns:a14="http://schemas.microsoft.com/office/drawing/2010/main" xmlns:p="http://schemas.openxmlformats.org/presentationml/2006/main" xmlns:r="http://schemas.openxmlformats.org/officeDocument/2006/relationships" xmlns:a="http://schemas.openxmlformats.org/drawingml/2006/main" xmlns="" val="0"/>
+                <a14:useLocalDpi xmlns:a14="http://schemas.microsoft.com/office/drawing/2010/main" val="0"/>
               </a:ext>
             </a:extLst>
           </a:blip>
@@ -5991,7 +6237,7 @@
     </p:spTree>
     <p:extLst>
       <p:ext uri="{BB962C8B-B14F-4D97-AF65-F5344CB8AC3E}">
-        <p14:creationId xmlns:p14="http://schemas.microsoft.com/office/powerpoint/2010/main" xmlns:p="http://schemas.openxmlformats.org/presentationml/2006/main" xmlns:r="http://schemas.openxmlformats.org/officeDocument/2006/relationships" xmlns:a="http://schemas.openxmlformats.org/drawingml/2006/main" xmlns="" val="3150203701"/>
+        <p14:creationId xmlns:p14="http://schemas.microsoft.com/office/powerpoint/2010/main" val="3150203701"/>
       </p:ext>
     </p:extLst>
   </p:cSld>
@@ -6001,15 +6247,310 @@
   <p:timing>
     <p:tnLst>
       <p:par>
-        <p:cTn id="1" dur="indefinite" restart="never" nodeType="tmRoot"/>
+        <p:cTn xmlns:p14="http://schemas.microsoft.com/office/powerpoint/2010/main" id="1" dur="indefinite" restart="never" nodeType="tmRoot">
+          <p:childTnLst>
+            <p:seq concurrent="1" nextAc="seek">
+              <p:cTn id="2" dur="indefinite" nodeType="mainSeq">
+                <p:childTnLst>
+                  <p:par>
+                    <p:cTn id="3" fill="hold">
+                      <p:stCondLst>
+                        <p:cond delay="indefinite"/>
+                      </p:stCondLst>
+                      <p:childTnLst>
+                        <p:par>
+                          <p:cTn id="4" fill="hold">
+                            <p:stCondLst>
+                              <p:cond delay="0"/>
+                            </p:stCondLst>
+                            <p:childTnLst>
+                              <p:par>
+                                <p:cTn id="5" presetID="3" presetClass="entr" presetSubtype="10" fill="hold" grpId="0" nodeType="clickEffect">
+                                  <p:stCondLst>
+                                    <p:cond delay="0"/>
+                                  </p:stCondLst>
+                                  <p:childTnLst>
+                                    <p:set>
+                                      <p:cBhvr>
+                                        <p:cTn id="6" dur="1" fill="hold">
+                                          <p:stCondLst>
+                                            <p:cond delay="0"/>
+                                          </p:stCondLst>
+                                        </p:cTn>
+                                        <p:tgtEl>
+                                          <p:spTgt spid="23"/>
+                                        </p:tgtEl>
+                                        <p:attrNameLst>
+                                          <p:attrName>style.visibility</p:attrName>
+                                        </p:attrNameLst>
+                                      </p:cBhvr>
+                                      <p:to>
+                                        <p:strVal val="visible"/>
+                                      </p:to>
+                                    </p:set>
+                                    <p:animEffect transition="in" filter="blinds(horizontal)">
+                                      <p:cBhvr>
+                                        <p:cTn id="7" dur="500"/>
+                                        <p:tgtEl>
+                                          <p:spTgt spid="23"/>
+                                        </p:tgtEl>
+                                      </p:cBhvr>
+                                    </p:animEffect>
+                                  </p:childTnLst>
+                                </p:cTn>
+                              </p:par>
+                            </p:childTnLst>
+                          </p:cTn>
+                        </p:par>
+                      </p:childTnLst>
+                    </p:cTn>
+                  </p:par>
+                  <p:par>
+                    <p:cTn id="8" fill="hold">
+                      <p:stCondLst>
+                        <p:cond delay="indefinite"/>
+                      </p:stCondLst>
+                      <p:childTnLst>
+                        <p:par>
+                          <p:cTn id="9" fill="hold">
+                            <p:stCondLst>
+                              <p:cond delay="0"/>
+                            </p:stCondLst>
+                            <p:childTnLst>
+                              <p:par>
+                                <p:cTn id="10" presetID="3" presetClass="entr" presetSubtype="10" fill="hold" grpId="0" nodeType="clickEffect">
+                                  <p:stCondLst>
+                                    <p:cond delay="0"/>
+                                  </p:stCondLst>
+                                  <p:childTnLst>
+                                    <p:set>
+                                      <p:cBhvr>
+                                        <p:cTn id="11" dur="1" fill="hold">
+                                          <p:stCondLst>
+                                            <p:cond delay="0"/>
+                                          </p:stCondLst>
+                                        </p:cTn>
+                                        <p:tgtEl>
+                                          <p:spTgt spid="20"/>
+                                        </p:tgtEl>
+                                        <p:attrNameLst>
+                                          <p:attrName>style.visibility</p:attrName>
+                                        </p:attrNameLst>
+                                      </p:cBhvr>
+                                      <p:to>
+                                        <p:strVal val="visible"/>
+                                      </p:to>
+                                    </p:set>
+                                    <p:animEffect transition="in" filter="blinds(horizontal)">
+                                      <p:cBhvr>
+                                        <p:cTn id="12" dur="500"/>
+                                        <p:tgtEl>
+                                          <p:spTgt spid="20"/>
+                                        </p:tgtEl>
+                                      </p:cBhvr>
+                                    </p:animEffect>
+                                  </p:childTnLst>
+                                </p:cTn>
+                              </p:par>
+                            </p:childTnLst>
+                          </p:cTn>
+                        </p:par>
+                      </p:childTnLst>
+                    </p:cTn>
+                  </p:par>
+                  <p:par>
+                    <p:cTn id="13" fill="hold">
+                      <p:stCondLst>
+                        <p:cond delay="indefinite"/>
+                      </p:stCondLst>
+                      <p:childTnLst>
+                        <p:par>
+                          <p:cTn id="14" fill="hold">
+                            <p:stCondLst>
+                              <p:cond delay="0"/>
+                            </p:stCondLst>
+                            <p:childTnLst>
+                              <p:par>
+                                <p:cTn id="15" presetID="3" presetClass="entr" presetSubtype="10" fill="hold" grpId="0" nodeType="clickEffect">
+                                  <p:stCondLst>
+                                    <p:cond delay="0"/>
+                                  </p:stCondLst>
+                                  <p:childTnLst>
+                                    <p:set>
+                                      <p:cBhvr>
+                                        <p:cTn id="16" dur="1" fill="hold">
+                                          <p:stCondLst>
+                                            <p:cond delay="0"/>
+                                          </p:stCondLst>
+                                        </p:cTn>
+                                        <p:tgtEl>
+                                          <p:spTgt spid="24"/>
+                                        </p:tgtEl>
+                                        <p:attrNameLst>
+                                          <p:attrName>style.visibility</p:attrName>
+                                        </p:attrNameLst>
+                                      </p:cBhvr>
+                                      <p:to>
+                                        <p:strVal val="visible"/>
+                                      </p:to>
+                                    </p:set>
+                                    <p:animEffect transition="in" filter="blinds(horizontal)">
+                                      <p:cBhvr>
+                                        <p:cTn id="17" dur="500"/>
+                                        <p:tgtEl>
+                                          <p:spTgt spid="24"/>
+                                        </p:tgtEl>
+                                      </p:cBhvr>
+                                    </p:animEffect>
+                                  </p:childTnLst>
+                                </p:cTn>
+                              </p:par>
+                            </p:childTnLst>
+                          </p:cTn>
+                        </p:par>
+                      </p:childTnLst>
+                    </p:cTn>
+                  </p:par>
+                  <p:par>
+                    <p:cTn id="18" fill="hold">
+                      <p:stCondLst>
+                        <p:cond delay="indefinite"/>
+                      </p:stCondLst>
+                      <p:childTnLst>
+                        <p:par>
+                          <p:cTn id="19" fill="hold">
+                            <p:stCondLst>
+                              <p:cond delay="0"/>
+                            </p:stCondLst>
+                            <p:childTnLst>
+                              <p:par>
+                                <p:cTn id="20" presetID="3" presetClass="entr" presetSubtype="10" fill="hold" grpId="0" nodeType="clickEffect">
+                                  <p:stCondLst>
+                                    <p:cond delay="0"/>
+                                  </p:stCondLst>
+                                  <p:childTnLst>
+                                    <p:set>
+                                      <p:cBhvr>
+                                        <p:cTn id="21" dur="1" fill="hold">
+                                          <p:stCondLst>
+                                            <p:cond delay="0"/>
+                                          </p:stCondLst>
+                                        </p:cTn>
+                                        <p:tgtEl>
+                                          <p:spTgt spid="26"/>
+                                        </p:tgtEl>
+                                        <p:attrNameLst>
+                                          <p:attrName>style.visibility</p:attrName>
+                                        </p:attrNameLst>
+                                      </p:cBhvr>
+                                      <p:to>
+                                        <p:strVal val="visible"/>
+                                      </p:to>
+                                    </p:set>
+                                    <p:animEffect transition="in" filter="blinds(horizontal)">
+                                      <p:cBhvr>
+                                        <p:cTn id="22" dur="500"/>
+                                        <p:tgtEl>
+                                          <p:spTgt spid="26"/>
+                                        </p:tgtEl>
+                                      </p:cBhvr>
+                                    </p:animEffect>
+                                  </p:childTnLst>
+                                </p:cTn>
+                              </p:par>
+                            </p:childTnLst>
+                          </p:cTn>
+                        </p:par>
+                      </p:childTnLst>
+                    </p:cTn>
+                  </p:par>
+                  <p:par>
+                    <p:cTn id="23" fill="hold">
+                      <p:stCondLst>
+                        <p:cond delay="indefinite"/>
+                      </p:stCondLst>
+                      <p:childTnLst>
+                        <p:par>
+                          <p:cTn id="24" fill="hold">
+                            <p:stCondLst>
+                              <p:cond delay="0"/>
+                            </p:stCondLst>
+                            <p:childTnLst>
+                              <p:par>
+                                <p:cTn id="25" presetID="3" presetClass="entr" presetSubtype="10" fill="hold" grpId="0" nodeType="clickEffect">
+                                  <p:stCondLst>
+                                    <p:cond delay="0"/>
+                                  </p:stCondLst>
+                                  <p:childTnLst>
+                                    <p:set>
+                                      <p:cBhvr>
+                                        <p:cTn id="26" dur="1" fill="hold">
+                                          <p:stCondLst>
+                                            <p:cond delay="0"/>
+                                          </p:stCondLst>
+                                        </p:cTn>
+                                        <p:tgtEl>
+                                          <p:spTgt spid="27"/>
+                                        </p:tgtEl>
+                                        <p:attrNameLst>
+                                          <p:attrName>style.visibility</p:attrName>
+                                        </p:attrNameLst>
+                                      </p:cBhvr>
+                                      <p:to>
+                                        <p:strVal val="visible"/>
+                                      </p:to>
+                                    </p:set>
+                                    <p:animEffect transition="in" filter="blinds(horizontal)">
+                                      <p:cBhvr>
+                                        <p:cTn id="27" dur="500"/>
+                                        <p:tgtEl>
+                                          <p:spTgt spid="27"/>
+                                        </p:tgtEl>
+                                      </p:cBhvr>
+                                    </p:animEffect>
+                                  </p:childTnLst>
+                                </p:cTn>
+                              </p:par>
+                            </p:childTnLst>
+                          </p:cTn>
+                        </p:par>
+                      </p:childTnLst>
+                    </p:cTn>
+                  </p:par>
+                </p:childTnLst>
+              </p:cTn>
+              <p:prevCondLst>
+                <p:cond evt="onPrev" delay="0">
+                  <p:tgtEl>
+                    <p:sldTgt/>
+                  </p:tgtEl>
+                </p:cond>
+              </p:prevCondLst>
+              <p:nextCondLst>
+                <p:cond evt="onNext" delay="0">
+                  <p:tgtEl>
+                    <p:sldTgt/>
+                  </p:tgtEl>
+                </p:cond>
+              </p:nextCondLst>
+            </p:seq>
+          </p:childTnLst>
+        </p:cTn>
       </p:par>
     </p:tnLst>
+    <p:bldLst>
+      <p:bldP spid="20" grpId="0" animBg="1"/>
+      <p:bldP spid="23" grpId="0" animBg="1"/>
+      <p:bldP spid="24" grpId="0" animBg="1"/>
+      <p:bldP spid="26" grpId="0" animBg="1"/>
+      <p:bldP spid="27" grpId="0" animBg="1"/>
+    </p:bldLst>
   </p:timing>
 </p:sld>
 </file>
 
 <file path=ppt/slides/slide8.xml><?xml version="1.0" encoding="utf-8"?>
-<p:sld xmlns:a="http://schemas.openxmlformats.org/drawingml/2006/main" xmlns:r="http://schemas.openxmlformats.org/officeDocument/2006/relationships" xmlns:mc="http://schemas.openxmlformats.org/markup-compatibility/2006" xmlns:mv="urn:schemas-microsoft-com:mac:vml" xmlns:p="http://schemas.openxmlformats.org/presentationml/2006/main" mc:Ignorable="mv" mc:PreserveAttributes="mv:*">
+<p:sld xmlns:a="http://schemas.openxmlformats.org/drawingml/2006/main" xmlns:r="http://schemas.openxmlformats.org/officeDocument/2006/relationships" xmlns:p="http://schemas.openxmlformats.org/presentationml/2006/main">
   <p:cSld>
     <p:spTree>
       <p:nvGrpSpPr>
@@ -6093,11 +6634,7 @@
             </a:r>
             <a:r>
               <a:rPr lang="en-US" sz="2400" dirty="0" smtClean="0"/>
-              <a:t> Client Applications</a:t>
-            </a:r>
-            <a:r>
-              <a:rPr lang="en-US" sz="2400" dirty="0" smtClean="0"/>
-              <a:t>…</a:t>
+              <a:t> Client Applications…</a:t>
             </a:r>
             <a:endParaRPr lang="en-US" sz="2400" dirty="0"/>
           </a:p>
@@ -6170,18 +6707,10 @@
               <a:buChar char="•"/>
             </a:pPr>
             <a:r>
-              <a:rPr lang="en-US" sz="2000" dirty="0" smtClean="0">
-                <a:solidFill>
-                  <a:srgbClr val="FF0000"/>
-                </a:solidFill>
-              </a:rPr>
+              <a:rPr lang="en-US" sz="2000" dirty="0" smtClean="0"/>
               <a:t>Spend most of their time executing cloud SDK calls (&gt; 94%)</a:t>
             </a:r>
-            <a:endParaRPr lang="en-US" sz="2000" dirty="0">
-              <a:solidFill>
-                <a:srgbClr val="FF0000"/>
-              </a:solidFill>
-            </a:endParaRPr>
+            <a:endParaRPr lang="en-US" sz="2000" dirty="0"/>
           </a:p>
         </p:txBody>
       </p:sp>
@@ -6235,7 +6764,7 @@
         <p:spPr>
           <a:xfrm>
             <a:off x="225788" y="5432996"/>
-            <a:ext cx="8692425" cy="1015663"/>
+            <a:ext cx="8692425" cy="707886"/>
           </a:xfrm>
           <a:prstGeom prst="rect">
             <a:avLst/>
@@ -6258,9 +6787,16 @@
             </a:r>
             <a:r>
               <a:rPr lang="en-US" sz="2000" dirty="0" smtClean="0"/>
-              <a:t> applications are amenable to static analysis</a:t>
-            </a:r>
-            <a:endParaRPr lang="en-US" sz="2000" dirty="0" smtClean="0"/>
+              <a:t> applications are </a:t>
+            </a:r>
+            <a:r>
+              <a:rPr lang="en-US" sz="2000" dirty="0" smtClean="0"/>
+              <a:t>highly amenable </a:t>
+            </a:r>
+            <a:r>
+              <a:rPr lang="en-US" sz="2000" dirty="0" smtClean="0"/>
+              <a:t>to static analysis</a:t>
+            </a:r>
           </a:p>
           <a:p>
             <a:pPr marL="342900" lvl="0" indent="-342900">
@@ -6269,19 +6805,11 @@
             </a:pPr>
             <a:r>
               <a:rPr lang="en-US" sz="2000" dirty="0" smtClean="0"/>
-              <a:t>Client API calls to the </a:t>
-            </a:r>
-            <a:r>
-              <a:rPr lang="en-US" sz="2000" dirty="0" err="1" smtClean="0"/>
-              <a:t>PaaS</a:t>
+              <a:t>Cloud SDK calls </a:t>
             </a:r>
             <a:r>
               <a:rPr lang="en-US" sz="2000" dirty="0" smtClean="0"/>
-              <a:t> essentially define client-perceived application </a:t>
-            </a:r>
-            <a:r>
-              <a:rPr lang="en-US" sz="2000" dirty="0" smtClean="0"/>
-              <a:t>performance</a:t>
+              <a:t>essentially define client-perceived application performance</a:t>
             </a:r>
             <a:endParaRPr lang="en-US" sz="2000" dirty="0"/>
           </a:p>
@@ -6290,7 +6818,7 @@
     </p:spTree>
     <p:extLst>
       <p:ext uri="{BB962C8B-B14F-4D97-AF65-F5344CB8AC3E}">
-        <p14:creationId xmlns:p14="http://schemas.microsoft.com/office/powerpoint/2010/main" xmlns:p="http://schemas.openxmlformats.org/presentationml/2006/main" xmlns:r="http://schemas.openxmlformats.org/officeDocument/2006/relationships" xmlns:a="http://schemas.openxmlformats.org/drawingml/2006/main" xmlns="" val="3282737408"/>
+        <p14:creationId xmlns:p14="http://schemas.microsoft.com/office/powerpoint/2010/main" val="3282737408"/>
       </p:ext>
     </p:extLst>
   </p:cSld>
@@ -6300,7 +6828,78 @@
   <p:timing>
     <p:tnLst>
       <p:par>
-        <p:cTn id="1" dur="indefinite" restart="never" nodeType="tmRoot"/>
+        <p:cTn xmlns:p14="http://schemas.microsoft.com/office/powerpoint/2010/main" id="1" dur="indefinite" restart="never" nodeType="tmRoot">
+          <p:childTnLst>
+            <p:seq concurrent="1" nextAc="seek">
+              <p:cTn id="2" dur="indefinite" nodeType="mainSeq">
+                <p:childTnLst>
+                  <p:par>
+                    <p:cTn id="3" fill="hold">
+                      <p:stCondLst>
+                        <p:cond delay="indefinite"/>
+                      </p:stCondLst>
+                      <p:childTnLst>
+                        <p:par>
+                          <p:cTn id="4" fill="hold">
+                            <p:stCondLst>
+                              <p:cond delay="0"/>
+                            </p:stCondLst>
+                            <p:childTnLst>
+                              <p:par>
+                                <p:cTn id="5" presetID="15" presetClass="emph" presetSubtype="0" nodeType="clickEffect">
+                                  <p:stCondLst>
+                                    <p:cond delay="0"/>
+                                  </p:stCondLst>
+                                  <p:iterate type="lt">
+                                    <p:tmAbs val="25"/>
+                                  </p:iterate>
+                                  <p:childTnLst>
+                                    <p:set>
+                                      <p:cBhvr override="childStyle">
+                                        <p:cTn id="6" dur="indefinite"/>
+                                        <p:tgtEl>
+                                          <p:spTgt spid="6">
+                                            <p:txEl>
+                                              <p:pRg st="4" end="4"/>
+                                            </p:txEl>
+                                          </p:spTgt>
+                                        </p:tgtEl>
+                                        <p:attrNameLst>
+                                          <p:attrName>style.fontWeight</p:attrName>
+                                        </p:attrNameLst>
+                                      </p:cBhvr>
+                                      <p:to>
+                                        <p:strVal val="bold"/>
+                                      </p:to>
+                                    </p:set>
+                                  </p:childTnLst>
+                                </p:cTn>
+                              </p:par>
+                            </p:childTnLst>
+                          </p:cTn>
+                        </p:par>
+                      </p:childTnLst>
+                    </p:cTn>
+                  </p:par>
+                </p:childTnLst>
+              </p:cTn>
+              <p:prevCondLst>
+                <p:cond evt="onPrev" delay="0">
+                  <p:tgtEl>
+                    <p:sldTgt/>
+                  </p:tgtEl>
+                </p:cond>
+              </p:prevCondLst>
+              <p:nextCondLst>
+                <p:cond evt="onNext" delay="0">
+                  <p:tgtEl>
+                    <p:sldTgt/>
+                  </p:tgtEl>
+                </p:cond>
+              </p:nextCondLst>
+            </p:seq>
+          </p:childTnLst>
+        </p:cTn>
       </p:par>
     </p:tnLst>
   </p:timing>
@@ -6308,7 +6907,7 @@
 </file>
 
 <file path=ppt/slides/slide9.xml><?xml version="1.0" encoding="utf-8"?>
-<p:sld xmlns:a="http://schemas.openxmlformats.org/drawingml/2006/main" xmlns:r="http://schemas.openxmlformats.org/officeDocument/2006/relationships" xmlns:mc="http://schemas.openxmlformats.org/markup-compatibility/2006" xmlns:mv="urn:schemas-microsoft-com:mac:vml" xmlns:p="http://schemas.openxmlformats.org/presentationml/2006/main" mc:Ignorable="mv" mc:PreserveAttributes="mv:*">
+<p:sld xmlns:a="http://schemas.openxmlformats.org/drawingml/2006/main" xmlns:r="http://schemas.openxmlformats.org/officeDocument/2006/relationships" xmlns:p="http://schemas.openxmlformats.org/presentationml/2006/main">
   <p:cSld>
     <p:spTree>
       <p:nvGrpSpPr>
@@ -6361,7 +6960,7 @@
           <a:blip r:embed="rId2">
             <a:extLst>
               <a:ext uri="{28A0092B-C50C-407E-A947-70E740481C1C}">
-                <a14:useLocalDpi xmlns:a14="http://schemas.microsoft.com/office/drawing/2010/main" xmlns:p="http://schemas.openxmlformats.org/presentationml/2006/main" xmlns:r="http://schemas.openxmlformats.org/officeDocument/2006/relationships" xmlns:a="http://schemas.openxmlformats.org/drawingml/2006/main" xmlns="" val="0"/>
+                <a14:useLocalDpi xmlns:a14="http://schemas.microsoft.com/office/drawing/2010/main" val="0"/>
               </a:ext>
             </a:extLst>
           </a:blip>
@@ -6380,7 +6979,7 @@
     </p:spTree>
     <p:extLst>
       <p:ext uri="{BB962C8B-B14F-4D97-AF65-F5344CB8AC3E}">
-        <p14:creationId xmlns:p14="http://schemas.microsoft.com/office/powerpoint/2010/main" xmlns:p="http://schemas.openxmlformats.org/presentationml/2006/main" xmlns:r="http://schemas.openxmlformats.org/officeDocument/2006/relationships" xmlns:a="http://schemas.openxmlformats.org/drawingml/2006/main" xmlns="" val="2043275604"/>
+        <p14:creationId xmlns:p14="http://schemas.microsoft.com/office/powerpoint/2010/main" val="2043275604"/>
       </p:ext>
     </p:extLst>
   </p:cSld>
@@ -6390,7 +6989,7 @@
   <p:timing>
     <p:tnLst>
       <p:par>
-        <p:cTn id="1" dur="indefinite" restart="never" nodeType="tmRoot"/>
+        <p:cTn xmlns:p14="http://schemas.microsoft.com/office/powerpoint/2010/main" id="1" dur="indefinite" restart="never" nodeType="tmRoot"/>
       </p:par>
     </p:tnLst>
   </p:timing>

</xml_diff>

<commit_message>
updated slides and outline
</commit_message>
<xml_diff>
--- a/Eager/paper/socc15/cerebro_socc_presentation-v2.pptx
+++ b/Eager/paper/socc15/cerebro_socc_presentation-v2.pptx
@@ -1,25 +1,28 @@
 
 <file path=ppt/presentation.xml><?xml version="1.0" encoding="utf-8"?>
-<p:presentation xmlns:a="http://schemas.openxmlformats.org/drawingml/2006/main" xmlns:r="http://schemas.openxmlformats.org/officeDocument/2006/relationships" xmlns:p="http://schemas.openxmlformats.org/presentationml/2006/main" saveSubsetFonts="1" autoCompressPictures="0">
+<p:presentation xmlns:a="http://schemas.openxmlformats.org/drawingml/2006/main" xmlns:r="http://schemas.openxmlformats.org/officeDocument/2006/relationships" xmlns:p="http://schemas.openxmlformats.org/presentationml/2006/main" showSpecialPlsOnTitleSld="0" saveSubsetFonts="1" autoCompressPictures="0">
   <p:sldMasterIdLst>
     <p:sldMasterId id="2147483648" r:id="rId1"/>
   </p:sldMasterIdLst>
+  <p:notesMasterIdLst>
+    <p:notesMasterId r:id="rId17"/>
+  </p:notesMasterIdLst>
   <p:sldIdLst>
     <p:sldId id="256" r:id="rId2"/>
     <p:sldId id="258" r:id="rId3"/>
-    <p:sldId id="259" r:id="rId4"/>
-    <p:sldId id="263" r:id="rId5"/>
-    <p:sldId id="275" r:id="rId6"/>
-    <p:sldId id="261" r:id="rId7"/>
-    <p:sldId id="262" r:id="rId8"/>
-    <p:sldId id="265" r:id="rId9"/>
-    <p:sldId id="266" r:id="rId10"/>
-    <p:sldId id="267" r:id="rId11"/>
-    <p:sldId id="268" r:id="rId12"/>
-    <p:sldId id="269" r:id="rId13"/>
-    <p:sldId id="270" r:id="rId14"/>
-    <p:sldId id="272" r:id="rId15"/>
-    <p:sldId id="273" r:id="rId16"/>
+    <p:sldId id="263" r:id="rId4"/>
+    <p:sldId id="275" r:id="rId5"/>
+    <p:sldId id="261" r:id="rId6"/>
+    <p:sldId id="262" r:id="rId7"/>
+    <p:sldId id="265" r:id="rId8"/>
+    <p:sldId id="266" r:id="rId9"/>
+    <p:sldId id="267" r:id="rId10"/>
+    <p:sldId id="268" r:id="rId11"/>
+    <p:sldId id="269" r:id="rId12"/>
+    <p:sldId id="270" r:id="rId13"/>
+    <p:sldId id="272" r:id="rId14"/>
+    <p:sldId id="273" r:id="rId15"/>
+    <p:sldId id="276" r:id="rId16"/>
   </p:sldIdLst>
   <p:sldSz cx="9144000" cy="6858000" type="screen4x3"/>
   <p:notesSz cx="6858000" cy="9144000"/>
@@ -118,7 +121,386 @@
       </a:defRPr>
     </a:lvl9pPr>
   </p:defaultTextStyle>
+  <p:extLst>
+    <p:ext uri="{521415D9-36F7-43E2-AB2F-B90AF26B5E84}">
+      <p14:sectionLst xmlns:p14="http://schemas.microsoft.com/office/powerpoint/2010/main">
+        <p14:section name="Default Section" id="{D812D237-C174-224D-BB64-11A792D89757}">
+          <p14:sldIdLst>
+            <p14:sldId id="256"/>
+            <p14:sldId id="258"/>
+            <p14:sldId id="263"/>
+            <p14:sldId id="275"/>
+            <p14:sldId id="261"/>
+            <p14:sldId id="262"/>
+            <p14:sldId id="265"/>
+            <p14:sldId id="266"/>
+            <p14:sldId id="267"/>
+            <p14:sldId id="268"/>
+            <p14:sldId id="269"/>
+            <p14:sldId id="270"/>
+            <p14:sldId id="272"/>
+            <p14:sldId id="273"/>
+          </p14:sldIdLst>
+        </p14:section>
+        <p14:section name="Extras" id="{67ED90FF-6491-4E46-881A-23E4E2BA0AD4}">
+          <p14:sldIdLst>
+            <p14:sldId id="276"/>
+          </p14:sldIdLst>
+        </p14:section>
+      </p14:sectionLst>
+    </p:ext>
+  </p:extLst>
 </p:presentation>
+</file>
+
+<file path=ppt/notesMasters/notesMaster1.xml><?xml version="1.0" encoding="utf-8"?>
+<p:notesMaster xmlns:a="http://schemas.openxmlformats.org/drawingml/2006/main" xmlns:r="http://schemas.openxmlformats.org/officeDocument/2006/relationships" xmlns:p="http://schemas.openxmlformats.org/presentationml/2006/main">
+  <p:cSld>
+    <p:bg>
+      <p:bgRef idx="1001">
+        <a:schemeClr val="bg1"/>
+      </p:bgRef>
+    </p:bg>
+    <p:spTree>
+      <p:nvGrpSpPr>
+        <p:cNvPr id="1" name=""/>
+        <p:cNvGrpSpPr/>
+        <p:nvPr/>
+      </p:nvGrpSpPr>
+      <p:grpSpPr>
+        <a:xfrm>
+          <a:off x="0" y="0"/>
+          <a:ext cx="0" cy="0"/>
+          <a:chOff x="0" y="0"/>
+          <a:chExt cx="0" cy="0"/>
+        </a:xfrm>
+      </p:grpSpPr>
+      <p:sp>
+        <p:nvSpPr>
+          <p:cNvPr id="2" name="Header Placeholder 1"/>
+          <p:cNvSpPr>
+            <a:spLocks noGrp="1"/>
+          </p:cNvSpPr>
+          <p:nvPr>
+            <p:ph type="hdr" sz="quarter"/>
+          </p:nvPr>
+        </p:nvSpPr>
+        <p:spPr>
+          <a:xfrm>
+            <a:off x="0" y="0"/>
+            <a:ext cx="2971800" cy="457200"/>
+          </a:xfrm>
+          <a:prstGeom prst="rect">
+            <a:avLst/>
+          </a:prstGeom>
+        </p:spPr>
+        <p:txBody>
+          <a:bodyPr vert="horz" lIns="91440" tIns="45720" rIns="91440" bIns="45720" rtlCol="0"/>
+          <a:lstStyle>
+            <a:lvl1pPr algn="l">
+              <a:defRPr sz="1200"/>
+            </a:lvl1pPr>
+          </a:lstStyle>
+          <a:p>
+            <a:endParaRPr lang="en-US"/>
+          </a:p>
+        </p:txBody>
+      </p:sp>
+      <p:sp>
+        <p:nvSpPr>
+          <p:cNvPr id="3" name="Date Placeholder 2"/>
+          <p:cNvSpPr>
+            <a:spLocks noGrp="1"/>
+          </p:cNvSpPr>
+          <p:nvPr>
+            <p:ph type="dt" idx="1"/>
+          </p:nvPr>
+        </p:nvSpPr>
+        <p:spPr>
+          <a:xfrm>
+            <a:off x="3884613" y="0"/>
+            <a:ext cx="2971800" cy="457200"/>
+          </a:xfrm>
+          <a:prstGeom prst="rect">
+            <a:avLst/>
+          </a:prstGeom>
+        </p:spPr>
+        <p:txBody>
+          <a:bodyPr vert="horz" lIns="91440" tIns="45720" rIns="91440" bIns="45720" rtlCol="0"/>
+          <a:lstStyle>
+            <a:lvl1pPr algn="r">
+              <a:defRPr sz="1200"/>
+            </a:lvl1pPr>
+          </a:lstStyle>
+          <a:p>
+            <a:fld id="{F90BA996-3710-BA43-B1D0-F0CCAD4B7F72}" type="datetimeFigureOut">
+              <a:rPr lang="en-US" smtClean="0"/>
+              <a:t>8/22/15</a:t>
+            </a:fld>
+            <a:endParaRPr lang="en-US"/>
+          </a:p>
+        </p:txBody>
+      </p:sp>
+      <p:sp>
+        <p:nvSpPr>
+          <p:cNvPr id="4" name="Slide Image Placeholder 3"/>
+          <p:cNvSpPr>
+            <a:spLocks noGrp="1" noRot="1" noChangeAspect="1"/>
+          </p:cNvSpPr>
+          <p:nvPr>
+            <p:ph type="sldImg" idx="2"/>
+          </p:nvPr>
+        </p:nvSpPr>
+        <p:spPr>
+          <a:xfrm>
+            <a:off x="1143000" y="685800"/>
+            <a:ext cx="4572000" cy="3429000"/>
+          </a:xfrm>
+          <a:prstGeom prst="rect">
+            <a:avLst/>
+          </a:prstGeom>
+          <a:noFill/>
+          <a:ln w="12700">
+            <a:solidFill>
+              <a:prstClr val="black"/>
+            </a:solidFill>
+          </a:ln>
+        </p:spPr>
+        <p:txBody>
+          <a:bodyPr vert="horz" lIns="91440" tIns="45720" rIns="91440" bIns="45720" rtlCol="0" anchor="ctr"/>
+          <a:lstStyle/>
+          <a:p>
+            <a:endParaRPr lang="en-US"/>
+          </a:p>
+        </p:txBody>
+      </p:sp>
+      <p:sp>
+        <p:nvSpPr>
+          <p:cNvPr id="5" name="Notes Placeholder 4"/>
+          <p:cNvSpPr>
+            <a:spLocks noGrp="1"/>
+          </p:cNvSpPr>
+          <p:nvPr>
+            <p:ph type="body" sz="quarter" idx="3"/>
+          </p:nvPr>
+        </p:nvSpPr>
+        <p:spPr>
+          <a:xfrm>
+            <a:off x="685800" y="4343400"/>
+            <a:ext cx="5486400" cy="4114800"/>
+          </a:xfrm>
+          <a:prstGeom prst="rect">
+            <a:avLst/>
+          </a:prstGeom>
+        </p:spPr>
+        <p:txBody>
+          <a:bodyPr vert="horz" lIns="91440" tIns="45720" rIns="91440" bIns="45720" rtlCol="0"/>
+          <a:lstStyle/>
+          <a:p>
+            <a:pPr lvl="0"/>
+            <a:r>
+              <a:rPr lang="en-US" smtClean="0"/>
+              <a:t>Click to edit Master text styles</a:t>
+            </a:r>
+          </a:p>
+          <a:p>
+            <a:pPr lvl="1"/>
+            <a:r>
+              <a:rPr lang="en-US" smtClean="0"/>
+              <a:t>Second level</a:t>
+            </a:r>
+          </a:p>
+          <a:p>
+            <a:pPr lvl="2"/>
+            <a:r>
+              <a:rPr lang="en-US" smtClean="0"/>
+              <a:t>Third level</a:t>
+            </a:r>
+          </a:p>
+          <a:p>
+            <a:pPr lvl="3"/>
+            <a:r>
+              <a:rPr lang="en-US" smtClean="0"/>
+              <a:t>Fourth level</a:t>
+            </a:r>
+          </a:p>
+          <a:p>
+            <a:pPr lvl="4"/>
+            <a:r>
+              <a:rPr lang="en-US" smtClean="0"/>
+              <a:t>Fifth level</a:t>
+            </a:r>
+            <a:endParaRPr lang="en-US"/>
+          </a:p>
+        </p:txBody>
+      </p:sp>
+      <p:sp>
+        <p:nvSpPr>
+          <p:cNvPr id="6" name="Footer Placeholder 5"/>
+          <p:cNvSpPr>
+            <a:spLocks noGrp="1"/>
+          </p:cNvSpPr>
+          <p:nvPr>
+            <p:ph type="ftr" sz="quarter" idx="4"/>
+          </p:nvPr>
+        </p:nvSpPr>
+        <p:spPr>
+          <a:xfrm>
+            <a:off x="0" y="8685213"/>
+            <a:ext cx="2971800" cy="457200"/>
+          </a:xfrm>
+          <a:prstGeom prst="rect">
+            <a:avLst/>
+          </a:prstGeom>
+        </p:spPr>
+        <p:txBody>
+          <a:bodyPr vert="horz" lIns="91440" tIns="45720" rIns="91440" bIns="45720" rtlCol="0" anchor="b"/>
+          <a:lstStyle>
+            <a:lvl1pPr algn="l">
+              <a:defRPr sz="1200"/>
+            </a:lvl1pPr>
+          </a:lstStyle>
+          <a:p>
+            <a:endParaRPr lang="en-US"/>
+          </a:p>
+        </p:txBody>
+      </p:sp>
+      <p:sp>
+        <p:nvSpPr>
+          <p:cNvPr id="7" name="Slide Number Placeholder 6"/>
+          <p:cNvSpPr>
+            <a:spLocks noGrp="1"/>
+          </p:cNvSpPr>
+          <p:nvPr>
+            <p:ph type="sldNum" sz="quarter" idx="5"/>
+          </p:nvPr>
+        </p:nvSpPr>
+        <p:spPr>
+          <a:xfrm>
+            <a:off x="3884613" y="8685213"/>
+            <a:ext cx="2971800" cy="457200"/>
+          </a:xfrm>
+          <a:prstGeom prst="rect">
+            <a:avLst/>
+          </a:prstGeom>
+        </p:spPr>
+        <p:txBody>
+          <a:bodyPr vert="horz" lIns="91440" tIns="45720" rIns="91440" bIns="45720" rtlCol="0" anchor="b"/>
+          <a:lstStyle>
+            <a:lvl1pPr algn="r">
+              <a:defRPr sz="1200"/>
+            </a:lvl1pPr>
+          </a:lstStyle>
+          <a:p>
+            <a:fld id="{A86F4561-8DC6-F64C-A13A-E7CB59831BB3}" type="slidenum">
+              <a:rPr lang="en-US" smtClean="0"/>
+              <a:t>‹#›</a:t>
+            </a:fld>
+            <a:endParaRPr lang="en-US"/>
+          </a:p>
+        </p:txBody>
+      </p:sp>
+    </p:spTree>
+    <p:extLst>
+      <p:ext uri="{BB962C8B-B14F-4D97-AF65-F5344CB8AC3E}">
+        <p14:creationId xmlns:p14="http://schemas.microsoft.com/office/powerpoint/2010/main" val="3844639613"/>
+      </p:ext>
+    </p:extLst>
+  </p:cSld>
+  <p:clrMap bg1="lt1" tx1="dk1" bg2="lt2" tx2="dk2" accent1="accent1" accent2="accent2" accent3="accent3" accent4="accent4" accent5="accent5" accent6="accent6" hlink="hlink" folHlink="folHlink"/>
+  <p:notesStyle>
+    <a:lvl1pPr marL="0" algn="l" defTabSz="457200" rtl="0" eaLnBrk="1" latinLnBrk="0" hangingPunct="1">
+      <a:defRPr sz="1200" kern="1200">
+        <a:solidFill>
+          <a:schemeClr val="tx1"/>
+        </a:solidFill>
+        <a:latin typeface="+mn-lt"/>
+        <a:ea typeface="+mn-ea"/>
+        <a:cs typeface="+mn-cs"/>
+      </a:defRPr>
+    </a:lvl1pPr>
+    <a:lvl2pPr marL="457200" algn="l" defTabSz="457200" rtl="0" eaLnBrk="1" latinLnBrk="0" hangingPunct="1">
+      <a:defRPr sz="1200" kern="1200">
+        <a:solidFill>
+          <a:schemeClr val="tx1"/>
+        </a:solidFill>
+        <a:latin typeface="+mn-lt"/>
+        <a:ea typeface="+mn-ea"/>
+        <a:cs typeface="+mn-cs"/>
+      </a:defRPr>
+    </a:lvl2pPr>
+    <a:lvl3pPr marL="914400" algn="l" defTabSz="457200" rtl="0" eaLnBrk="1" latinLnBrk="0" hangingPunct="1">
+      <a:defRPr sz="1200" kern="1200">
+        <a:solidFill>
+          <a:schemeClr val="tx1"/>
+        </a:solidFill>
+        <a:latin typeface="+mn-lt"/>
+        <a:ea typeface="+mn-ea"/>
+        <a:cs typeface="+mn-cs"/>
+      </a:defRPr>
+    </a:lvl3pPr>
+    <a:lvl4pPr marL="1371600" algn="l" defTabSz="457200" rtl="0" eaLnBrk="1" latinLnBrk="0" hangingPunct="1">
+      <a:defRPr sz="1200" kern="1200">
+        <a:solidFill>
+          <a:schemeClr val="tx1"/>
+        </a:solidFill>
+        <a:latin typeface="+mn-lt"/>
+        <a:ea typeface="+mn-ea"/>
+        <a:cs typeface="+mn-cs"/>
+      </a:defRPr>
+    </a:lvl4pPr>
+    <a:lvl5pPr marL="1828800" algn="l" defTabSz="457200" rtl="0" eaLnBrk="1" latinLnBrk="0" hangingPunct="1">
+      <a:defRPr sz="1200" kern="1200">
+        <a:solidFill>
+          <a:schemeClr val="tx1"/>
+        </a:solidFill>
+        <a:latin typeface="+mn-lt"/>
+        <a:ea typeface="+mn-ea"/>
+        <a:cs typeface="+mn-cs"/>
+      </a:defRPr>
+    </a:lvl5pPr>
+    <a:lvl6pPr marL="2286000" algn="l" defTabSz="457200" rtl="0" eaLnBrk="1" latinLnBrk="0" hangingPunct="1">
+      <a:defRPr sz="1200" kern="1200">
+        <a:solidFill>
+          <a:schemeClr val="tx1"/>
+        </a:solidFill>
+        <a:latin typeface="+mn-lt"/>
+        <a:ea typeface="+mn-ea"/>
+        <a:cs typeface="+mn-cs"/>
+      </a:defRPr>
+    </a:lvl6pPr>
+    <a:lvl7pPr marL="2743200" algn="l" defTabSz="457200" rtl="0" eaLnBrk="1" latinLnBrk="0" hangingPunct="1">
+      <a:defRPr sz="1200" kern="1200">
+        <a:solidFill>
+          <a:schemeClr val="tx1"/>
+        </a:solidFill>
+        <a:latin typeface="+mn-lt"/>
+        <a:ea typeface="+mn-ea"/>
+        <a:cs typeface="+mn-cs"/>
+      </a:defRPr>
+    </a:lvl7pPr>
+    <a:lvl8pPr marL="3200400" algn="l" defTabSz="457200" rtl="0" eaLnBrk="1" latinLnBrk="0" hangingPunct="1">
+      <a:defRPr sz="1200" kern="1200">
+        <a:solidFill>
+          <a:schemeClr val="tx1"/>
+        </a:solidFill>
+        <a:latin typeface="+mn-lt"/>
+        <a:ea typeface="+mn-ea"/>
+        <a:cs typeface="+mn-cs"/>
+      </a:defRPr>
+    </a:lvl8pPr>
+    <a:lvl9pPr marL="3657600" algn="l" defTabSz="457200" rtl="0" eaLnBrk="1" latinLnBrk="0" hangingPunct="1">
+      <a:defRPr sz="1200" kern="1200">
+        <a:solidFill>
+          <a:schemeClr val="tx1"/>
+        </a:solidFill>
+        <a:latin typeface="+mn-lt"/>
+        <a:ea typeface="+mn-ea"/>
+        <a:cs typeface="+mn-cs"/>
+      </a:defRPr>
+    </a:lvl9pPr>
+  </p:notesStyle>
+</p:notesMaster>
 </file>
 
 <file path=ppt/slideLayouts/slideLayout1.xml><?xml version="1.0" encoding="utf-8"?>
@@ -303,7 +685,7 @@
             <a:fld id="{27CC59BE-5CA4-EB42-882C-C91C96C3157C}" type="datetimeFigureOut">
               <a:rPr lang="en-US" smtClean="0"/>
               <a:pPr/>
-              <a:t>8/16/15</a:t>
+              <a:t>8/22/15</a:t>
             </a:fld>
             <a:endParaRPr lang="en-US"/>
           </a:p>
@@ -475,7 +857,7 @@
             <a:fld id="{27CC59BE-5CA4-EB42-882C-C91C96C3157C}" type="datetimeFigureOut">
               <a:rPr lang="en-US" smtClean="0"/>
               <a:pPr/>
-              <a:t>8/16/15</a:t>
+              <a:t>8/22/15</a:t>
             </a:fld>
             <a:endParaRPr lang="en-US"/>
           </a:p>
@@ -657,7 +1039,7 @@
             <a:fld id="{27CC59BE-5CA4-EB42-882C-C91C96C3157C}" type="datetimeFigureOut">
               <a:rPr lang="en-US" smtClean="0"/>
               <a:pPr/>
-              <a:t>8/16/15</a:t>
+              <a:t>8/22/15</a:t>
             </a:fld>
             <a:endParaRPr lang="en-US"/>
           </a:p>
@@ -829,7 +1211,7 @@
             <a:fld id="{27CC59BE-5CA4-EB42-882C-C91C96C3157C}" type="datetimeFigureOut">
               <a:rPr lang="en-US" smtClean="0"/>
               <a:pPr/>
-              <a:t>8/16/15</a:t>
+              <a:t>8/22/15</a:t>
             </a:fld>
             <a:endParaRPr lang="en-US"/>
           </a:p>
@@ -1077,7 +1459,7 @@
             <a:fld id="{27CC59BE-5CA4-EB42-882C-C91C96C3157C}" type="datetimeFigureOut">
               <a:rPr lang="en-US" smtClean="0"/>
               <a:pPr/>
-              <a:t>8/16/15</a:t>
+              <a:t>8/22/15</a:t>
             </a:fld>
             <a:endParaRPr lang="en-US"/>
           </a:p>
@@ -1367,7 +1749,7 @@
             <a:fld id="{27CC59BE-5CA4-EB42-882C-C91C96C3157C}" type="datetimeFigureOut">
               <a:rPr lang="en-US" smtClean="0"/>
               <a:pPr/>
-              <a:t>8/16/15</a:t>
+              <a:t>8/22/15</a:t>
             </a:fld>
             <a:endParaRPr lang="en-US"/>
           </a:p>
@@ -1791,7 +2173,7 @@
             <a:fld id="{27CC59BE-5CA4-EB42-882C-C91C96C3157C}" type="datetimeFigureOut">
               <a:rPr lang="en-US" smtClean="0"/>
               <a:pPr/>
-              <a:t>8/16/15</a:t>
+              <a:t>8/22/15</a:t>
             </a:fld>
             <a:endParaRPr lang="en-US"/>
           </a:p>
@@ -1911,7 +2293,7 @@
             <a:fld id="{27CC59BE-5CA4-EB42-882C-C91C96C3157C}" type="datetimeFigureOut">
               <a:rPr lang="en-US" smtClean="0"/>
               <a:pPr/>
-              <a:t>8/16/15</a:t>
+              <a:t>8/22/15</a:t>
             </a:fld>
             <a:endParaRPr lang="en-US"/>
           </a:p>
@@ -2008,7 +2390,7 @@
             <a:fld id="{27CC59BE-5CA4-EB42-882C-C91C96C3157C}" type="datetimeFigureOut">
               <a:rPr lang="en-US" smtClean="0"/>
               <a:pPr/>
-              <a:t>8/16/15</a:t>
+              <a:t>8/22/15</a:t>
             </a:fld>
             <a:endParaRPr lang="en-US"/>
           </a:p>
@@ -2287,7 +2669,7 @@
             <a:fld id="{27CC59BE-5CA4-EB42-882C-C91C96C3157C}" type="datetimeFigureOut">
               <a:rPr lang="en-US" smtClean="0"/>
               <a:pPr/>
-              <a:t>8/16/15</a:t>
+              <a:t>8/22/15</a:t>
             </a:fld>
             <a:endParaRPr lang="en-US"/>
           </a:p>
@@ -2542,7 +2924,7 @@
             <a:fld id="{27CC59BE-5CA4-EB42-882C-C91C96C3157C}" type="datetimeFigureOut">
               <a:rPr lang="en-US" smtClean="0"/>
               <a:pPr/>
-              <a:t>8/16/15</a:t>
+              <a:t>8/22/15</a:t>
             </a:fld>
             <a:endParaRPr lang="en-US"/>
           </a:p>
@@ -2757,7 +3139,7 @@
             <a:fld id="{27CC59BE-5CA4-EB42-882C-C91C96C3157C}" type="datetimeFigureOut">
               <a:rPr lang="en-US" smtClean="0"/>
               <a:pPr/>
-              <a:t>8/16/15</a:t>
+              <a:t>8/22/15</a:t>
             </a:fld>
             <a:endParaRPr lang="en-US"/>
           </a:p>
@@ -3315,254 +3697,89 @@
         </p:nvSpPr>
         <p:spPr/>
         <p:txBody>
+          <a:bodyPr/>
+          <a:lstStyle/>
+          <a:p>
+            <a:r>
+              <a:rPr lang="en-US" dirty="0" smtClean="0"/>
+              <a:t>Prototype and Experiments</a:t>
+            </a:r>
+            <a:endParaRPr lang="en-US" dirty="0"/>
+          </a:p>
+        </p:txBody>
+      </p:sp>
+      <p:sp>
+        <p:nvSpPr>
+          <p:cNvPr id="3" name="Content Placeholder 2"/>
+          <p:cNvSpPr>
+            <a:spLocks noGrp="1"/>
+          </p:cNvSpPr>
+          <p:nvPr>
+            <p:ph idx="1"/>
+          </p:nvPr>
+        </p:nvSpPr>
+        <p:spPr/>
+        <p:txBody>
           <a:bodyPr>
-            <a:normAutofit fontScale="90000"/>
+            <a:normAutofit/>
           </a:bodyPr>
           <a:lstStyle/>
           <a:p>
             <a:r>
               <a:rPr lang="en-US" dirty="0" smtClean="0"/>
-              <a:t>QBETS: </a:t>
-            </a:r>
+              <a:t>SDK monitor: App Engine Java app</a:t>
+            </a:r>
+          </a:p>
+          <a:p>
             <a:r>
               <a:rPr lang="en-US" dirty="0" smtClean="0"/>
-              <a:t>Queue </a:t>
+              <a:t>Tests conducted on Google App Engine public cloud, and </a:t>
+            </a:r>
+            <a:r>
+              <a:rPr lang="en-US" dirty="0" err="1" smtClean="0"/>
+              <a:t>AppScale</a:t>
             </a:r>
             <a:r>
               <a:rPr lang="en-US" dirty="0" smtClean="0"/>
-              <a:t>Bounds Estimation from Time Series</a:t>
-            </a:r>
-            <a:endParaRPr lang="en-US" dirty="0"/>
-          </a:p>
-        </p:txBody>
-      </p:sp>
-      <p:sp>
-        <p:nvSpPr>
-          <p:cNvPr id="3" name="Content Placeholder 2"/>
-          <p:cNvSpPr>
-            <a:spLocks noGrp="1"/>
-          </p:cNvSpPr>
-          <p:nvPr>
-            <p:ph idx="1"/>
+              <a:t> private cloud (running on a 4-node Eucalyptus cluster)</a:t>
+            </a:r>
+          </a:p>
+          <a:p>
+            <a:r>
+              <a:rPr lang="en-US" dirty="0" smtClean="0"/>
+              <a:t>Network delay between client and Google is included but not modeled or predicted explicitly</a:t>
+            </a:r>
+          </a:p>
+        </p:txBody>
+      </p:sp>
+      <p:sp>
+        <p:nvSpPr>
+          <p:cNvPr id="4" name="Slide Number Placeholder 3"/>
+          <p:cNvSpPr>
+            <a:spLocks noGrp="1"/>
+          </p:cNvSpPr>
+          <p:nvPr>
+            <p:ph type="sldNum" sz="quarter" idx="12"/>
           </p:nvPr>
         </p:nvSpPr>
         <p:spPr/>
         <p:txBody>
-          <a:bodyPr>
-            <a:normAutofit fontScale="92500" lnSpcReduction="10000"/>
-          </a:bodyPr>
-          <a:lstStyle/>
-          <a:p>
-            <a:r>
-              <a:rPr lang="en-US" dirty="0" smtClean="0"/>
-              <a:t>Predicts </a:t>
-            </a:r>
-            <a:r>
-              <a:rPr lang="en-US" dirty="0" smtClean="0"/>
-              <a:t>instantaneous bounds </a:t>
-            </a:r>
-            <a:r>
-              <a:rPr lang="en-US" dirty="0" smtClean="0"/>
-              <a:t>on the </a:t>
-            </a:r>
-            <a:r>
-              <a:rPr lang="en-US" dirty="0" smtClean="0"/>
-              <a:t>percentiles </a:t>
-            </a:r>
-            <a:r>
-              <a:rPr lang="en-US" dirty="0" smtClean="0"/>
-              <a:t>of </a:t>
-            </a:r>
-            <a:r>
-              <a:rPr lang="en-US" dirty="0" smtClean="0"/>
-              <a:t>a </a:t>
-            </a:r>
-            <a:r>
-              <a:rPr lang="en-US" dirty="0" smtClean="0"/>
-              <a:t>time series</a:t>
-            </a:r>
-          </a:p>
-          <a:p>
-            <a:r>
-              <a:rPr lang="en-US" dirty="0" smtClean="0"/>
-              <a:t>Analyzes </a:t>
-            </a:r>
-            <a:r>
-              <a:rPr lang="en-US" dirty="0" smtClean="0"/>
-              <a:t>the first </a:t>
-            </a:r>
-            <a:r>
-              <a:rPr lang="en-US" i="1" dirty="0" smtClean="0"/>
-              <a:t>n</a:t>
-            </a:r>
-            <a:r>
-              <a:rPr lang="en-US" dirty="0" smtClean="0"/>
-              <a:t> entries in a time series</a:t>
-            </a:r>
-          </a:p>
-          <a:p>
-            <a:r>
-              <a:rPr lang="en-US" dirty="0" smtClean="0"/>
-              <a:t>Predicts an upper bound for the </a:t>
-            </a:r>
-            <a:r>
-              <a:rPr lang="en-US" i="1" dirty="0" smtClean="0"/>
-              <a:t>(n+1)</a:t>
-            </a:r>
-            <a:r>
-              <a:rPr lang="en-US" baseline="30000" dirty="0" err="1" smtClean="0"/>
-              <a:t>th</a:t>
-            </a:r>
-            <a:r>
-              <a:rPr lang="en-US" dirty="0" smtClean="0"/>
-              <a:t> entry</a:t>
-            </a:r>
-          </a:p>
-          <a:p>
-            <a:pPr lvl="1"/>
-            <a:r>
-              <a:rPr lang="en-US" i="1" dirty="0" smtClean="0"/>
-              <a:t>QBETS([x</a:t>
-            </a:r>
-            <a:r>
-              <a:rPr lang="en-US" i="1" baseline="-25000" dirty="0" smtClean="0"/>
-              <a:t>1</a:t>
-            </a:r>
-            <a:r>
-              <a:rPr lang="en-US" i="1" dirty="0" smtClean="0"/>
-              <a:t>,x</a:t>
-            </a:r>
-            <a:r>
-              <a:rPr lang="en-US" i="1" baseline="-25000" dirty="0" smtClean="0"/>
-              <a:t>2</a:t>
-            </a:r>
-            <a:r>
-              <a:rPr lang="en-US" i="1" dirty="0" smtClean="0"/>
-              <a:t>,…</a:t>
-            </a:r>
-            <a:r>
-              <a:rPr lang="en-US" i="1" dirty="0" err="1" smtClean="0"/>
-              <a:t>x</a:t>
-            </a:r>
-            <a:r>
-              <a:rPr lang="en-US" i="1" baseline="-25000" dirty="0" err="1" smtClean="0"/>
-              <a:t>n</a:t>
-            </a:r>
-            <a:r>
-              <a:rPr lang="en-US" i="1" dirty="0" smtClean="0"/>
-              <a:t>], p) = Q</a:t>
-            </a:r>
-            <a:r>
-              <a:rPr lang="en-US" dirty="0" smtClean="0"/>
-              <a:t> where </a:t>
-            </a:r>
-            <a:r>
-              <a:rPr lang="en-US" i="1" dirty="0" smtClean="0"/>
-              <a:t>p </a:t>
-            </a:r>
-            <a:r>
-              <a:rPr lang="en-US" i="1" dirty="0" smtClean="0">
-                <a:sym typeface="Symbol"/>
-              </a:rPr>
-              <a:t> </a:t>
-            </a:r>
-            <a:r>
-              <a:rPr lang="en-US" i="1" dirty="0" smtClean="0"/>
-              <a:t>(</a:t>
-            </a:r>
-            <a:r>
-              <a:rPr lang="en-US" i="1" dirty="0" smtClean="0"/>
-              <a:t>0,1)</a:t>
-            </a:r>
-            <a:endParaRPr lang="en-US" i="1" dirty="0" smtClean="0"/>
-          </a:p>
-          <a:p>
-            <a:pPr lvl="1"/>
-            <a:r>
-              <a:rPr lang="en-US" i="1" dirty="0" smtClean="0"/>
-              <a:t>P(x</a:t>
-            </a:r>
-            <a:r>
-              <a:rPr lang="en-US" i="1" baseline="-25000" dirty="0" smtClean="0"/>
-              <a:t>n+1</a:t>
-            </a:r>
-            <a:r>
-              <a:rPr lang="en-US" i="1" dirty="0" smtClean="0"/>
-              <a:t> ≤ Q) </a:t>
-            </a:r>
-            <a:r>
-              <a:rPr lang="en-US" i="1" dirty="0" smtClean="0"/>
-              <a:t>≥ </a:t>
-            </a:r>
-            <a:r>
-              <a:rPr lang="en-US" i="1" dirty="0" smtClean="0"/>
-              <a:t>p</a:t>
-            </a:r>
-          </a:p>
-          <a:p>
-            <a:r>
-              <a:rPr lang="en-US" dirty="0" smtClean="0"/>
-              <a:t>Cerebro </a:t>
-            </a:r>
-            <a:r>
-              <a:rPr lang="en-US" dirty="0" smtClean="0"/>
-              <a:t>uses QBETS to predict response time SLAs of the form:</a:t>
-            </a:r>
-          </a:p>
-          <a:p>
-            <a:pPr lvl="1"/>
-            <a:r>
-              <a:rPr lang="en-US" dirty="0" smtClean="0"/>
-              <a:t>Operation </a:t>
-            </a:r>
-            <a:r>
-              <a:rPr lang="en-US" i="1" dirty="0" smtClean="0"/>
-              <a:t>O</a:t>
-            </a:r>
-            <a:r>
-              <a:rPr lang="en-US" dirty="0" smtClean="0"/>
-              <a:t> responds </a:t>
-            </a:r>
-            <a:r>
-              <a:rPr lang="en-US" i="1" dirty="0" smtClean="0"/>
-              <a:t>under</a:t>
-            </a:r>
-            <a:r>
-              <a:rPr lang="en-US" dirty="0" smtClean="0"/>
-              <a:t> </a:t>
-            </a:r>
-            <a:r>
-              <a:rPr lang="en-US" i="1" dirty="0" smtClean="0"/>
-              <a:t>T</a:t>
-            </a:r>
-            <a:r>
-              <a:rPr lang="en-US" dirty="0" smtClean="0"/>
-              <a:t> milliseconds (</a:t>
-            </a:r>
-            <a:r>
-              <a:rPr lang="en-US" dirty="0" smtClean="0"/>
-              <a:t>100</a:t>
-            </a:r>
-            <a:r>
-              <a:rPr lang="en-US" i="1" dirty="0" smtClean="0"/>
-              <a:t>p</a:t>
-            </a:r>
-            <a:r>
-              <a:rPr lang="en-US" i="1" dirty="0" smtClean="0"/>
-              <a:t>)%</a:t>
-            </a:r>
-            <a:r>
-              <a:rPr lang="en-US" dirty="0" smtClean="0"/>
-              <a:t> of the time</a:t>
-            </a:r>
-            <a:endParaRPr lang="en-US" dirty="0"/>
+          <a:bodyPr/>
+          <a:lstStyle/>
+          <a:p>
+            <a:fld id="{3336F440-0623-F948-B0BF-C3A0BAE2BBD0}" type="slidenum">
+              <a:rPr lang="en-US" smtClean="0"/>
+              <a:pPr/>
+              <a:t>10</a:t>
+            </a:fld>
+            <a:endParaRPr lang="en-US"/>
           </a:p>
         </p:txBody>
       </p:sp>
     </p:spTree>
     <p:extLst>
       <p:ext uri="{BB962C8B-B14F-4D97-AF65-F5344CB8AC3E}">
-        <p14:creationId xmlns:p14="http://schemas.microsoft.com/office/powerpoint/2010/main" val="4294412330"/>
+        <p14:creationId xmlns:p14="http://schemas.microsoft.com/office/powerpoint/2010/main" val="2319692831"/>
       </p:ext>
     </p:extLst>
   </p:cSld>
@@ -3613,76 +3830,155 @@
           <a:p>
             <a:r>
               <a:rPr lang="en-US" dirty="0" smtClean="0"/>
-              <a:t>Prototype and Experiments</a:t>
+              <a:t>Evaluation: Prediction Correctness</a:t>
             </a:r>
             <a:endParaRPr lang="en-US" dirty="0"/>
           </a:p>
         </p:txBody>
       </p:sp>
-      <p:sp>
-        <p:nvSpPr>
-          <p:cNvPr id="3" name="Content Placeholder 2"/>
-          <p:cNvSpPr>
-            <a:spLocks noGrp="1"/>
-          </p:cNvSpPr>
+      <p:pic>
+        <p:nvPicPr>
+          <p:cNvPr id="4" name="Content Placeholder 3" descr="accuracy_summary.png"/>
+          <p:cNvPicPr>
+            <a:picLocks noGrp="1" noChangeAspect="1"/>
+          </p:cNvPicPr>
           <p:nvPr>
             <p:ph idx="1"/>
           </p:nvPr>
+        </p:nvPicPr>
+        <p:blipFill>
+          <a:blip r:embed="rId2">
+            <a:extLst>
+              <a:ext uri="{28A0092B-C50C-407E-A947-70E740481C1C}">
+                <a14:useLocalDpi xmlns:a14="http://schemas.microsoft.com/office/drawing/2010/main" val="0"/>
+              </a:ext>
+            </a:extLst>
+          </a:blip>
+          <a:srcRect l="-10610" r="-10610"/>
+          <a:stretch>
+            <a:fillRect/>
+          </a:stretch>
+        </p:blipFill>
+        <p:spPr>
+          <a:xfrm>
+            <a:off x="-337614" y="1308424"/>
+            <a:ext cx="9773046" cy="5374799"/>
+          </a:xfrm>
+        </p:spPr>
+      </p:pic>
+      <p:sp>
+        <p:nvSpPr>
+          <p:cNvPr id="3" name="Slide Number Placeholder 2"/>
+          <p:cNvSpPr>
+            <a:spLocks noGrp="1"/>
+          </p:cNvSpPr>
+          <p:nvPr>
+            <p:ph type="sldNum" sz="quarter" idx="12"/>
+          </p:nvPr>
         </p:nvSpPr>
         <p:spPr/>
         <p:txBody>
-          <a:bodyPr>
-            <a:normAutofit lnSpcReduction="10000"/>
-          </a:bodyPr>
-          <a:lstStyle/>
-          <a:p>
-            <a:r>
-              <a:rPr lang="en-US" dirty="0" smtClean="0"/>
-              <a:t>Static analyzer: Java (Soot framework)</a:t>
-            </a:r>
-          </a:p>
-          <a:p>
-            <a:r>
-              <a:rPr lang="en-US" dirty="0" smtClean="0"/>
-              <a:t>SDK monitor: App Engine Java app</a:t>
-            </a:r>
-          </a:p>
-          <a:p>
-            <a:r>
-              <a:rPr lang="en-US" dirty="0" smtClean="0"/>
-              <a:t>SLA predictor: Java, Go, C</a:t>
-            </a:r>
-          </a:p>
-          <a:p>
-            <a:r>
-              <a:rPr lang="en-US" dirty="0" smtClean="0"/>
-              <a:t>Tests conducted on Google App Engine public cloud, and </a:t>
-            </a:r>
-            <a:r>
-              <a:rPr lang="en-US" dirty="0" err="1" smtClean="0"/>
-              <a:t>AppScale</a:t>
-            </a:r>
-            <a:r>
-              <a:rPr lang="en-US" dirty="0" smtClean="0"/>
-              <a:t> private cloud (running on a 4-node Eucalyptus cluster)</a:t>
-            </a:r>
-          </a:p>
-          <a:p>
-            <a:r>
-              <a:rPr lang="en-US" dirty="0" smtClean="0"/>
-              <a:t>Network </a:t>
-            </a:r>
-            <a:r>
-              <a:rPr lang="en-US" dirty="0" smtClean="0"/>
-              <a:t>delay between client and Google is included but not modeled or predicted explicitly</a:t>
-            </a:r>
+          <a:bodyPr/>
+          <a:lstStyle/>
+          <a:p>
+            <a:fld id="{3336F440-0623-F948-B0BF-C3A0BAE2BBD0}" type="slidenum">
+              <a:rPr lang="en-US" smtClean="0"/>
+              <a:pPr/>
+              <a:t>11</a:t>
+            </a:fld>
+            <a:endParaRPr lang="en-US"/>
+          </a:p>
+        </p:txBody>
+      </p:sp>
+      <p:cxnSp>
+        <p:nvCxnSpPr>
+          <p:cNvPr id="6" name="Straight Connector 5"/>
+          <p:cNvCxnSpPr/>
+          <p:nvPr/>
+        </p:nvCxnSpPr>
+        <p:spPr>
+          <a:xfrm>
+            <a:off x="1295747" y="3360853"/>
+            <a:ext cx="7197172" cy="0"/>
+          </a:xfrm>
+          <a:prstGeom prst="line">
+            <a:avLst/>
+          </a:prstGeom>
+          <a:ln>
+            <a:solidFill>
+              <a:srgbClr val="008000"/>
+            </a:solidFill>
+          </a:ln>
+        </p:spPr>
+        <p:style>
+          <a:lnRef idx="2">
+            <a:schemeClr val="accent1"/>
+          </a:lnRef>
+          <a:fillRef idx="0">
+            <a:schemeClr val="accent1"/>
+          </a:fillRef>
+          <a:effectRef idx="1">
+            <a:schemeClr val="accent1"/>
+          </a:effectRef>
+          <a:fontRef idx="minor">
+            <a:schemeClr val="tx1"/>
+          </a:fontRef>
+        </p:style>
+      </p:cxnSp>
+      <p:sp>
+        <p:nvSpPr>
+          <p:cNvPr id="7" name="Rectangle 6"/>
+          <p:cNvSpPr/>
+          <p:nvPr/>
+        </p:nvSpPr>
+        <p:spPr>
+          <a:xfrm>
+            <a:off x="923701" y="3181265"/>
+            <a:ext cx="362902" cy="359175"/>
+          </a:xfrm>
+          <a:prstGeom prst="rect">
+            <a:avLst/>
+          </a:prstGeom>
+          <a:noFill/>
+          <a:ln w="38100" cmpd="sng">
+            <a:solidFill>
+              <a:srgbClr val="008000"/>
+            </a:solidFill>
+          </a:ln>
+        </p:spPr>
+        <p:style>
+          <a:lnRef idx="1">
+            <a:schemeClr val="accent1"/>
+          </a:lnRef>
+          <a:fillRef idx="3">
+            <a:schemeClr val="accent1"/>
+          </a:fillRef>
+          <a:effectRef idx="2">
+            <a:schemeClr val="accent1"/>
+          </a:effectRef>
+          <a:fontRef idx="minor">
+            <a:schemeClr val="lt1"/>
+          </a:fontRef>
+        </p:style>
+        <p:txBody>
+          <a:bodyPr rtlCol="0" anchor="ctr"/>
+          <a:lstStyle/>
+          <a:p>
+            <a:pPr algn="ctr"/>
+            <a:endParaRPr lang="en-US">
+              <a:ln w="19050" cmpd="sng">
+                <a:solidFill>
+                  <a:srgbClr val="000000"/>
+                </a:solidFill>
+              </a:ln>
+            </a:endParaRPr>
           </a:p>
         </p:txBody>
       </p:sp>
     </p:spTree>
     <p:extLst>
       <p:ext uri="{BB962C8B-B14F-4D97-AF65-F5344CB8AC3E}">
-        <p14:creationId xmlns:p14="http://schemas.microsoft.com/office/powerpoint/2010/main" val="2319692831"/>
+        <p14:creationId xmlns:p14="http://schemas.microsoft.com/office/powerpoint/2010/main" val="819227144"/>
       </p:ext>
     </p:extLst>
   </p:cSld>
@@ -3733,7 +4029,7 @@
           <a:p>
             <a:r>
               <a:rPr lang="en-US" dirty="0" smtClean="0"/>
-              <a:t>Evaluation: Prediction Correctness</a:t>
+              <a:t>Evaluation: Prediction Tightness </a:t>
             </a:r>
             <a:endParaRPr lang="en-US" dirty="0"/>
           </a:p>
@@ -3741,7 +4037,7 @@
       </p:sp>
       <p:pic>
         <p:nvPicPr>
-          <p:cNvPr id="4" name="Content Placeholder 3" descr="accuracy_summary.png"/>
+          <p:cNvPr id="4" name="Content Placeholder 3" descr="diff_summary.png"/>
           <p:cNvPicPr>
             <a:picLocks noGrp="1" noChangeAspect="1"/>
           </p:cNvPicPr>
@@ -3757,22 +4053,46 @@
               </a:ext>
             </a:extLst>
           </a:blip>
-          <a:srcRect l="-10610" r="-10610"/>
+          <a:srcRect l="-10678" r="-10678"/>
           <a:stretch>
             <a:fillRect/>
           </a:stretch>
         </p:blipFill>
         <p:spPr>
           <a:xfrm>
-            <a:off x="-337614" y="1308424"/>
-            <a:ext cx="9773046" cy="5374799"/>
+            <a:off x="-406425" y="1283494"/>
+            <a:ext cx="9771727" cy="5374073"/>
           </a:xfrm>
         </p:spPr>
       </p:pic>
+      <p:sp>
+        <p:nvSpPr>
+          <p:cNvPr id="3" name="Slide Number Placeholder 2"/>
+          <p:cNvSpPr>
+            <a:spLocks noGrp="1"/>
+          </p:cNvSpPr>
+          <p:nvPr>
+            <p:ph type="sldNum" sz="quarter" idx="12"/>
+          </p:nvPr>
+        </p:nvSpPr>
+        <p:spPr/>
+        <p:txBody>
+          <a:bodyPr/>
+          <a:lstStyle/>
+          <a:p>
+            <a:fld id="{3336F440-0623-F948-B0BF-C3A0BAE2BBD0}" type="slidenum">
+              <a:rPr lang="en-US" smtClean="0"/>
+              <a:pPr/>
+              <a:t>12</a:t>
+            </a:fld>
+            <a:endParaRPr lang="en-US"/>
+          </a:p>
+        </p:txBody>
+      </p:sp>
     </p:spTree>
     <p:extLst>
       <p:ext uri="{BB962C8B-B14F-4D97-AF65-F5344CB8AC3E}">
-        <p14:creationId xmlns:p14="http://schemas.microsoft.com/office/powerpoint/2010/main" val="819227144"/>
+        <p14:creationId xmlns:p14="http://schemas.microsoft.com/office/powerpoint/2010/main" val="1944381813"/>
       </p:ext>
     </p:extLst>
   </p:cSld>
@@ -3818,51 +4138,119 @@
         </p:nvSpPr>
         <p:spPr/>
         <p:txBody>
+          <a:bodyPr>
+            <a:normAutofit/>
+          </a:bodyPr>
+          <a:lstStyle/>
+          <a:p>
+            <a:r>
+              <a:rPr lang="en-US" dirty="0" smtClean="0"/>
+              <a:t>Conclusions and Future Work</a:t>
+            </a:r>
+            <a:endParaRPr lang="en-US" dirty="0"/>
+          </a:p>
+        </p:txBody>
+      </p:sp>
+      <p:sp>
+        <p:nvSpPr>
+          <p:cNvPr id="3" name="Content Placeholder 2"/>
+          <p:cNvSpPr>
+            <a:spLocks noGrp="1"/>
+          </p:cNvSpPr>
+          <p:nvPr>
+            <p:ph idx="1"/>
+          </p:nvPr>
+        </p:nvSpPr>
+        <p:spPr/>
+        <p:txBody>
+          <a:bodyPr>
+            <a:normAutofit fontScale="92500" lnSpcReduction="10000"/>
+          </a:bodyPr>
+          <a:lstStyle/>
+          <a:p>
+            <a:r>
+              <a:rPr lang="en-US" dirty="0" err="1" smtClean="0"/>
+              <a:t>Cerebro</a:t>
+            </a:r>
+            <a:r>
+              <a:rPr lang="en-US" dirty="0" smtClean="0"/>
+              <a:t> predictions are correct and moderately tight</a:t>
+            </a:r>
+          </a:p>
+          <a:p>
+            <a:pPr lvl="1"/>
+            <a:r>
+              <a:rPr lang="en-US" dirty="0" smtClean="0"/>
+              <a:t>Necessary conditions for use in an SLA</a:t>
+            </a:r>
+          </a:p>
+          <a:p>
+            <a:r>
+              <a:rPr lang="en-US" dirty="0" smtClean="0"/>
+              <a:t>SLA durability period analysis</a:t>
+            </a:r>
+          </a:p>
+          <a:p>
+            <a:pPr lvl="1"/>
+            <a:r>
+              <a:rPr lang="en-US" dirty="0" smtClean="0"/>
+              <a:t>GAE: 26.8 hours</a:t>
+            </a:r>
+          </a:p>
+          <a:p>
+            <a:pPr lvl="1"/>
+            <a:r>
+              <a:rPr lang="en-US" dirty="0" err="1" smtClean="0"/>
+              <a:t>AppScale</a:t>
+            </a:r>
+            <a:r>
+              <a:rPr lang="en-US" dirty="0" smtClean="0"/>
+              <a:t>: 33.7 hours</a:t>
+            </a:r>
+          </a:p>
+          <a:p>
+            <a:r>
+              <a:rPr lang="en-US" dirty="0" smtClean="0"/>
+              <a:t>SLA-related policy enforcement at deployment time with EAGER</a:t>
+            </a:r>
+          </a:p>
+          <a:p>
+            <a:r>
+              <a:rPr lang="en-US" dirty="0" smtClean="0"/>
+              <a:t>Adaptive benchmarking for cloud SDK monitor</a:t>
+            </a:r>
+            <a:endParaRPr lang="en-US" dirty="0"/>
+          </a:p>
+        </p:txBody>
+      </p:sp>
+      <p:sp>
+        <p:nvSpPr>
+          <p:cNvPr id="4" name="Slide Number Placeholder 3"/>
+          <p:cNvSpPr>
+            <a:spLocks noGrp="1"/>
+          </p:cNvSpPr>
+          <p:nvPr>
+            <p:ph type="sldNum" sz="quarter" idx="12"/>
+          </p:nvPr>
+        </p:nvSpPr>
+        <p:spPr/>
+        <p:txBody>
           <a:bodyPr/>
           <a:lstStyle/>
           <a:p>
-            <a:r>
-              <a:rPr lang="en-US" dirty="0" smtClean="0"/>
-              <a:t>Evaluation: Prediction Tightness </a:t>
-            </a:r>
-            <a:endParaRPr lang="en-US" dirty="0"/>
-          </a:p>
-        </p:txBody>
-      </p:sp>
-      <p:pic>
-        <p:nvPicPr>
-          <p:cNvPr id="4" name="Content Placeholder 3" descr="diff_summary.png"/>
-          <p:cNvPicPr>
-            <a:picLocks noGrp="1" noChangeAspect="1"/>
-          </p:cNvPicPr>
-          <p:nvPr>
-            <p:ph idx="1"/>
-          </p:nvPr>
-        </p:nvPicPr>
-        <p:blipFill>
-          <a:blip r:embed="rId2">
-            <a:extLst>
-              <a:ext uri="{28A0092B-C50C-407E-A947-70E740481C1C}">
-                <a14:useLocalDpi xmlns:a14="http://schemas.microsoft.com/office/drawing/2010/main" val="0"/>
-              </a:ext>
-            </a:extLst>
-          </a:blip>
-          <a:srcRect l="-10678" r="-10678"/>
-          <a:stretch>
-            <a:fillRect/>
-          </a:stretch>
-        </p:blipFill>
-        <p:spPr>
-          <a:xfrm>
-            <a:off x="-406425" y="1283494"/>
-            <a:ext cx="9771727" cy="5374073"/>
-          </a:xfrm>
-        </p:spPr>
-      </p:pic>
+            <a:fld id="{3336F440-0623-F948-B0BF-C3A0BAE2BBD0}" type="slidenum">
+              <a:rPr lang="en-US" smtClean="0"/>
+              <a:pPr/>
+              <a:t>13</a:t>
+            </a:fld>
+            <a:endParaRPr lang="en-US"/>
+          </a:p>
+        </p:txBody>
+      </p:sp>
     </p:spTree>
     <p:extLst>
       <p:ext uri="{BB962C8B-B14F-4D97-AF65-F5344CB8AC3E}">
-        <p14:creationId xmlns:p14="http://schemas.microsoft.com/office/powerpoint/2010/main" val="1944381813"/>
+        <p14:creationId xmlns:p14="http://schemas.microsoft.com/office/powerpoint/2010/main" val="2936306023"/>
       </p:ext>
     </p:extLst>
   </p:cSld>
@@ -3908,6 +4296,34 @@
         </p:nvSpPr>
         <p:spPr/>
         <p:txBody>
+          <a:bodyPr/>
+          <a:lstStyle/>
+          <a:p>
+            <a:r>
+              <a:rPr lang="en-US" dirty="0" smtClean="0"/>
+              <a:t>Thank You! Questions?</a:t>
+            </a:r>
+            <a:endParaRPr lang="en-US" dirty="0"/>
+          </a:p>
+        </p:txBody>
+      </p:sp>
+      <p:sp>
+        <p:nvSpPr>
+          <p:cNvPr id="3" name="Content Placeholder 2"/>
+          <p:cNvSpPr>
+            <a:spLocks noGrp="1"/>
+          </p:cNvSpPr>
+          <p:nvPr>
+            <p:ph idx="1"/>
+          </p:nvPr>
+        </p:nvSpPr>
+        <p:spPr>
+          <a:xfrm>
+            <a:off x="457200" y="1600200"/>
+            <a:ext cx="8229600" cy="4525963"/>
+          </a:xfrm>
+        </p:spPr>
+        <p:txBody>
           <a:bodyPr>
             <a:normAutofit/>
           </a:bodyPr>
@@ -3915,97 +4331,97 @@
           <a:p>
             <a:r>
               <a:rPr lang="en-US" dirty="0" smtClean="0"/>
-              <a:t>Conclusions </a:t>
+              <a:t>Hiranya Jayathilaka (</a:t>
+            </a:r>
+            <a:r>
+              <a:rPr lang="en-US" dirty="0" err="1" smtClean="0"/>
+              <a:t>hiranya@cs.ucsb.edu</a:t>
             </a:r>
             <a:r>
               <a:rPr lang="en-US" dirty="0" smtClean="0"/>
-              <a:t>and Future Work</a:t>
+              <a:t>)</a:t>
+            </a:r>
+          </a:p>
+          <a:p>
+            <a:r>
+              <a:rPr lang="en-US" dirty="0" smtClean="0"/>
+              <a:t>The UCSB Lab for Research on Adaptive Computing Environments</a:t>
+            </a:r>
+          </a:p>
+          <a:p>
+            <a:pPr lvl="1"/>
+            <a:r>
+              <a:rPr lang="en-US" dirty="0" smtClean="0"/>
+              <a:t>The </a:t>
+            </a:r>
+            <a:r>
+              <a:rPr lang="en-US" dirty="0" err="1" smtClean="0"/>
+              <a:t>RACELab</a:t>
+            </a:r>
+            <a:r>
+              <a:rPr lang="en-US" dirty="0" smtClean="0"/>
+              <a:t> -- http://</a:t>
+            </a:r>
+            <a:r>
+              <a:rPr lang="en-US" dirty="0" err="1" smtClean="0"/>
+              <a:t>www.cs.ucsb.edu/~ckrintz/racelab.html</a:t>
             </a:r>
             <a:endParaRPr lang="en-US" dirty="0"/>
           </a:p>
         </p:txBody>
       </p:sp>
-      <p:sp>
-        <p:nvSpPr>
-          <p:cNvPr id="3" name="Content Placeholder 2"/>
-          <p:cNvSpPr>
-            <a:spLocks noGrp="1"/>
-          </p:cNvSpPr>
-          <p:nvPr>
-            <p:ph idx="1"/>
+      <p:pic>
+        <p:nvPicPr>
+          <p:cNvPr id="4" name="Picture 3" descr="RaceLogo.png"/>
+          <p:cNvPicPr>
+            <a:picLocks noChangeAspect="1"/>
+          </p:cNvPicPr>
+          <p:nvPr/>
+        </p:nvPicPr>
+        <p:blipFill>
+          <a:blip r:embed="rId2"/>
+          <a:stretch>
+            <a:fillRect/>
+          </a:stretch>
+        </p:blipFill>
+        <p:spPr>
+          <a:xfrm>
+            <a:off x="2427373" y="4413766"/>
+            <a:ext cx="4289254" cy="1974419"/>
+          </a:xfrm>
+          <a:prstGeom prst="rect">
+            <a:avLst/>
+          </a:prstGeom>
+        </p:spPr>
+      </p:pic>
+      <p:sp>
+        <p:nvSpPr>
+          <p:cNvPr id="5" name="Slide Number Placeholder 4"/>
+          <p:cNvSpPr>
+            <a:spLocks noGrp="1"/>
+          </p:cNvSpPr>
+          <p:nvPr>
+            <p:ph type="sldNum" sz="quarter" idx="12"/>
           </p:nvPr>
         </p:nvSpPr>
         <p:spPr/>
         <p:txBody>
-          <a:bodyPr>
-            <a:normAutofit fontScale="92500" lnSpcReduction="10000"/>
-          </a:bodyPr>
-          <a:lstStyle/>
-          <a:p>
-            <a:r>
-              <a:rPr lang="en-US" dirty="0" err="1" smtClean="0"/>
-              <a:t>Cerebro</a:t>
-            </a:r>
-            <a:r>
-              <a:rPr lang="en-US" dirty="0" smtClean="0"/>
-              <a:t> predictions are correct and moderately tight</a:t>
-            </a:r>
-          </a:p>
-          <a:p>
-            <a:pPr lvl="1"/>
-            <a:r>
-              <a:rPr lang="en-US" dirty="0" smtClean="0"/>
-              <a:t>Necessary conditions for use in an SLA</a:t>
-            </a:r>
-          </a:p>
-          <a:p>
-            <a:r>
-              <a:rPr lang="en-US" dirty="0" smtClean="0"/>
-              <a:t>SLA durability period analysis</a:t>
-            </a:r>
-            <a:endParaRPr lang="en-US" dirty="0" smtClean="0"/>
-          </a:p>
-          <a:p>
-            <a:pPr lvl="1"/>
-            <a:r>
-              <a:rPr lang="en-US" dirty="0" smtClean="0"/>
-              <a:t>GAE: 26.8 hours</a:t>
-            </a:r>
-          </a:p>
-          <a:p>
-            <a:pPr lvl="1"/>
-            <a:r>
-              <a:rPr lang="en-US" dirty="0" err="1" smtClean="0"/>
-              <a:t>AppScale</a:t>
-            </a:r>
-            <a:r>
-              <a:rPr lang="en-US" dirty="0" smtClean="0"/>
-              <a:t>: 33.7 hours</a:t>
-            </a:r>
-          </a:p>
-          <a:p>
-            <a:r>
-              <a:rPr lang="en-US" dirty="0" smtClean="0"/>
-              <a:t>SLA</a:t>
-            </a:r>
-            <a:r>
-              <a:rPr lang="en-US" dirty="0" smtClean="0"/>
-              <a:t>-related policy enforcement at deployment time with EAGER</a:t>
-            </a:r>
-          </a:p>
-          <a:p>
-            <a:r>
-              <a:rPr lang="en-US" dirty="0" smtClean="0"/>
-              <a:t>Adaptive benchmarking for cloud SDK monitor</a:t>
-            </a:r>
-            <a:endParaRPr lang="en-US" dirty="0"/>
+          <a:bodyPr/>
+          <a:lstStyle/>
+          <a:p>
+            <a:fld id="{3336F440-0623-F948-B0BF-C3A0BAE2BBD0}" type="slidenum">
+              <a:rPr lang="en-US" smtClean="0"/>
+              <a:pPr/>
+              <a:t>14</a:t>
+            </a:fld>
+            <a:endParaRPr lang="en-US"/>
           </a:p>
         </p:txBody>
       </p:sp>
     </p:spTree>
     <p:extLst>
       <p:ext uri="{BB962C8B-B14F-4D97-AF65-F5344CB8AC3E}">
-        <p14:creationId xmlns:p14="http://schemas.microsoft.com/office/powerpoint/2010/main" val="2936306023"/>
+        <p14:creationId xmlns:p14="http://schemas.microsoft.com/office/powerpoint/2010/main" val="2757626693"/>
       </p:ext>
     </p:extLst>
   </p:cSld>
@@ -4039,121 +4455,134 @@
           <a:chExt cx="0" cy="0"/>
         </a:xfrm>
       </p:grpSpPr>
-      <p:sp>
-        <p:nvSpPr>
-          <p:cNvPr id="2" name="Title 1"/>
-          <p:cNvSpPr>
-            <a:spLocks noGrp="1"/>
-          </p:cNvSpPr>
-          <p:nvPr>
-            <p:ph type="title"/>
-          </p:nvPr>
-        </p:nvSpPr>
-        <p:spPr/>
-        <p:txBody>
-          <a:bodyPr/>
-          <a:lstStyle/>
-          <a:p>
-            <a:r>
-              <a:rPr lang="en-US" dirty="0" smtClean="0"/>
-              <a:t>Thank You! Questions?</a:t>
-            </a:r>
-            <a:endParaRPr lang="en-US" dirty="0"/>
-          </a:p>
-        </p:txBody>
-      </p:sp>
-      <p:sp>
-        <p:nvSpPr>
-          <p:cNvPr id="3" name="Content Placeholder 2"/>
-          <p:cNvSpPr>
-            <a:spLocks noGrp="1"/>
-          </p:cNvSpPr>
-          <p:nvPr>
-            <p:ph idx="1"/>
-          </p:nvPr>
-        </p:nvSpPr>
-        <p:spPr>
-          <a:xfrm>
-            <a:off x="457200" y="1600200"/>
-            <a:ext cx="8229600" cy="4525963"/>
-          </a:xfrm>
-        </p:spPr>
-        <p:txBody>
-          <a:bodyPr>
-            <a:normAutofit/>
-          </a:bodyPr>
-          <a:lstStyle/>
-          <a:p>
-            <a:r>
-              <a:rPr lang="en-US" dirty="0" smtClean="0"/>
-              <a:t>Hiranya Jayathilaka (</a:t>
-            </a:r>
-            <a:r>
-              <a:rPr lang="en-US" dirty="0" err="1" smtClean="0"/>
-              <a:t>hiranya@cs.ucsb.edu</a:t>
-            </a:r>
-            <a:r>
-              <a:rPr lang="en-US" dirty="0" smtClean="0"/>
-              <a:t>)</a:t>
-            </a:r>
-            <a:endParaRPr lang="en-US" dirty="0" smtClean="0"/>
-          </a:p>
-          <a:p>
-            <a:r>
-              <a:rPr lang="en-US" dirty="0" smtClean="0"/>
-              <a:t>The UCSB Lab for Research on Adaptive Computing Environments</a:t>
-            </a:r>
-          </a:p>
-          <a:p>
-            <a:pPr lvl="1"/>
-            <a:r>
-              <a:rPr lang="en-US" dirty="0" smtClean="0"/>
-              <a:t>The </a:t>
-            </a:r>
-            <a:r>
-              <a:rPr lang="en-US" dirty="0" err="1" smtClean="0"/>
-              <a:t>RACELab</a:t>
-            </a:r>
-            <a:r>
-              <a:rPr lang="en-US" dirty="0" smtClean="0"/>
-              <a:t> -- http://</a:t>
-            </a:r>
-            <a:r>
-              <a:rPr lang="en-US" dirty="0" err="1" smtClean="0"/>
-              <a:t>www.cs.ucsb.edu/~ckrintz/racelab.html</a:t>
-            </a:r>
-            <a:endParaRPr lang="en-US" dirty="0"/>
-          </a:p>
-        </p:txBody>
-      </p:sp>
       <p:pic>
         <p:nvPicPr>
-          <p:cNvPr id="4" name="Picture 3" descr="RaceLogo.png"/>
+          <p:cNvPr id="4" name="Picture 3" descr="Growing_API_Categories.png"/>
           <p:cNvPicPr>
             <a:picLocks noChangeAspect="1"/>
           </p:cNvPicPr>
           <p:nvPr/>
         </p:nvPicPr>
         <p:blipFill>
-          <a:blip r:embed="rId2"/>
+          <a:blip r:embed="rId2">
+            <a:extLst>
+              <a:ext uri="{28A0092B-C50C-407E-A947-70E740481C1C}">
+                <a14:useLocalDpi xmlns:a14="http://schemas.microsoft.com/office/drawing/2010/main" val="0"/>
+              </a:ext>
+            </a:extLst>
+          </a:blip>
           <a:stretch>
             <a:fillRect/>
           </a:stretch>
         </p:blipFill>
         <p:spPr>
           <a:xfrm>
-            <a:off x="2427373" y="4413766"/>
-            <a:ext cx="4289254" cy="1974419"/>
+            <a:off x="295941" y="104482"/>
+            <a:ext cx="8552118" cy="5601851"/>
           </a:xfrm>
           <a:prstGeom prst="rect">
             <a:avLst/>
           </a:prstGeom>
         </p:spPr>
       </p:pic>
+      <p:sp>
+        <p:nvSpPr>
+          <p:cNvPr id="5" name="TextBox 4"/>
+          <p:cNvSpPr txBox="1"/>
+          <p:nvPr/>
+        </p:nvSpPr>
+        <p:spPr>
+          <a:xfrm>
+            <a:off x="295941" y="5447424"/>
+            <a:ext cx="8552118" cy="1412694"/>
+          </a:xfrm>
+          <a:prstGeom prst="rect">
+            <a:avLst/>
+          </a:prstGeom>
+          <a:noFill/>
+        </p:spPr>
+        <p:txBody>
+          <a:bodyPr wrap="square" rtlCol="0">
+            <a:spAutoFit/>
+          </a:bodyPr>
+          <a:lstStyle/>
+          <a:p>
+            <a:pPr>
+              <a:lnSpc>
+                <a:spcPct val="120000"/>
+              </a:lnSpc>
+            </a:pPr>
+            <a:r>
+              <a:rPr lang="en-US" b="1" dirty="0" smtClean="0"/>
+              <a:t>Non-commercial entities are joining the API party too…</a:t>
+            </a:r>
+          </a:p>
+          <a:p>
+            <a:pPr marL="285750" indent="-285750">
+              <a:lnSpc>
+                <a:spcPct val="120000"/>
+              </a:lnSpc>
+              <a:buFont typeface="Arial"/>
+              <a:buChar char="•"/>
+            </a:pPr>
+            <a:r>
+              <a:rPr lang="en-US" dirty="0" smtClean="0"/>
+              <a:t>White House API Program: </a:t>
+            </a:r>
+            <a:r>
+              <a:rPr lang="en-US" dirty="0" smtClean="0">
+                <a:hlinkClick r:id="rId3"/>
+              </a:rPr>
+              <a:t>https://www.whitehouse.gov/digitalgov/apis</a:t>
+            </a:r>
+            <a:endParaRPr lang="en-US" dirty="0" smtClean="0"/>
+          </a:p>
+          <a:p>
+            <a:pPr marL="285750" indent="-285750">
+              <a:lnSpc>
+                <a:spcPct val="120000"/>
+              </a:lnSpc>
+              <a:buFont typeface="Arial"/>
+              <a:buChar char="•"/>
+            </a:pPr>
+            <a:r>
+              <a:rPr lang="en-US" dirty="0" smtClean="0"/>
+              <a:t>IEEE APIs: </a:t>
+            </a:r>
+            <a:r>
+              <a:rPr lang="en-US" dirty="0" smtClean="0">
+                <a:hlinkClick r:id="rId4"/>
+              </a:rPr>
+              <a:t>http://ieeexplore.ieee.org/gateway/</a:t>
+            </a:r>
+            <a:endParaRPr lang="en-US" dirty="0" smtClean="0"/>
+          </a:p>
+          <a:p>
+            <a:pPr marL="285750" indent="-285750">
+              <a:lnSpc>
+                <a:spcPct val="120000"/>
+              </a:lnSpc>
+              <a:buFont typeface="Arial"/>
+              <a:buChar char="•"/>
+            </a:pPr>
+            <a:r>
+              <a:rPr lang="en-US" dirty="0" smtClean="0"/>
+              <a:t>UC Berkeley APIs: </a:t>
+            </a:r>
+            <a:r>
+              <a:rPr lang="en-US" dirty="0" smtClean="0">
+                <a:hlinkClick r:id="rId5"/>
+              </a:rPr>
+              <a:t>https://api-central.berkeley.edu/</a:t>
+            </a:r>
+            <a:endParaRPr lang="en-US" dirty="0" smtClean="0"/>
+          </a:p>
+        </p:txBody>
+      </p:sp>
     </p:spTree>
     <p:extLst>
       <p:ext uri="{BB962C8B-B14F-4D97-AF65-F5344CB8AC3E}">
-        <p14:creationId xmlns:p14="http://schemas.microsoft.com/office/powerpoint/2010/main" val="2757626693"/>
+        <p14:creationId xmlns:p14="http://schemas.microsoft.com/office/powerpoint/2010/main" val="531657839"/>
       </p:ext>
     </p:extLst>
   </p:cSld>
@@ -4242,8 +4671,13 @@
             <a:pPr algn="ctr"/>
             <a:r>
               <a:rPr lang="en-US" b="1" dirty="0" smtClean="0"/>
-              <a:t>Number of API Today: 13800+</a:t>
-            </a:r>
+              <a:t>Number of API Today: </a:t>
+            </a:r>
+            <a:r>
+              <a:rPr lang="en-US" b="1" dirty="0" smtClean="0"/>
+              <a:t>~14,000</a:t>
+            </a:r>
+            <a:endParaRPr lang="en-US" b="1" dirty="0" smtClean="0"/>
           </a:p>
           <a:p>
             <a:pPr algn="ctr"/>
@@ -4268,6 +4702,30 @@
               <a:t>-research</a:t>
             </a:r>
             <a:endParaRPr lang="en-US" sz="1400" dirty="0"/>
+          </a:p>
+        </p:txBody>
+      </p:sp>
+      <p:sp>
+        <p:nvSpPr>
+          <p:cNvPr id="2" name="Slide Number Placeholder 1"/>
+          <p:cNvSpPr>
+            <a:spLocks noGrp="1"/>
+          </p:cNvSpPr>
+          <p:nvPr>
+            <p:ph type="sldNum" sz="quarter" idx="12"/>
+          </p:nvPr>
+        </p:nvSpPr>
+        <p:spPr/>
+        <p:txBody>
+          <a:bodyPr/>
+          <a:lstStyle/>
+          <a:p>
+            <a:fld id="{3336F440-0623-F948-B0BF-C3A0BAE2BBD0}" type="slidenum">
+              <a:rPr lang="en-US" smtClean="0"/>
+              <a:pPr/>
+              <a:t>2</a:t>
+            </a:fld>
+            <a:endParaRPr lang="en-US"/>
           </a:p>
         </p:txBody>
       </p:sp>
@@ -4308,193 +4766,24 @@
           <a:chExt cx="0" cy="0"/>
         </a:xfrm>
       </p:grpSpPr>
-      <p:pic>
-        <p:nvPicPr>
-          <p:cNvPr id="4" name="Picture 3" descr="Growing_API_Categories.png"/>
-          <p:cNvPicPr>
-            <a:picLocks noChangeAspect="1"/>
-          </p:cNvPicPr>
-          <p:nvPr/>
-        </p:nvPicPr>
-        <p:blipFill>
-          <a:blip r:embed="rId2">
-            <a:extLst>
-              <a:ext uri="{28A0092B-C50C-407E-A947-70E740481C1C}">
-                <a14:useLocalDpi xmlns:a14="http://schemas.microsoft.com/office/drawing/2010/main" val="0"/>
-              </a:ext>
-            </a:extLst>
-          </a:blip>
-          <a:stretch>
-            <a:fillRect/>
-          </a:stretch>
-        </p:blipFill>
-        <p:spPr>
-          <a:xfrm>
-            <a:off x="295941" y="104482"/>
-            <a:ext cx="8552118" cy="5601851"/>
-          </a:xfrm>
-          <a:prstGeom prst="rect">
-            <a:avLst/>
-          </a:prstGeom>
-        </p:spPr>
-      </p:pic>
-      <p:sp>
-        <p:nvSpPr>
-          <p:cNvPr id="5" name="TextBox 4"/>
-          <p:cNvSpPr txBox="1"/>
-          <p:nvPr/>
-        </p:nvSpPr>
-        <p:spPr>
-          <a:xfrm>
-            <a:off x="295941" y="5447424"/>
-            <a:ext cx="8552118" cy="1412694"/>
-          </a:xfrm>
-          <a:prstGeom prst="rect">
-            <a:avLst/>
-          </a:prstGeom>
-          <a:noFill/>
-        </p:spPr>
-        <p:txBody>
-          <a:bodyPr wrap="square" rtlCol="0">
-            <a:spAutoFit/>
-          </a:bodyPr>
-          <a:lstStyle/>
-          <a:p>
-            <a:pPr>
-              <a:lnSpc>
-                <a:spcPct val="120000"/>
-              </a:lnSpc>
-            </a:pPr>
-            <a:r>
-              <a:rPr lang="en-US" b="1" dirty="0" smtClean="0"/>
-              <a:t>Non-commercial entities are joining the API party too…</a:t>
-            </a:r>
-          </a:p>
-          <a:p>
-            <a:pPr marL="285750" indent="-285750">
-              <a:lnSpc>
-                <a:spcPct val="120000"/>
-              </a:lnSpc>
-              <a:buFont typeface="Arial"/>
-              <a:buChar char="•"/>
-            </a:pPr>
+      <p:sp>
+        <p:nvSpPr>
+          <p:cNvPr id="2" name="Title 1"/>
+          <p:cNvSpPr>
+            <a:spLocks noGrp="1"/>
+          </p:cNvSpPr>
+          <p:nvPr>
+            <p:ph type="title"/>
+          </p:nvPr>
+        </p:nvSpPr>
+        <p:spPr/>
+        <p:txBody>
+          <a:bodyPr/>
+          <a:lstStyle/>
+          <a:p>
             <a:r>
               <a:rPr lang="en-US" dirty="0" smtClean="0"/>
-              <a:t>White House API Program: </a:t>
-            </a:r>
-            <a:r>
-              <a:rPr lang="en-US" dirty="0" smtClean="0">
-                <a:hlinkClick r:id="rId3"/>
-              </a:rPr>
-              <a:t>https://www.whitehouse.gov/digitalgov/apis</a:t>
-            </a:r>
-            <a:endParaRPr lang="en-US" dirty="0" smtClean="0"/>
-          </a:p>
-          <a:p>
-            <a:pPr marL="285750" indent="-285750">
-              <a:lnSpc>
-                <a:spcPct val="120000"/>
-              </a:lnSpc>
-              <a:buFont typeface="Arial"/>
-              <a:buChar char="•"/>
-            </a:pPr>
-            <a:r>
-              <a:rPr lang="en-US" dirty="0" smtClean="0"/>
-              <a:t>IEEE APIs: </a:t>
-            </a:r>
-            <a:r>
-              <a:rPr lang="en-US" dirty="0" smtClean="0">
-                <a:hlinkClick r:id="rId4"/>
-              </a:rPr>
-              <a:t>http://ieeexplore.ieee.org/gateway/</a:t>
-            </a:r>
-            <a:endParaRPr lang="en-US" dirty="0" smtClean="0"/>
-          </a:p>
-          <a:p>
-            <a:pPr marL="285750" indent="-285750">
-              <a:lnSpc>
-                <a:spcPct val="120000"/>
-              </a:lnSpc>
-              <a:buFont typeface="Arial"/>
-              <a:buChar char="•"/>
-            </a:pPr>
-            <a:r>
-              <a:rPr lang="en-US" dirty="0" smtClean="0"/>
-              <a:t>UC Berkeley APIs: </a:t>
-            </a:r>
-            <a:r>
-              <a:rPr lang="en-US" dirty="0" smtClean="0">
-                <a:hlinkClick r:id="rId5"/>
-              </a:rPr>
-              <a:t>https://api-central.berkeley.edu/</a:t>
-            </a:r>
-            <a:endParaRPr lang="en-US" dirty="0" smtClean="0"/>
-          </a:p>
-        </p:txBody>
-      </p:sp>
-    </p:spTree>
-    <p:extLst>
-      <p:ext uri="{BB962C8B-B14F-4D97-AF65-F5344CB8AC3E}">
-        <p14:creationId xmlns:p14="http://schemas.microsoft.com/office/powerpoint/2010/main" val="2861415571"/>
-      </p:ext>
-    </p:extLst>
-  </p:cSld>
-  <p:clrMapOvr>
-    <a:masterClrMapping/>
-  </p:clrMapOvr>
-  <p:timing>
-    <p:tnLst>
-      <p:par>
-        <p:cTn xmlns:p14="http://schemas.microsoft.com/office/powerpoint/2010/main" id="1" dur="indefinite" restart="never" nodeType="tmRoot"/>
-      </p:par>
-    </p:tnLst>
-  </p:timing>
-</p:sld>
-</file>
-
-<file path=ppt/slides/slide4.xml><?xml version="1.0" encoding="utf-8"?>
-<p:sld xmlns:a="http://schemas.openxmlformats.org/drawingml/2006/main" xmlns:r="http://schemas.openxmlformats.org/officeDocument/2006/relationships" xmlns:p="http://schemas.openxmlformats.org/presentationml/2006/main">
-  <p:cSld>
-    <p:spTree>
-      <p:nvGrpSpPr>
-        <p:cNvPr id="1" name=""/>
-        <p:cNvGrpSpPr/>
-        <p:nvPr/>
-      </p:nvGrpSpPr>
-      <p:grpSpPr>
-        <a:xfrm>
-          <a:off x="0" y="0"/>
-          <a:ext cx="0" cy="0"/>
-          <a:chOff x="0" y="0"/>
-          <a:chExt cx="0" cy="0"/>
-        </a:xfrm>
-      </p:grpSpPr>
-      <p:sp>
-        <p:nvSpPr>
-          <p:cNvPr id="2" name="Title 1"/>
-          <p:cNvSpPr>
-            <a:spLocks noGrp="1"/>
-          </p:cNvSpPr>
-          <p:nvPr>
-            <p:ph type="title"/>
-          </p:nvPr>
-        </p:nvSpPr>
-        <p:spPr/>
-        <p:txBody>
-          <a:bodyPr/>
-          <a:lstStyle/>
-          <a:p>
-            <a:r>
-              <a:rPr lang="en-US" dirty="0" smtClean="0"/>
-              <a:t>Web APIs are </a:t>
-            </a:r>
-            <a:r>
-              <a:rPr lang="en-US" dirty="0" smtClean="0"/>
-              <a:t>Now </a:t>
-            </a:r>
-            <a:r>
-              <a:rPr lang="en-US" dirty="0" smtClean="0"/>
-              <a:t>IT Resources</a:t>
+              <a:t>Web APIs are Now IT Resources</a:t>
             </a:r>
             <a:endParaRPr lang="en-US" dirty="0"/>
           </a:p>
@@ -5014,15 +5303,7 @@
             <a:pPr algn="ctr"/>
             <a:r>
               <a:rPr lang="en-US" sz="1400" dirty="0" smtClean="0"/>
-              <a:t>APIs </a:t>
-            </a:r>
-            <a:r>
-              <a:rPr lang="en-US" sz="1400" dirty="0" smtClean="0"/>
-              <a:t>impact </a:t>
-            </a:r>
-            <a:r>
-              <a:rPr lang="en-US" sz="1400" dirty="0" smtClean="0"/>
-              <a:t>user experience</a:t>
+              <a:t>APIs impact user experience</a:t>
             </a:r>
             <a:endParaRPr lang="en-US" sz="1400" dirty="0"/>
           </a:p>
@@ -5079,68 +5360,7 @@
             <a:pPr algn="ctr"/>
             <a:r>
               <a:rPr lang="en-US" sz="1400" dirty="0" smtClean="0"/>
-              <a:t>APIs do not </a:t>
-            </a:r>
-            <a:r>
-              <a:rPr lang="en-US" sz="1400" dirty="0" smtClean="0"/>
-              <a:t>provide strong guarantees</a:t>
-            </a:r>
-            <a:endParaRPr lang="en-US" sz="1400" dirty="0"/>
-          </a:p>
-        </p:txBody>
-      </p:sp>
-      <p:sp>
-        <p:nvSpPr>
-          <p:cNvPr id="28" name="Line Callout 2 27"/>
-          <p:cNvSpPr/>
-          <p:nvPr/>
-        </p:nvSpPr>
-        <p:spPr>
-          <a:xfrm>
-            <a:off x="7462180" y="3424034"/>
-            <a:ext cx="1479561" cy="904468"/>
-          </a:xfrm>
-          <a:prstGeom prst="borderCallout2">
-            <a:avLst>
-              <a:gd name="adj1" fmla="val 102232"/>
-              <a:gd name="adj2" fmla="val 49933"/>
-              <a:gd name="adj3" fmla="val 141261"/>
-              <a:gd name="adj4" fmla="val 50148"/>
-              <a:gd name="adj5" fmla="val 168471"/>
-              <a:gd name="adj6" fmla="val 39549"/>
-            </a:avLst>
-          </a:prstGeom>
-          <a:solidFill>
-            <a:srgbClr val="FF0000"/>
-          </a:solidFill>
-          <a:ln>
-            <a:solidFill>
-              <a:srgbClr val="FF0000"/>
-            </a:solidFill>
-          </a:ln>
-        </p:spPr>
-        <p:style>
-          <a:lnRef idx="1">
-            <a:schemeClr val="accent1"/>
-          </a:lnRef>
-          <a:fillRef idx="3">
-            <a:schemeClr val="accent1"/>
-          </a:fillRef>
-          <a:effectRef idx="2">
-            <a:schemeClr val="accent1"/>
-          </a:effectRef>
-          <a:fontRef idx="minor">
-            <a:schemeClr val="lt1"/>
-          </a:fontRef>
-        </p:style>
-        <p:txBody>
-          <a:bodyPr rtlCol="0" anchor="ctr"/>
-          <a:lstStyle/>
-          <a:p>
-            <a:pPr algn="ctr"/>
-            <a:r>
-              <a:rPr lang="en-US" sz="1400" dirty="0" smtClean="0"/>
-              <a:t>APIs obscure functionality changes</a:t>
+              <a:t>APIs do not provide strong guarantees</a:t>
             </a:r>
             <a:endParaRPr lang="en-US" sz="1400" dirty="0"/>
           </a:p>
@@ -5203,6 +5423,30 @@
           </a:p>
         </p:txBody>
       </p:sp>
+      <p:sp>
+        <p:nvSpPr>
+          <p:cNvPr id="3" name="Slide Number Placeholder 2"/>
+          <p:cNvSpPr>
+            <a:spLocks noGrp="1"/>
+          </p:cNvSpPr>
+          <p:nvPr>
+            <p:ph type="sldNum" sz="quarter" idx="12"/>
+          </p:nvPr>
+        </p:nvSpPr>
+        <p:spPr/>
+        <p:txBody>
+          <a:bodyPr/>
+          <a:lstStyle/>
+          <a:p>
+            <a:fld id="{3336F440-0623-F948-B0BF-C3A0BAE2BBD0}" type="slidenum">
+              <a:rPr lang="en-US" smtClean="0"/>
+              <a:pPr/>
+              <a:t>3</a:t>
+            </a:fld>
+            <a:endParaRPr lang="en-US"/>
+          </a:p>
+        </p:txBody>
+      </p:sp>
     </p:spTree>
     <p:extLst>
       <p:ext uri="{BB962C8B-B14F-4D97-AF65-F5344CB8AC3E}">
@@ -5213,11 +5457,11 @@
   <p:clrMapOvr>
     <a:masterClrMapping/>
   </p:clrMapOvr>
-  <mc:AlternateContent xmlns:mc="http://schemas.openxmlformats.org/markup-compatibility/2006">
-    <mc:Choice xmlns:p14="http://schemas.microsoft.com/office/powerpoint/2010/main" Requires="p14">
+  <mc:AlternateContent xmlns:mc="http://schemas.openxmlformats.org/markup-compatibility/2006" xmlns:p14="http://schemas.microsoft.com/office/powerpoint/2010/main">
+    <mc:Choice Requires="p14">
       <p:transition spd="slow" p14:dur="2000"/>
     </mc:Choice>
-    <mc:Fallback>
+    <mc:Fallback xmlns="">
       <p:transition xmlns:p14="http://schemas.microsoft.com/office/powerpoint/2010/main" spd="slow"/>
     </mc:Fallback>
   </mc:AlternateContent>
@@ -5308,7 +5552,7 @@
                                           </p:stCondLst>
                                         </p:cTn>
                                         <p:tgtEl>
-                                          <p:spTgt spid="28"/>
+                                          <p:spTgt spid="27"/>
                                         </p:tgtEl>
                                         <p:attrNameLst>
                                           <p:attrName>style.visibility</p:attrName>
@@ -5322,7 +5566,7 @@
                                       <p:cBhvr>
                                         <p:cTn id="12" dur="500"/>
                                         <p:tgtEl>
-                                          <p:spTgt spid="28"/>
+                                          <p:spTgt spid="27"/>
                                         </p:tgtEl>
                                       </p:cBhvr>
                                     </p:animEffect>
@@ -5361,7 +5605,7 @@
                                           </p:stCondLst>
                                         </p:cTn>
                                         <p:tgtEl>
-                                          <p:spTgt spid="27"/>
+                                          <p:spTgt spid="29"/>
                                         </p:tgtEl>
                                         <p:attrNameLst>
                                           <p:attrName>style.visibility</p:attrName>
@@ -5374,59 +5618,6 @@
                                     <p:animEffect transition="in" filter="blinds(horizontal)">
                                       <p:cBhvr>
                                         <p:cTn id="17" dur="500"/>
-                                        <p:tgtEl>
-                                          <p:spTgt spid="27"/>
-                                        </p:tgtEl>
-                                      </p:cBhvr>
-                                    </p:animEffect>
-                                  </p:childTnLst>
-                                </p:cTn>
-                              </p:par>
-                            </p:childTnLst>
-                          </p:cTn>
-                        </p:par>
-                      </p:childTnLst>
-                    </p:cTn>
-                  </p:par>
-                  <p:par>
-                    <p:cTn id="18" fill="hold">
-                      <p:stCondLst>
-                        <p:cond delay="indefinite"/>
-                      </p:stCondLst>
-                      <p:childTnLst>
-                        <p:par>
-                          <p:cTn id="19" fill="hold">
-                            <p:stCondLst>
-                              <p:cond delay="0"/>
-                            </p:stCondLst>
-                            <p:childTnLst>
-                              <p:par>
-                                <p:cTn id="20" presetID="3" presetClass="entr" presetSubtype="10" fill="hold" grpId="0" nodeType="clickEffect">
-                                  <p:stCondLst>
-                                    <p:cond delay="0"/>
-                                  </p:stCondLst>
-                                  <p:childTnLst>
-                                    <p:set>
-                                      <p:cBhvr>
-                                        <p:cTn id="21" dur="1" fill="hold">
-                                          <p:stCondLst>
-                                            <p:cond delay="0"/>
-                                          </p:stCondLst>
-                                        </p:cTn>
-                                        <p:tgtEl>
-                                          <p:spTgt spid="29"/>
-                                        </p:tgtEl>
-                                        <p:attrNameLst>
-                                          <p:attrName>style.visibility</p:attrName>
-                                        </p:attrNameLst>
-                                      </p:cBhvr>
-                                      <p:to>
-                                        <p:strVal val="visible"/>
-                                      </p:to>
-                                    </p:set>
-                                    <p:animEffect transition="in" filter="blinds(horizontal)">
-                                      <p:cBhvr>
-                                        <p:cTn id="22" dur="500"/>
                                         <p:tgtEl>
                                           <p:spTgt spid="29"/>
                                         </p:tgtEl>
@@ -5465,14 +5656,13 @@
     <p:bldLst>
       <p:bldP spid="25" grpId="0" animBg="1"/>
       <p:bldP spid="27" grpId="0" animBg="1"/>
-      <p:bldP spid="28" grpId="0" animBg="1"/>
       <p:bldP spid="29" grpId="0" animBg="1"/>
     </p:bldLst>
   </p:timing>
 </p:sld>
 </file>
 
-<file path=ppt/slides/slide5.xml><?xml version="1.0" encoding="utf-8"?>
+<file path=ppt/slides/slide4.xml><?xml version="1.0" encoding="utf-8"?>
 <p:sld xmlns:a="http://schemas.openxmlformats.org/drawingml/2006/main" xmlns:r="http://schemas.openxmlformats.org/officeDocument/2006/relationships" xmlns:p="http://schemas.openxmlformats.org/presentationml/2006/main">
   <p:cSld>
     <p:spTree>
@@ -5508,11 +5698,7 @@
           <a:p>
             <a:r>
               <a:rPr lang="en-US" dirty="0" smtClean="0"/>
-              <a:t>Application SLAs and </a:t>
-            </a:r>
-            <a:r>
-              <a:rPr lang="en-US" dirty="0" smtClean="0"/>
-              <a:t>“The Cloud”</a:t>
+              <a:t>Application SLAs and “The Cloud”</a:t>
             </a:r>
             <a:endParaRPr lang="en-US" dirty="0"/>
           </a:p>
@@ -5537,60 +5723,27 @@
           <a:p>
             <a:r>
               <a:rPr lang="en-US" dirty="0" smtClean="0"/>
-              <a:t>Application </a:t>
-            </a:r>
+              <a:t>Application SLAs depend on</a:t>
+            </a:r>
+          </a:p>
+          <a:p>
+            <a:pPr lvl="1"/>
             <a:r>
               <a:rPr lang="en-US" dirty="0" smtClean="0"/>
-              <a:t>SLAs depend on</a:t>
+              <a:t>SLAs of individual APIs</a:t>
             </a:r>
           </a:p>
           <a:p>
             <a:pPr lvl="1"/>
             <a:r>
               <a:rPr lang="en-US" dirty="0" smtClean="0"/>
-              <a:t>SLAs </a:t>
-            </a:r>
+              <a:t>The ability to compose/combine API SLAs</a:t>
+            </a:r>
+          </a:p>
+          <a:p>
             <a:r>
               <a:rPr lang="en-US" dirty="0" smtClean="0"/>
-              <a:t>of </a:t>
-            </a:r>
-            <a:r>
-              <a:rPr lang="en-US" dirty="0" smtClean="0"/>
-              <a:t>individual APIs</a:t>
-            </a:r>
-          </a:p>
-          <a:p>
-            <a:pPr lvl="1"/>
-            <a:r>
-              <a:rPr lang="en-US" dirty="0" smtClean="0"/>
-              <a:t>The ability to </a:t>
-            </a:r>
-            <a:r>
-              <a:rPr lang="en-US" dirty="0" smtClean="0"/>
-              <a:t>compose/combine </a:t>
-            </a:r>
-            <a:r>
-              <a:rPr lang="en-US" dirty="0" smtClean="0"/>
-              <a:t>API </a:t>
-            </a:r>
-            <a:r>
-              <a:rPr lang="en-US" dirty="0" smtClean="0"/>
-              <a:t>SLAs</a:t>
-            </a:r>
-            <a:endParaRPr lang="en-US" dirty="0" smtClean="0"/>
-          </a:p>
-          <a:p>
-            <a:r>
-              <a:rPr lang="en-US" dirty="0" smtClean="0"/>
-              <a:t>Modern </a:t>
-            </a:r>
-            <a:r>
-              <a:rPr lang="en-US" dirty="0" smtClean="0"/>
-              <a:t>cloud platforms </a:t>
-            </a:r>
-            <a:r>
-              <a:rPr lang="en-US" dirty="0" smtClean="0"/>
-              <a:t>only provide </a:t>
+              <a:t>Modern cloud platforms only provide </a:t>
             </a:r>
             <a:r>
               <a:rPr lang="en-US" i="1" dirty="0" smtClean="0"/>
@@ -5598,15 +5751,7 @@
             </a:r>
             <a:r>
               <a:rPr lang="en-US" dirty="0" smtClean="0"/>
-              <a:t>uptime </a:t>
-            </a:r>
-            <a:r>
-              <a:rPr lang="en-US" dirty="0" smtClean="0"/>
-              <a:t>SLAs for individual </a:t>
-            </a:r>
-            <a:r>
-              <a:rPr lang="en-US" dirty="0" smtClean="0"/>
-              <a:t>APIs</a:t>
+              <a:t>uptime SLAs for individual APIs</a:t>
             </a:r>
             <a:endParaRPr lang="en-US" dirty="0"/>
           </a:p>
@@ -5642,6 +5787,30 @@
           </a:prstGeom>
         </p:spPr>
       </p:pic>
+      <p:sp>
+        <p:nvSpPr>
+          <p:cNvPr id="5" name="Slide Number Placeholder 4"/>
+          <p:cNvSpPr>
+            <a:spLocks noGrp="1"/>
+          </p:cNvSpPr>
+          <p:nvPr>
+            <p:ph type="sldNum" sz="quarter" idx="12"/>
+          </p:nvPr>
+        </p:nvSpPr>
+        <p:spPr/>
+        <p:txBody>
+          <a:bodyPr/>
+          <a:lstStyle/>
+          <a:p>
+            <a:fld id="{3336F440-0623-F948-B0BF-C3A0BAE2BBD0}" type="slidenum">
+              <a:rPr lang="en-US" smtClean="0"/>
+              <a:pPr/>
+              <a:t>4</a:t>
+            </a:fld>
+            <a:endParaRPr lang="en-US"/>
+          </a:p>
+        </p:txBody>
+      </p:sp>
     </p:spTree>
   </p:cSld>
   <p:clrMapOvr>
@@ -5650,14 +5819,151 @@
   <p:timing>
     <p:tnLst>
       <p:par>
-        <p:cTn xmlns:p14="http://schemas.microsoft.com/office/powerpoint/2010/main" id="1" dur="indefinite" restart="never" nodeType="tmRoot"/>
+        <p:cTn xmlns:p14="http://schemas.microsoft.com/office/powerpoint/2010/main" id="1" dur="indefinite" restart="never" nodeType="tmRoot">
+          <p:childTnLst>
+            <p:seq concurrent="1" nextAc="seek">
+              <p:cTn id="2" dur="indefinite" nodeType="mainSeq">
+                <p:childTnLst>
+                  <p:par>
+                    <p:cTn id="3" fill="hold">
+                      <p:stCondLst>
+                        <p:cond delay="indefinite"/>
+                      </p:stCondLst>
+                      <p:childTnLst>
+                        <p:par>
+                          <p:cTn id="4" fill="hold">
+                            <p:stCondLst>
+                              <p:cond delay="0"/>
+                            </p:stCondLst>
+                            <p:childTnLst>
+                              <p:par>
+                                <p:cTn id="5" presetID="3" presetClass="entr" presetSubtype="10" fill="hold" nodeType="clickEffect">
+                                  <p:stCondLst>
+                                    <p:cond delay="0"/>
+                                  </p:stCondLst>
+                                  <p:childTnLst>
+                                    <p:set>
+                                      <p:cBhvr>
+                                        <p:cTn id="6" dur="1" fill="hold">
+                                          <p:stCondLst>
+                                            <p:cond delay="0"/>
+                                          </p:stCondLst>
+                                        </p:cTn>
+                                        <p:tgtEl>
+                                          <p:spTgt spid="3">
+                                            <p:txEl>
+                                              <p:pRg st="3" end="3"/>
+                                            </p:txEl>
+                                          </p:spTgt>
+                                        </p:tgtEl>
+                                        <p:attrNameLst>
+                                          <p:attrName>style.visibility</p:attrName>
+                                        </p:attrNameLst>
+                                      </p:cBhvr>
+                                      <p:to>
+                                        <p:strVal val="visible"/>
+                                      </p:to>
+                                    </p:set>
+                                    <p:animEffect transition="in" filter="blinds(horizontal)">
+                                      <p:cBhvr>
+                                        <p:cTn id="7" dur="500"/>
+                                        <p:tgtEl>
+                                          <p:spTgt spid="3">
+                                            <p:txEl>
+                                              <p:pRg st="3" end="3"/>
+                                            </p:txEl>
+                                          </p:spTgt>
+                                        </p:tgtEl>
+                                      </p:cBhvr>
+                                    </p:animEffect>
+                                  </p:childTnLst>
+                                </p:cTn>
+                              </p:par>
+                            </p:childTnLst>
+                          </p:cTn>
+                        </p:par>
+                      </p:childTnLst>
+                    </p:cTn>
+                  </p:par>
+                  <p:par>
+                    <p:cTn id="8" fill="hold">
+                      <p:stCondLst>
+                        <p:cond delay="indefinite"/>
+                      </p:stCondLst>
+                      <p:childTnLst>
+                        <p:par>
+                          <p:cTn id="9" fill="hold">
+                            <p:stCondLst>
+                              <p:cond delay="0"/>
+                            </p:stCondLst>
+                            <p:childTnLst>
+                              <p:par>
+                                <p:cTn id="10" presetID="3" presetClass="entr" presetSubtype="10" fill="hold" nodeType="clickEffect">
+                                  <p:stCondLst>
+                                    <p:cond delay="0"/>
+                                  </p:stCondLst>
+                                  <p:childTnLst>
+                                    <p:set>
+                                      <p:cBhvr>
+                                        <p:cTn id="11" dur="1" fill="hold">
+                                          <p:stCondLst>
+                                            <p:cond delay="0"/>
+                                          </p:stCondLst>
+                                        </p:cTn>
+                                        <p:tgtEl>
+                                          <p:spTgt spid="4"/>
+                                        </p:tgtEl>
+                                        <p:attrNameLst>
+                                          <p:attrName>style.visibility</p:attrName>
+                                        </p:attrNameLst>
+                                      </p:cBhvr>
+                                      <p:to>
+                                        <p:strVal val="visible"/>
+                                      </p:to>
+                                    </p:set>
+                                    <p:animEffect transition="in" filter="blinds(horizontal)">
+                                      <p:cBhvr>
+                                        <p:cTn id="12" dur="500"/>
+                                        <p:tgtEl>
+                                          <p:spTgt spid="4"/>
+                                        </p:tgtEl>
+                                      </p:cBhvr>
+                                    </p:animEffect>
+                                  </p:childTnLst>
+                                </p:cTn>
+                              </p:par>
+                            </p:childTnLst>
+                          </p:cTn>
+                        </p:par>
+                      </p:childTnLst>
+                    </p:cTn>
+                  </p:par>
+                </p:childTnLst>
+              </p:cTn>
+              <p:prevCondLst>
+                <p:cond evt="onPrev" delay="0">
+                  <p:tgtEl>
+                    <p:sldTgt/>
+                  </p:tgtEl>
+                </p:cond>
+              </p:prevCondLst>
+              <p:nextCondLst>
+                <p:cond evt="onNext" delay="0">
+                  <p:tgtEl>
+                    <p:sldTgt/>
+                  </p:tgtEl>
+                </p:cond>
+              </p:nextCondLst>
+            </p:seq>
+          </p:childTnLst>
+        </p:cTn>
       </p:par>
     </p:tnLst>
   </p:timing>
 </p:sld>
 </file>
 
-<file path=ppt/slides/slide6.xml><?xml version="1.0" encoding="utf-8"?>
+<file path=ppt/slides/slide5.xml><?xml version="1.0" encoding="utf-8"?>
 <p:sld xmlns:a="http://schemas.openxmlformats.org/drawingml/2006/main" xmlns:r="http://schemas.openxmlformats.org/officeDocument/2006/relationships" xmlns:p="http://schemas.openxmlformats.org/presentationml/2006/main">
   <p:cSld>
     <p:spTree>
@@ -5729,25 +6035,8 @@
             </a:r>
             <a:r>
               <a:rPr lang="en-US" dirty="0" smtClean="0"/>
-              <a:t>Is </a:t>
-            </a:r>
-            <a:r>
-              <a:rPr lang="en-US" dirty="0" smtClean="0"/>
-              <a:t>it possible to determine, automatically</a:t>
-            </a:r>
-            <a:r>
-              <a:rPr lang="en-US" dirty="0" smtClean="0"/>
-              <a:t>, performance SLAs </a:t>
-            </a:r>
-            <a:r>
-              <a:rPr lang="en-US" dirty="0" smtClean="0"/>
-              <a:t>for cloud</a:t>
-            </a:r>
-            <a:r>
-              <a:rPr lang="en-US" dirty="0" smtClean="0"/>
-              <a:t>-hosted applications and APIs?</a:t>
-            </a:r>
-            <a:endParaRPr lang="en-US" dirty="0" smtClean="0"/>
+              <a:t>Is it possible to determine, automatically, performance SLAs for cloud-hosted applications and APIs?</a:t>
+            </a:r>
           </a:p>
           <a:p>
             <a:r>
@@ -5758,34 +6047,13 @@
               <a:rPr lang="en-US" dirty="0" smtClean="0"/>
               <a:t> Cerebro</a:t>
             </a:r>
-            <a:endParaRPr lang="en-US" dirty="0" smtClean="0"/>
           </a:p>
           <a:p>
             <a:pPr lvl="1"/>
             <a:r>
               <a:rPr lang="en-US" dirty="0" smtClean="0"/>
-              <a:t>Predicts the response time of future web-API invocations from historical </a:t>
-            </a:r>
-            <a:r>
-              <a:rPr lang="en-US" dirty="0" smtClean="0"/>
-              <a:t>measurements</a:t>
-            </a:r>
-          </a:p>
-          <a:p>
-            <a:pPr lvl="1"/>
-            <a:r>
-              <a:rPr lang="en-US" dirty="0" smtClean="0"/>
-              <a:t>For </a:t>
-            </a:r>
-            <a:r>
-              <a:rPr lang="en-US" dirty="0" err="1" smtClean="0"/>
-              <a:t>PaaS</a:t>
-            </a:r>
-            <a:r>
-              <a:rPr lang="en-US" dirty="0" smtClean="0"/>
-              <a:t> clouds</a:t>
-            </a:r>
-            <a:endParaRPr lang="en-US" dirty="0" smtClean="0"/>
+              <a:t>Predicts the response time of future web-API invocations from historical measurements</a:t>
+            </a:r>
           </a:p>
           <a:p>
             <a:pPr lvl="1"/>
@@ -5793,7 +6061,50 @@
               <a:rPr lang="en-US" dirty="0" smtClean="0"/>
               <a:t>Fully automatic</a:t>
             </a:r>
-            <a:endParaRPr lang="en-US" dirty="0" smtClean="0"/>
+          </a:p>
+          <a:p>
+            <a:pPr lvl="1"/>
+            <a:r>
+              <a:rPr lang="en-US" dirty="0"/>
+              <a:t>For </a:t>
+            </a:r>
+            <a:r>
+              <a:rPr lang="en-US" dirty="0" err="1"/>
+              <a:t>PaaS</a:t>
+            </a:r>
+            <a:r>
+              <a:rPr lang="en-US" dirty="0"/>
+              <a:t> </a:t>
+            </a:r>
+            <a:r>
+              <a:rPr lang="en-US" dirty="0" smtClean="0"/>
+              <a:t>clouds</a:t>
+            </a:r>
+            <a:endParaRPr lang="en-US" dirty="0"/>
+          </a:p>
+        </p:txBody>
+      </p:sp>
+      <p:sp>
+        <p:nvSpPr>
+          <p:cNvPr id="4" name="Slide Number Placeholder 3"/>
+          <p:cNvSpPr>
+            <a:spLocks noGrp="1"/>
+          </p:cNvSpPr>
+          <p:nvPr>
+            <p:ph type="sldNum" sz="quarter" idx="12"/>
+          </p:nvPr>
+        </p:nvSpPr>
+        <p:spPr/>
+        <p:txBody>
+          <a:bodyPr/>
+          <a:lstStyle/>
+          <a:p>
+            <a:fld id="{3336F440-0623-F948-B0BF-C3A0BAE2BBD0}" type="slidenum">
+              <a:rPr lang="en-US" smtClean="0"/>
+              <a:pPr/>
+              <a:t>5</a:t>
+            </a:fld>
+            <a:endParaRPr lang="en-US"/>
           </a:p>
         </p:txBody>
       </p:sp>
@@ -5810,14 +6121,227 @@
   <p:timing>
     <p:tnLst>
       <p:par>
-        <p:cTn xmlns:p14="http://schemas.microsoft.com/office/powerpoint/2010/main" id="1" dur="indefinite" restart="never" nodeType="tmRoot"/>
+        <p:cTn xmlns:p14="http://schemas.microsoft.com/office/powerpoint/2010/main" id="1" dur="indefinite" restart="never" nodeType="tmRoot">
+          <p:childTnLst>
+            <p:seq concurrent="1" nextAc="seek">
+              <p:cTn id="2" dur="indefinite" nodeType="mainSeq">
+                <p:childTnLst>
+                  <p:par>
+                    <p:cTn id="3" fill="hold">
+                      <p:stCondLst>
+                        <p:cond delay="indefinite"/>
+                      </p:stCondLst>
+                      <p:childTnLst>
+                        <p:par>
+                          <p:cTn id="4" fill="hold">
+                            <p:stCondLst>
+                              <p:cond delay="0"/>
+                            </p:stCondLst>
+                            <p:childTnLst>
+                              <p:par>
+                                <p:cTn id="5" presetID="3" presetClass="entr" presetSubtype="10" fill="hold" nodeType="clickEffect">
+                                  <p:stCondLst>
+                                    <p:cond delay="0"/>
+                                  </p:stCondLst>
+                                  <p:childTnLst>
+                                    <p:set>
+                                      <p:cBhvr>
+                                        <p:cTn id="6" dur="1" fill="hold">
+                                          <p:stCondLst>
+                                            <p:cond delay="0"/>
+                                          </p:stCondLst>
+                                        </p:cTn>
+                                        <p:tgtEl>
+                                          <p:spTgt spid="3">
+                                            <p:txEl>
+                                              <p:pRg st="1" end="1"/>
+                                            </p:txEl>
+                                          </p:spTgt>
+                                        </p:tgtEl>
+                                        <p:attrNameLst>
+                                          <p:attrName>style.visibility</p:attrName>
+                                        </p:attrNameLst>
+                                      </p:cBhvr>
+                                      <p:to>
+                                        <p:strVal val="visible"/>
+                                      </p:to>
+                                    </p:set>
+                                    <p:animEffect transition="in" filter="blinds(horizontal)">
+                                      <p:cBhvr>
+                                        <p:cTn id="7" dur="500"/>
+                                        <p:tgtEl>
+                                          <p:spTgt spid="3">
+                                            <p:txEl>
+                                              <p:pRg st="1" end="1"/>
+                                            </p:txEl>
+                                          </p:spTgt>
+                                        </p:tgtEl>
+                                      </p:cBhvr>
+                                    </p:animEffect>
+                                  </p:childTnLst>
+                                </p:cTn>
+                              </p:par>
+                              <p:par>
+                                <p:cTn id="8" presetID="3" presetClass="entr" presetSubtype="10" fill="hold" nodeType="withEffect">
+                                  <p:stCondLst>
+                                    <p:cond delay="0"/>
+                                  </p:stCondLst>
+                                  <p:childTnLst>
+                                    <p:set>
+                                      <p:cBhvr>
+                                        <p:cTn id="9" dur="1" fill="hold">
+                                          <p:stCondLst>
+                                            <p:cond delay="0"/>
+                                          </p:stCondLst>
+                                        </p:cTn>
+                                        <p:tgtEl>
+                                          <p:spTgt spid="3">
+                                            <p:txEl>
+                                              <p:pRg st="2" end="2"/>
+                                            </p:txEl>
+                                          </p:spTgt>
+                                        </p:tgtEl>
+                                        <p:attrNameLst>
+                                          <p:attrName>style.visibility</p:attrName>
+                                        </p:attrNameLst>
+                                      </p:cBhvr>
+                                      <p:to>
+                                        <p:strVal val="visible"/>
+                                      </p:to>
+                                    </p:set>
+                                    <p:animEffect transition="in" filter="blinds(horizontal)">
+                                      <p:cBhvr>
+                                        <p:cTn id="10" dur="500"/>
+                                        <p:tgtEl>
+                                          <p:spTgt spid="3">
+                                            <p:txEl>
+                                              <p:pRg st="2" end="2"/>
+                                            </p:txEl>
+                                          </p:spTgt>
+                                        </p:tgtEl>
+                                      </p:cBhvr>
+                                    </p:animEffect>
+                                  </p:childTnLst>
+                                </p:cTn>
+                              </p:par>
+                              <p:par>
+                                <p:cTn id="11" presetID="3" presetClass="entr" presetSubtype="10" fill="hold" nodeType="withEffect">
+                                  <p:stCondLst>
+                                    <p:cond delay="0"/>
+                                  </p:stCondLst>
+                                  <p:childTnLst>
+                                    <p:set>
+                                      <p:cBhvr>
+                                        <p:cTn id="12" dur="1" fill="hold">
+                                          <p:stCondLst>
+                                            <p:cond delay="0"/>
+                                          </p:stCondLst>
+                                        </p:cTn>
+                                        <p:tgtEl>
+                                          <p:spTgt spid="3">
+                                            <p:txEl>
+                                              <p:pRg st="3" end="3"/>
+                                            </p:txEl>
+                                          </p:spTgt>
+                                        </p:tgtEl>
+                                        <p:attrNameLst>
+                                          <p:attrName>style.visibility</p:attrName>
+                                        </p:attrNameLst>
+                                      </p:cBhvr>
+                                      <p:to>
+                                        <p:strVal val="visible"/>
+                                      </p:to>
+                                    </p:set>
+                                    <p:animEffect transition="in" filter="blinds(horizontal)">
+                                      <p:cBhvr>
+                                        <p:cTn id="13" dur="500"/>
+                                        <p:tgtEl>
+                                          <p:spTgt spid="3">
+                                            <p:txEl>
+                                              <p:pRg st="3" end="3"/>
+                                            </p:txEl>
+                                          </p:spTgt>
+                                        </p:tgtEl>
+                                      </p:cBhvr>
+                                    </p:animEffect>
+                                  </p:childTnLst>
+                                </p:cTn>
+                              </p:par>
+                              <p:par>
+                                <p:cTn id="14" presetID="3" presetClass="entr" presetSubtype="10" fill="hold" nodeType="withEffect">
+                                  <p:stCondLst>
+                                    <p:cond delay="0"/>
+                                  </p:stCondLst>
+                                  <p:childTnLst>
+                                    <p:set>
+                                      <p:cBhvr>
+                                        <p:cTn id="15" dur="1" fill="hold">
+                                          <p:stCondLst>
+                                            <p:cond delay="0"/>
+                                          </p:stCondLst>
+                                        </p:cTn>
+                                        <p:tgtEl>
+                                          <p:spTgt spid="3">
+                                            <p:txEl>
+                                              <p:pRg st="4" end="4"/>
+                                            </p:txEl>
+                                          </p:spTgt>
+                                        </p:tgtEl>
+                                        <p:attrNameLst>
+                                          <p:attrName>style.visibility</p:attrName>
+                                        </p:attrNameLst>
+                                      </p:cBhvr>
+                                      <p:to>
+                                        <p:strVal val="visible"/>
+                                      </p:to>
+                                    </p:set>
+                                    <p:animEffect transition="in" filter="blinds(horizontal)">
+                                      <p:cBhvr>
+                                        <p:cTn id="16" dur="500"/>
+                                        <p:tgtEl>
+                                          <p:spTgt spid="3">
+                                            <p:txEl>
+                                              <p:pRg st="4" end="4"/>
+                                            </p:txEl>
+                                          </p:spTgt>
+                                        </p:tgtEl>
+                                      </p:cBhvr>
+                                    </p:animEffect>
+                                  </p:childTnLst>
+                                </p:cTn>
+                              </p:par>
+                            </p:childTnLst>
+                          </p:cTn>
+                        </p:par>
+                      </p:childTnLst>
+                    </p:cTn>
+                  </p:par>
+                </p:childTnLst>
+              </p:cTn>
+              <p:prevCondLst>
+                <p:cond evt="onPrev" delay="0">
+                  <p:tgtEl>
+                    <p:sldTgt/>
+                  </p:tgtEl>
+                </p:cond>
+              </p:prevCondLst>
+              <p:nextCondLst>
+                <p:cond evt="onNext" delay="0">
+                  <p:tgtEl>
+                    <p:sldTgt/>
+                  </p:tgtEl>
+                </p:cond>
+              </p:nextCondLst>
+            </p:seq>
+          </p:childTnLst>
+        </p:cTn>
       </p:par>
     </p:tnLst>
   </p:timing>
 </p:sld>
 </file>
 
-<file path=ppt/slides/slide7.xml><?xml version="1.0" encoding="utf-8"?>
+<file path=ppt/slides/slide6.xml><?xml version="1.0" encoding="utf-8"?>
 <p:sld xmlns:a="http://schemas.openxmlformats.org/drawingml/2006/main" xmlns:r="http://schemas.openxmlformats.org/officeDocument/2006/relationships" xmlns:p="http://schemas.openxmlformats.org/presentationml/2006/main">
   <p:cSld>
     <p:spTree>
@@ -6007,63 +6531,6 @@
       </p:sp>
       <p:sp>
         <p:nvSpPr>
-          <p:cNvPr id="24" name="Line Callout 2 23"/>
-          <p:cNvSpPr/>
-          <p:nvPr/>
-        </p:nvSpPr>
-        <p:spPr>
-          <a:xfrm>
-            <a:off x="6930362" y="1379280"/>
-            <a:ext cx="1756438" cy="904468"/>
-          </a:xfrm>
-          <a:prstGeom prst="borderCallout2">
-            <a:avLst>
-              <a:gd name="adj1" fmla="val 98142"/>
-              <a:gd name="adj2" fmla="val 49933"/>
-              <a:gd name="adj3" fmla="val 134445"/>
-              <a:gd name="adj4" fmla="val 49315"/>
-              <a:gd name="adj5" fmla="val 257074"/>
-              <a:gd name="adj6" fmla="val -53907"/>
-            </a:avLst>
-          </a:prstGeom>
-          <a:solidFill>
-            <a:srgbClr val="008000"/>
-          </a:solidFill>
-          <a:ln>
-            <a:solidFill>
-              <a:srgbClr val="008000"/>
-            </a:solidFill>
-          </a:ln>
-        </p:spPr>
-        <p:style>
-          <a:lnRef idx="1">
-            <a:schemeClr val="accent1"/>
-          </a:lnRef>
-          <a:fillRef idx="3">
-            <a:schemeClr val="accent1"/>
-          </a:fillRef>
-          <a:effectRef idx="2">
-            <a:schemeClr val="accent1"/>
-          </a:effectRef>
-          <a:fontRef idx="minor">
-            <a:schemeClr val="lt1"/>
-          </a:fontRef>
-        </p:style>
-        <p:txBody>
-          <a:bodyPr rtlCol="0" anchor="ctr"/>
-          <a:lstStyle/>
-          <a:p>
-            <a:pPr algn="ctr"/>
-            <a:r>
-              <a:rPr lang="en-US" sz="1400" dirty="0" smtClean="0"/>
-              <a:t>Request-response driven programming model</a:t>
-            </a:r>
-            <a:endParaRPr lang="en-US" sz="1400" dirty="0"/>
-          </a:p>
-        </p:txBody>
-      </p:sp>
-      <p:sp>
-        <p:nvSpPr>
           <p:cNvPr id="25" name="Rectangle 24"/>
           <p:cNvSpPr/>
           <p:nvPr/>
@@ -6231,6 +6698,30 @@
               <a:t>Restrictions on threads</a:t>
             </a:r>
             <a:endParaRPr lang="en-US" sz="1400" dirty="0"/>
+          </a:p>
+        </p:txBody>
+      </p:sp>
+      <p:sp>
+        <p:nvSpPr>
+          <p:cNvPr id="3" name="Slide Number Placeholder 2"/>
+          <p:cNvSpPr>
+            <a:spLocks noGrp="1"/>
+          </p:cNvSpPr>
+          <p:nvPr>
+            <p:ph type="sldNum" sz="quarter" idx="12"/>
+          </p:nvPr>
+        </p:nvSpPr>
+        <p:spPr/>
+        <p:txBody>
+          <a:bodyPr/>
+          <a:lstStyle/>
+          <a:p>
+            <a:fld id="{3336F440-0623-F948-B0BF-C3A0BAE2BBD0}" type="slidenum">
+              <a:rPr lang="en-US" smtClean="0"/>
+              <a:pPr/>
+              <a:t>6</a:t>
+            </a:fld>
+            <a:endParaRPr lang="en-US"/>
           </a:p>
         </p:txBody>
       </p:sp>
@@ -6384,7 +6875,7 @@
                                           </p:stCondLst>
                                         </p:cTn>
                                         <p:tgtEl>
-                                          <p:spTgt spid="24"/>
+                                          <p:spTgt spid="26"/>
                                         </p:tgtEl>
                                         <p:attrNameLst>
                                           <p:attrName>style.visibility</p:attrName>
@@ -6398,7 +6889,7 @@
                                       <p:cBhvr>
                                         <p:cTn id="17" dur="500"/>
                                         <p:tgtEl>
-                                          <p:spTgt spid="24"/>
+                                          <p:spTgt spid="26"/>
                                         </p:tgtEl>
                                       </p:cBhvr>
                                     </p:animEffect>
@@ -6437,7 +6928,7 @@
                                           </p:stCondLst>
                                         </p:cTn>
                                         <p:tgtEl>
-                                          <p:spTgt spid="26"/>
+                                          <p:spTgt spid="27"/>
                                         </p:tgtEl>
                                         <p:attrNameLst>
                                           <p:attrName>style.visibility</p:attrName>
@@ -6450,59 +6941,6 @@
                                     <p:animEffect transition="in" filter="blinds(horizontal)">
                                       <p:cBhvr>
                                         <p:cTn id="22" dur="500"/>
-                                        <p:tgtEl>
-                                          <p:spTgt spid="26"/>
-                                        </p:tgtEl>
-                                      </p:cBhvr>
-                                    </p:animEffect>
-                                  </p:childTnLst>
-                                </p:cTn>
-                              </p:par>
-                            </p:childTnLst>
-                          </p:cTn>
-                        </p:par>
-                      </p:childTnLst>
-                    </p:cTn>
-                  </p:par>
-                  <p:par>
-                    <p:cTn id="23" fill="hold">
-                      <p:stCondLst>
-                        <p:cond delay="indefinite"/>
-                      </p:stCondLst>
-                      <p:childTnLst>
-                        <p:par>
-                          <p:cTn id="24" fill="hold">
-                            <p:stCondLst>
-                              <p:cond delay="0"/>
-                            </p:stCondLst>
-                            <p:childTnLst>
-                              <p:par>
-                                <p:cTn id="25" presetID="3" presetClass="entr" presetSubtype="10" fill="hold" grpId="0" nodeType="clickEffect">
-                                  <p:stCondLst>
-                                    <p:cond delay="0"/>
-                                  </p:stCondLst>
-                                  <p:childTnLst>
-                                    <p:set>
-                                      <p:cBhvr>
-                                        <p:cTn id="26" dur="1" fill="hold">
-                                          <p:stCondLst>
-                                            <p:cond delay="0"/>
-                                          </p:stCondLst>
-                                        </p:cTn>
-                                        <p:tgtEl>
-                                          <p:spTgt spid="27"/>
-                                        </p:tgtEl>
-                                        <p:attrNameLst>
-                                          <p:attrName>style.visibility</p:attrName>
-                                        </p:attrNameLst>
-                                      </p:cBhvr>
-                                      <p:to>
-                                        <p:strVal val="visible"/>
-                                      </p:to>
-                                    </p:set>
-                                    <p:animEffect transition="in" filter="blinds(horizontal)">
-                                      <p:cBhvr>
-                                        <p:cTn id="27" dur="500"/>
                                         <p:tgtEl>
                                           <p:spTgt spid="27"/>
                                         </p:tgtEl>
@@ -6541,7 +6979,6 @@
     <p:bldLst>
       <p:bldP spid="20" grpId="0" animBg="1"/>
       <p:bldP spid="23" grpId="0" animBg="1"/>
-      <p:bldP spid="24" grpId="0" animBg="1"/>
       <p:bldP spid="26" grpId="0" animBg="1"/>
       <p:bldP spid="27" grpId="0" animBg="1"/>
     </p:bldLst>
@@ -6549,7 +6986,7 @@
 </p:sld>
 </file>
 
-<file path=ppt/slides/slide8.xml><?xml version="1.0" encoding="utf-8"?>
+<file path=ppt/slides/slide7.xml><?xml version="1.0" encoding="utf-8"?>
 <p:sld xmlns:a="http://schemas.openxmlformats.org/drawingml/2006/main" xmlns:r="http://schemas.openxmlformats.org/officeDocument/2006/relationships" xmlns:p="http://schemas.openxmlformats.org/presentationml/2006/main">
   <p:cSld>
     <p:spTree>
@@ -6787,15 +7224,7 @@
             </a:r>
             <a:r>
               <a:rPr lang="en-US" sz="2000" dirty="0" smtClean="0"/>
-              <a:t> applications are </a:t>
-            </a:r>
-            <a:r>
-              <a:rPr lang="en-US" sz="2000" dirty="0" smtClean="0"/>
-              <a:t>highly amenable </a:t>
-            </a:r>
-            <a:r>
-              <a:rPr lang="en-US" sz="2000" dirty="0" smtClean="0"/>
-              <a:t>to static analysis</a:t>
+              <a:t> applications are highly amenable to static analysis</a:t>
             </a:r>
           </a:p>
           <a:p>
@@ -6805,13 +7234,33 @@
             </a:pPr>
             <a:r>
               <a:rPr lang="en-US" sz="2000" dirty="0" smtClean="0"/>
-              <a:t>Cloud SDK calls </a:t>
-            </a:r>
-            <a:r>
-              <a:rPr lang="en-US" sz="2000" dirty="0" smtClean="0"/>
-              <a:t>essentially define client-perceived application performance</a:t>
+              <a:t>Cloud SDK calls essentially define client-perceived application performance</a:t>
             </a:r>
             <a:endParaRPr lang="en-US" sz="2000" dirty="0"/>
+          </a:p>
+        </p:txBody>
+      </p:sp>
+      <p:sp>
+        <p:nvSpPr>
+          <p:cNvPr id="2" name="Slide Number Placeholder 1"/>
+          <p:cNvSpPr>
+            <a:spLocks noGrp="1"/>
+          </p:cNvSpPr>
+          <p:nvPr>
+            <p:ph type="sldNum" sz="quarter" idx="12"/>
+          </p:nvPr>
+        </p:nvSpPr>
+        <p:spPr/>
+        <p:txBody>
+          <a:bodyPr/>
+          <a:lstStyle/>
+          <a:p>
+            <a:fld id="{3336F440-0623-F948-B0BF-C3A0BAE2BBD0}" type="slidenum">
+              <a:rPr lang="en-US" smtClean="0"/>
+              <a:pPr/>
+              <a:t>7</a:t>
+            </a:fld>
+            <a:endParaRPr lang="en-US"/>
           </a:p>
         </p:txBody>
       </p:sp>
@@ -6906,7 +7355,7 @@
 </p:sld>
 </file>
 
-<file path=ppt/slides/slide9.xml><?xml version="1.0" encoding="utf-8"?>
+<file path=ppt/slides/slide8.xml><?xml version="1.0" encoding="utf-8"?>
 <p:sld xmlns:a="http://schemas.openxmlformats.org/drawingml/2006/main" xmlns:r="http://schemas.openxmlformats.org/officeDocument/2006/relationships" xmlns:p="http://schemas.openxmlformats.org/presentationml/2006/main">
   <p:cSld>
     <p:spTree>
@@ -6976,10 +7425,290 @@
           </a:xfrm>
         </p:spPr>
       </p:pic>
+      <p:sp>
+        <p:nvSpPr>
+          <p:cNvPr id="2" name="Slide Number Placeholder 1"/>
+          <p:cNvSpPr>
+            <a:spLocks noGrp="1"/>
+          </p:cNvSpPr>
+          <p:nvPr>
+            <p:ph type="sldNum" sz="quarter" idx="12"/>
+          </p:nvPr>
+        </p:nvSpPr>
+        <p:spPr/>
+        <p:txBody>
+          <a:bodyPr/>
+          <a:lstStyle/>
+          <a:p>
+            <a:fld id="{3336F440-0623-F948-B0BF-C3A0BAE2BBD0}" type="slidenum">
+              <a:rPr lang="en-US" smtClean="0"/>
+              <a:pPr/>
+              <a:t>8</a:t>
+            </a:fld>
+            <a:endParaRPr lang="en-US"/>
+          </a:p>
+        </p:txBody>
+      </p:sp>
     </p:spTree>
     <p:extLst>
       <p:ext uri="{BB962C8B-B14F-4D97-AF65-F5344CB8AC3E}">
         <p14:creationId xmlns:p14="http://schemas.microsoft.com/office/powerpoint/2010/main" val="2043275604"/>
+      </p:ext>
+    </p:extLst>
+  </p:cSld>
+  <p:clrMapOvr>
+    <a:masterClrMapping/>
+  </p:clrMapOvr>
+  <p:timing>
+    <p:tnLst>
+      <p:par>
+        <p:cTn xmlns:p14="http://schemas.microsoft.com/office/powerpoint/2010/main" id="1" dur="indefinite" restart="never" nodeType="tmRoot"/>
+      </p:par>
+    </p:tnLst>
+  </p:timing>
+</p:sld>
+</file>
+
+<file path=ppt/slides/slide9.xml><?xml version="1.0" encoding="utf-8"?>
+<p:sld xmlns:a="http://schemas.openxmlformats.org/drawingml/2006/main" xmlns:r="http://schemas.openxmlformats.org/officeDocument/2006/relationships" xmlns:p="http://schemas.openxmlformats.org/presentationml/2006/main">
+  <p:cSld>
+    <p:spTree>
+      <p:nvGrpSpPr>
+        <p:cNvPr id="1" name=""/>
+        <p:cNvGrpSpPr/>
+        <p:nvPr/>
+      </p:nvGrpSpPr>
+      <p:grpSpPr>
+        <a:xfrm>
+          <a:off x="0" y="0"/>
+          <a:ext cx="0" cy="0"/>
+          <a:chOff x="0" y="0"/>
+          <a:chExt cx="0" cy="0"/>
+        </a:xfrm>
+      </p:grpSpPr>
+      <p:sp>
+        <p:nvSpPr>
+          <p:cNvPr id="2" name="Title 1"/>
+          <p:cNvSpPr>
+            <a:spLocks noGrp="1"/>
+          </p:cNvSpPr>
+          <p:nvPr>
+            <p:ph type="title"/>
+          </p:nvPr>
+        </p:nvSpPr>
+        <p:spPr/>
+        <p:txBody>
+          <a:bodyPr>
+            <a:normAutofit fontScale="90000"/>
+          </a:bodyPr>
+          <a:lstStyle/>
+          <a:p>
+            <a:r>
+              <a:rPr lang="en-US" dirty="0" smtClean="0"/>
+              <a:t>QBETS: Queue Bounds Estimation from Time Series</a:t>
+            </a:r>
+            <a:endParaRPr lang="en-US" dirty="0"/>
+          </a:p>
+        </p:txBody>
+      </p:sp>
+      <p:sp>
+        <p:nvSpPr>
+          <p:cNvPr id="3" name="Content Placeholder 2"/>
+          <p:cNvSpPr>
+            <a:spLocks noGrp="1"/>
+          </p:cNvSpPr>
+          <p:nvPr>
+            <p:ph idx="1"/>
+          </p:nvPr>
+        </p:nvSpPr>
+        <p:spPr/>
+        <p:txBody>
+          <a:bodyPr>
+            <a:normAutofit fontScale="92500" lnSpcReduction="10000"/>
+          </a:bodyPr>
+          <a:lstStyle/>
+          <a:p>
+            <a:r>
+              <a:rPr lang="en-US" dirty="0" smtClean="0"/>
+              <a:t>Predicts instantaneous bounds on the percentiles of a time series</a:t>
+            </a:r>
+          </a:p>
+          <a:p>
+            <a:r>
+              <a:rPr lang="en-US" dirty="0" smtClean="0"/>
+              <a:t>Analyzes the first </a:t>
+            </a:r>
+            <a:r>
+              <a:rPr lang="en-US" i="1" dirty="0" smtClean="0"/>
+              <a:t>n</a:t>
+            </a:r>
+            <a:r>
+              <a:rPr lang="en-US" dirty="0" smtClean="0"/>
+              <a:t> entries in a time series</a:t>
+            </a:r>
+          </a:p>
+          <a:p>
+            <a:r>
+              <a:rPr lang="en-US" dirty="0" smtClean="0"/>
+              <a:t>Predicts an upper bound for the </a:t>
+            </a:r>
+            <a:r>
+              <a:rPr lang="en-US" i="1" dirty="0" smtClean="0"/>
+              <a:t>(n+1)</a:t>
+            </a:r>
+            <a:r>
+              <a:rPr lang="en-US" baseline="30000" dirty="0" err="1" smtClean="0"/>
+              <a:t>th</a:t>
+            </a:r>
+            <a:r>
+              <a:rPr lang="en-US" dirty="0" smtClean="0"/>
+              <a:t> entry</a:t>
+            </a:r>
+          </a:p>
+          <a:p>
+            <a:pPr lvl="1"/>
+            <a:r>
+              <a:rPr lang="en-US" i="1" dirty="0" smtClean="0"/>
+              <a:t>QBETS([x</a:t>
+            </a:r>
+            <a:r>
+              <a:rPr lang="en-US" i="1" baseline="-25000" dirty="0" smtClean="0"/>
+              <a:t>1</a:t>
+            </a:r>
+            <a:r>
+              <a:rPr lang="en-US" i="1" dirty="0" smtClean="0"/>
+              <a:t>,x</a:t>
+            </a:r>
+            <a:r>
+              <a:rPr lang="en-US" i="1" baseline="-25000" dirty="0" smtClean="0"/>
+              <a:t>2</a:t>
+            </a:r>
+            <a:r>
+              <a:rPr lang="en-US" i="1" dirty="0" smtClean="0"/>
+              <a:t>,…</a:t>
+            </a:r>
+            <a:r>
+              <a:rPr lang="en-US" i="1" dirty="0" err="1" smtClean="0"/>
+              <a:t>x</a:t>
+            </a:r>
+            <a:r>
+              <a:rPr lang="en-US" i="1" baseline="-25000" dirty="0" err="1" smtClean="0"/>
+              <a:t>n</a:t>
+            </a:r>
+            <a:r>
+              <a:rPr lang="en-US" i="1" dirty="0" smtClean="0"/>
+              <a:t>], p) = Q</a:t>
+            </a:r>
+            <a:r>
+              <a:rPr lang="en-US" dirty="0" smtClean="0"/>
+              <a:t> where </a:t>
+            </a:r>
+            <a:r>
+              <a:rPr lang="en-US" i="1" dirty="0" smtClean="0"/>
+              <a:t>p </a:t>
+            </a:r>
+            <a:r>
+              <a:rPr lang="en-US" i="1" dirty="0" smtClean="0">
+                <a:sym typeface="Symbol"/>
+              </a:rPr>
+              <a:t> </a:t>
+            </a:r>
+            <a:r>
+              <a:rPr lang="en-US" i="1" dirty="0" smtClean="0"/>
+              <a:t>(0,1)</a:t>
+            </a:r>
+          </a:p>
+          <a:p>
+            <a:pPr lvl="1"/>
+            <a:r>
+              <a:rPr lang="en-US" i="1" dirty="0" smtClean="0"/>
+              <a:t>P(x</a:t>
+            </a:r>
+            <a:r>
+              <a:rPr lang="en-US" i="1" baseline="-25000" dirty="0" smtClean="0"/>
+              <a:t>n+1</a:t>
+            </a:r>
+            <a:r>
+              <a:rPr lang="en-US" i="1" dirty="0" smtClean="0"/>
+              <a:t> ≤ Q) ≥ p</a:t>
+            </a:r>
+          </a:p>
+          <a:p>
+            <a:r>
+              <a:rPr lang="en-US" dirty="0" smtClean="0"/>
+              <a:t>Cerebro uses QBETS to predict response time SLAs of the form:</a:t>
+            </a:r>
+          </a:p>
+          <a:p>
+            <a:pPr lvl="1"/>
+            <a:r>
+              <a:rPr lang="en-US" dirty="0" smtClean="0"/>
+              <a:t>Operation </a:t>
+            </a:r>
+            <a:r>
+              <a:rPr lang="en-US" i="1" dirty="0" smtClean="0"/>
+              <a:t>O</a:t>
+            </a:r>
+            <a:r>
+              <a:rPr lang="en-US" dirty="0" smtClean="0"/>
+              <a:t> responds </a:t>
+            </a:r>
+            <a:r>
+              <a:rPr lang="en-US" i="1" dirty="0" smtClean="0"/>
+              <a:t>under</a:t>
+            </a:r>
+            <a:r>
+              <a:rPr lang="en-US" dirty="0" smtClean="0"/>
+              <a:t> </a:t>
+            </a:r>
+            <a:r>
+              <a:rPr lang="en-US" i="1" dirty="0" smtClean="0"/>
+              <a:t>T</a:t>
+            </a:r>
+            <a:r>
+              <a:rPr lang="en-US" dirty="0" smtClean="0"/>
+              <a:t> milliseconds (100</a:t>
+            </a:r>
+            <a:r>
+              <a:rPr lang="en-US" i="1" dirty="0" smtClean="0"/>
+              <a:t>p)%</a:t>
+            </a:r>
+            <a:r>
+              <a:rPr lang="en-US" dirty="0" smtClean="0"/>
+              <a:t> of the time</a:t>
+            </a:r>
+            <a:endParaRPr lang="en-US" dirty="0"/>
+          </a:p>
+        </p:txBody>
+      </p:sp>
+      <p:sp>
+        <p:nvSpPr>
+          <p:cNvPr id="4" name="Slide Number Placeholder 3"/>
+          <p:cNvSpPr>
+            <a:spLocks noGrp="1"/>
+          </p:cNvSpPr>
+          <p:nvPr>
+            <p:ph type="sldNum" sz="quarter" idx="12"/>
+          </p:nvPr>
+        </p:nvSpPr>
+        <p:spPr/>
+        <p:txBody>
+          <a:bodyPr/>
+          <a:lstStyle/>
+          <a:p>
+            <a:fld id="{3336F440-0623-F948-B0BF-C3A0BAE2BBD0}" type="slidenum">
+              <a:rPr lang="en-US" smtClean="0"/>
+              <a:pPr/>
+              <a:t>9</a:t>
+            </a:fld>
+            <a:endParaRPr lang="en-US"/>
+          </a:p>
+        </p:txBody>
+      </p:sp>
+    </p:spTree>
+    <p:extLst>
+      <p:ext uri="{BB962C8B-B14F-4D97-AF65-F5344CB8AC3E}">
+        <p14:creationId xmlns:p14="http://schemas.microsoft.com/office/powerpoint/2010/main" val="4294412330"/>
       </p:ext>
     </p:extLst>
   </p:cSld>
@@ -7314,4 +8043,324 @@
   </a:objectDefaults>
   <a:extraClrSchemeLst/>
 </a:theme>
+</file>
+
+<file path=ppt/theme/theme2.xml><?xml version="1.0" encoding="utf-8"?>
+<a:theme xmlns:a="http://schemas.openxmlformats.org/drawingml/2006/main" name="Office Theme">
+  <a:themeElements>
+    <a:clrScheme name="Office">
+      <a:dk1>
+        <a:sysClr val="windowText" lastClr="000000"/>
+      </a:dk1>
+      <a:lt1>
+        <a:sysClr val="window" lastClr="FFFFFF"/>
+      </a:lt1>
+      <a:dk2>
+        <a:srgbClr val="1F497D"/>
+      </a:dk2>
+      <a:lt2>
+        <a:srgbClr val="EEECE1"/>
+      </a:lt2>
+      <a:accent1>
+        <a:srgbClr val="4F81BD"/>
+      </a:accent1>
+      <a:accent2>
+        <a:srgbClr val="C0504D"/>
+      </a:accent2>
+      <a:accent3>
+        <a:srgbClr val="9BBB59"/>
+      </a:accent3>
+      <a:accent4>
+        <a:srgbClr val="8064A2"/>
+      </a:accent4>
+      <a:accent5>
+        <a:srgbClr val="4BACC6"/>
+      </a:accent5>
+      <a:accent6>
+        <a:srgbClr val="F79646"/>
+      </a:accent6>
+      <a:hlink>
+        <a:srgbClr val="0000FF"/>
+      </a:hlink>
+      <a:folHlink>
+        <a:srgbClr val="800080"/>
+      </a:folHlink>
+    </a:clrScheme>
+    <a:fontScheme name="Office">
+      <a:majorFont>
+        <a:latin typeface="Calibri"/>
+        <a:ea typeface=""/>
+        <a:cs typeface=""/>
+        <a:font script="Jpan" typeface="ＭＳ Ｐゴシック"/>
+        <a:font script="Hang" typeface="맑은 고딕"/>
+        <a:font script="Hans" typeface="宋体"/>
+        <a:font script="Hant" typeface="新細明體"/>
+        <a:font script="Arab" typeface="Times New Roman"/>
+        <a:font script="Hebr" typeface="Times New Roman"/>
+        <a:font script="Thai" typeface="Angsana New"/>
+        <a:font script="Ethi" typeface="Nyala"/>
+        <a:font script="Beng" typeface="Vrinda"/>
+        <a:font script="Gujr" typeface="Shruti"/>
+        <a:font script="Khmr" typeface="MoolBoran"/>
+        <a:font script="Knda" typeface="Tunga"/>
+        <a:font script="Guru" typeface="Raavi"/>
+        <a:font script="Cans" typeface="Euphemia"/>
+        <a:font script="Cher" typeface="Plantagenet Cherokee"/>
+        <a:font script="Yiii" typeface="Microsoft Yi Baiti"/>
+        <a:font script="Tibt" typeface="Microsoft Himalaya"/>
+        <a:font script="Thaa" typeface="MV Boli"/>
+        <a:font script="Deva" typeface="Mangal"/>
+        <a:font script="Telu" typeface="Gautami"/>
+        <a:font script="Taml" typeface="Latha"/>
+        <a:font script="Syrc" typeface="Estrangelo Edessa"/>
+        <a:font script="Orya" typeface="Kalinga"/>
+        <a:font script="Mlym" typeface="Kartika"/>
+        <a:font script="Laoo" typeface="DokChampa"/>
+        <a:font script="Sinh" typeface="Iskoola Pota"/>
+        <a:font script="Mong" typeface="Mongolian Baiti"/>
+        <a:font script="Viet" typeface="Times New Roman"/>
+        <a:font script="Uigh" typeface="Microsoft Uighur"/>
+        <a:font script="Geor" typeface="Sylfaen"/>
+      </a:majorFont>
+      <a:minorFont>
+        <a:latin typeface="Calibri"/>
+        <a:ea typeface=""/>
+        <a:cs typeface=""/>
+        <a:font script="Jpan" typeface="ＭＳ Ｐゴシック"/>
+        <a:font script="Hang" typeface="맑은 고딕"/>
+        <a:font script="Hans" typeface="宋体"/>
+        <a:font script="Hant" typeface="新細明體"/>
+        <a:font script="Arab" typeface="Arial"/>
+        <a:font script="Hebr" typeface="Arial"/>
+        <a:font script="Thai" typeface="Cordia New"/>
+        <a:font script="Ethi" typeface="Nyala"/>
+        <a:font script="Beng" typeface="Vrinda"/>
+        <a:font script="Gujr" typeface="Shruti"/>
+        <a:font script="Khmr" typeface="DaunPenh"/>
+        <a:font script="Knda" typeface="Tunga"/>
+        <a:font script="Guru" typeface="Raavi"/>
+        <a:font script="Cans" typeface="Euphemia"/>
+        <a:font script="Cher" typeface="Plantagenet Cherokee"/>
+        <a:font script="Yiii" typeface="Microsoft Yi Baiti"/>
+        <a:font script="Tibt" typeface="Microsoft Himalaya"/>
+        <a:font script="Thaa" typeface="MV Boli"/>
+        <a:font script="Deva" typeface="Mangal"/>
+        <a:font script="Telu" typeface="Gautami"/>
+        <a:font script="Taml" typeface="Latha"/>
+        <a:font script="Syrc" typeface="Estrangelo Edessa"/>
+        <a:font script="Orya" typeface="Kalinga"/>
+        <a:font script="Mlym" typeface="Kartika"/>
+        <a:font script="Laoo" typeface="DokChampa"/>
+        <a:font script="Sinh" typeface="Iskoola Pota"/>
+        <a:font script="Mong" typeface="Mongolian Baiti"/>
+        <a:font script="Viet" typeface="Arial"/>
+        <a:font script="Uigh" typeface="Microsoft Uighur"/>
+        <a:font script="Geor" typeface="Sylfaen"/>
+      </a:minorFont>
+    </a:fontScheme>
+    <a:fmtScheme name="Office">
+      <a:fillStyleLst>
+        <a:solidFill>
+          <a:schemeClr val="phClr"/>
+        </a:solidFill>
+        <a:gradFill rotWithShape="1">
+          <a:gsLst>
+            <a:gs pos="0">
+              <a:schemeClr val="phClr">
+                <a:tint val="50000"/>
+                <a:satMod val="300000"/>
+              </a:schemeClr>
+            </a:gs>
+            <a:gs pos="35000">
+              <a:schemeClr val="phClr">
+                <a:tint val="37000"/>
+                <a:satMod val="300000"/>
+              </a:schemeClr>
+            </a:gs>
+            <a:gs pos="100000">
+              <a:schemeClr val="phClr">
+                <a:tint val="15000"/>
+                <a:satMod val="350000"/>
+              </a:schemeClr>
+            </a:gs>
+          </a:gsLst>
+          <a:lin ang="16200000" scaled="1"/>
+        </a:gradFill>
+        <a:gradFill rotWithShape="1">
+          <a:gsLst>
+            <a:gs pos="0">
+              <a:schemeClr val="phClr">
+                <a:tint val="100000"/>
+                <a:shade val="100000"/>
+                <a:satMod val="130000"/>
+              </a:schemeClr>
+            </a:gs>
+            <a:gs pos="100000">
+              <a:schemeClr val="phClr">
+                <a:tint val="50000"/>
+                <a:shade val="100000"/>
+                <a:satMod val="350000"/>
+              </a:schemeClr>
+            </a:gs>
+          </a:gsLst>
+          <a:lin ang="16200000" scaled="0"/>
+        </a:gradFill>
+      </a:fillStyleLst>
+      <a:lnStyleLst>
+        <a:ln w="9525" cap="flat" cmpd="sng" algn="ctr">
+          <a:solidFill>
+            <a:schemeClr val="phClr">
+              <a:shade val="95000"/>
+              <a:satMod val="105000"/>
+            </a:schemeClr>
+          </a:solidFill>
+          <a:prstDash val="solid"/>
+        </a:ln>
+        <a:ln w="25400" cap="flat" cmpd="sng" algn="ctr">
+          <a:solidFill>
+            <a:schemeClr val="phClr"/>
+          </a:solidFill>
+          <a:prstDash val="solid"/>
+        </a:ln>
+        <a:ln w="38100" cap="flat" cmpd="sng" algn="ctr">
+          <a:solidFill>
+            <a:schemeClr val="phClr"/>
+          </a:solidFill>
+          <a:prstDash val="solid"/>
+        </a:ln>
+      </a:lnStyleLst>
+      <a:effectStyleLst>
+        <a:effectStyle>
+          <a:effectLst>
+            <a:outerShdw blurRad="40000" dist="20000" dir="5400000" rotWithShape="0">
+              <a:srgbClr val="000000">
+                <a:alpha val="38000"/>
+              </a:srgbClr>
+            </a:outerShdw>
+          </a:effectLst>
+        </a:effectStyle>
+        <a:effectStyle>
+          <a:effectLst>
+            <a:outerShdw blurRad="40000" dist="23000" dir="5400000" rotWithShape="0">
+              <a:srgbClr val="000000">
+                <a:alpha val="35000"/>
+              </a:srgbClr>
+            </a:outerShdw>
+          </a:effectLst>
+        </a:effectStyle>
+        <a:effectStyle>
+          <a:effectLst>
+            <a:outerShdw blurRad="40000" dist="23000" dir="5400000" rotWithShape="0">
+              <a:srgbClr val="000000">
+                <a:alpha val="35000"/>
+              </a:srgbClr>
+            </a:outerShdw>
+          </a:effectLst>
+          <a:scene3d>
+            <a:camera prst="orthographicFront">
+              <a:rot lat="0" lon="0" rev="0"/>
+            </a:camera>
+            <a:lightRig rig="threePt" dir="t">
+              <a:rot lat="0" lon="0" rev="1200000"/>
+            </a:lightRig>
+          </a:scene3d>
+          <a:sp3d>
+            <a:bevelT w="63500" h="25400"/>
+          </a:sp3d>
+        </a:effectStyle>
+      </a:effectStyleLst>
+      <a:bgFillStyleLst>
+        <a:solidFill>
+          <a:schemeClr val="phClr"/>
+        </a:solidFill>
+        <a:gradFill rotWithShape="1">
+          <a:gsLst>
+            <a:gs pos="0">
+              <a:schemeClr val="phClr">
+                <a:tint val="40000"/>
+                <a:satMod val="350000"/>
+              </a:schemeClr>
+            </a:gs>
+            <a:gs pos="40000">
+              <a:schemeClr val="phClr">
+                <a:tint val="45000"/>
+                <a:shade val="99000"/>
+                <a:satMod val="350000"/>
+              </a:schemeClr>
+            </a:gs>
+            <a:gs pos="100000">
+              <a:schemeClr val="phClr">
+                <a:shade val="20000"/>
+                <a:satMod val="255000"/>
+              </a:schemeClr>
+            </a:gs>
+          </a:gsLst>
+          <a:path path="circle">
+            <a:fillToRect l="50000" t="-80000" r="50000" b="180000"/>
+          </a:path>
+        </a:gradFill>
+        <a:gradFill rotWithShape="1">
+          <a:gsLst>
+            <a:gs pos="0">
+              <a:schemeClr val="phClr">
+                <a:tint val="80000"/>
+                <a:satMod val="300000"/>
+              </a:schemeClr>
+            </a:gs>
+            <a:gs pos="100000">
+              <a:schemeClr val="phClr">
+                <a:shade val="30000"/>
+                <a:satMod val="200000"/>
+              </a:schemeClr>
+            </a:gs>
+          </a:gsLst>
+          <a:path path="circle">
+            <a:fillToRect l="50000" t="50000" r="50000" b="50000"/>
+          </a:path>
+        </a:gradFill>
+      </a:bgFillStyleLst>
+    </a:fmtScheme>
+  </a:themeElements>
+  <a:objectDefaults>
+    <a:spDef>
+      <a:spPr/>
+      <a:bodyPr/>
+      <a:lstStyle/>
+      <a:style>
+        <a:lnRef idx="1">
+          <a:schemeClr val="accent1"/>
+        </a:lnRef>
+        <a:fillRef idx="3">
+          <a:schemeClr val="accent1"/>
+        </a:fillRef>
+        <a:effectRef idx="2">
+          <a:schemeClr val="accent1"/>
+        </a:effectRef>
+        <a:fontRef idx="minor">
+          <a:schemeClr val="lt1"/>
+        </a:fontRef>
+      </a:style>
+    </a:spDef>
+    <a:lnDef>
+      <a:spPr/>
+      <a:bodyPr/>
+      <a:lstStyle/>
+      <a:style>
+        <a:lnRef idx="2">
+          <a:schemeClr val="accent1"/>
+        </a:lnRef>
+        <a:fillRef idx="0">
+          <a:schemeClr val="accent1"/>
+        </a:fillRef>
+        <a:effectRef idx="1">
+          <a:schemeClr val="accent1"/>
+        </a:effectRef>
+        <a:fontRef idx="minor">
+          <a:schemeClr val="tx1"/>
+        </a:fontRef>
+      </a:style>
+    </a:lnDef>
+  </a:objectDefaults>
+  <a:extraClrSchemeLst/>
+</a:theme>
 </file>
</xml_diff>